<commit_message>
KMS IAM mods, misc code enhancements, docs complete
</commit_message>
<xml_diff>
--- a/docs/images/architecture_diagram.pptx
+++ b/docs/images/architecture_diagram.pptx
@@ -325,7 +325,7 @@
               <a:pPr>
                 <a:defRPr/>
               </a:pPr>
-              <a:t>8/2/21</a:t>
+              <a:t>9/14/21</a:t>
             </a:fld>
             <a:endParaRPr lang="en-US" dirty="0"/>
           </a:p>
@@ -15318,8 +15318,8 @@
         </p:nvSpPr>
         <p:spPr>
           <a:xfrm>
-            <a:off x="2576411" y="2231883"/>
-            <a:ext cx="2255362" cy="3415884"/>
+            <a:off x="2576411" y="1712333"/>
+            <a:ext cx="2255362" cy="3072412"/>
           </a:xfrm>
           <a:prstGeom prst="rect">
             <a:avLst/>
@@ -15400,8 +15400,8 @@
         </p:nvSpPr>
         <p:spPr>
           <a:xfrm>
-            <a:off x="2010493" y="1859973"/>
-            <a:ext cx="7943997" cy="3931228"/>
+            <a:off x="2010493" y="1112068"/>
+            <a:ext cx="7943997" cy="4810750"/>
           </a:xfrm>
           <a:prstGeom prst="rect">
             <a:avLst/>
@@ -15467,8 +15467,8 @@
         </p:nvSpPr>
         <p:spPr>
           <a:xfrm>
-            <a:off x="4996645" y="2243677"/>
-            <a:ext cx="4573382" cy="3404089"/>
+            <a:off x="4996645" y="1724128"/>
+            <a:ext cx="4573382" cy="3072412"/>
           </a:xfrm>
           <a:prstGeom prst="rect">
             <a:avLst/>
@@ -15530,7 +15530,7 @@
                 <a:latin typeface="Arial" panose="020B0604020202020204" pitchFamily="34" charset="0"/>
                 <a:cs typeface="Arial" panose="020B0604020202020204" pitchFamily="34" charset="0"/>
               </a:rPr>
-              <a:t>10.0.16.0/20</a:t>
+              <a:t>10.0.128.0/20</a:t>
             </a:r>
           </a:p>
         </p:txBody>
@@ -15549,8 +15549,8 @@
         </p:nvSpPr>
         <p:spPr>
           <a:xfrm>
-            <a:off x="1696825" y="341189"/>
-            <a:ext cx="8434999" cy="5592020"/>
+            <a:off x="1696825" y="91805"/>
+            <a:ext cx="8434999" cy="5914140"/>
           </a:xfrm>
           <a:prstGeom prst="rect">
             <a:avLst/>
@@ -15615,8 +15615,8 @@
         </p:nvSpPr>
         <p:spPr>
           <a:xfrm>
-            <a:off x="2375802" y="1514531"/>
-            <a:ext cx="7381262" cy="3971868"/>
+            <a:off x="2375802" y="1431327"/>
+            <a:ext cx="7381262" cy="3442007"/>
           </a:xfrm>
           <a:prstGeom prst="rect">
             <a:avLst/>
@@ -15663,7 +15663,7 @@
                 <a:latin typeface="Arial" panose="020B0604020202020204" pitchFamily="34" charset="0"/>
                 <a:cs typeface="Arial" panose="020B0604020202020204" pitchFamily="34" charset="0"/>
               </a:rPr>
-              <a:t>Availability Zone 1</a:t>
+              <a:t>Availability Zone 1 - Production</a:t>
             </a:r>
           </a:p>
         </p:txBody>
@@ -15696,7 +15696,7 @@
         </p:blipFill>
         <p:spPr>
           <a:xfrm>
-            <a:off x="1698364" y="347857"/>
+            <a:off x="1698364" y="98473"/>
             <a:ext cx="330200" cy="330200"/>
           </a:xfrm>
           <a:prstGeom prst="rect">
@@ -15732,7 +15732,7 @@
         </p:blipFill>
         <p:spPr>
           <a:xfrm>
-            <a:off x="2013276" y="1859973"/>
+            <a:off x="2002248" y="1125521"/>
             <a:ext cx="330200" cy="330200"/>
           </a:xfrm>
           <a:prstGeom prst="rect">
@@ -15768,7 +15768,7 @@
         </p:blipFill>
         <p:spPr>
           <a:xfrm>
-            <a:off x="2577782" y="2241386"/>
+            <a:off x="2577782" y="1721836"/>
             <a:ext cx="274320" cy="274320"/>
           </a:xfrm>
           <a:prstGeom prst="rect">
@@ -15804,7 +15804,7 @@
         </p:blipFill>
         <p:spPr>
           <a:xfrm>
-            <a:off x="5009644" y="2247271"/>
+            <a:off x="5009644" y="1727721"/>
             <a:ext cx="274320" cy="274320"/>
           </a:xfrm>
           <a:prstGeom prst="rect">
@@ -15826,7 +15826,7 @@
         </p:nvSpPr>
         <p:spPr>
           <a:xfrm>
-            <a:off x="4179024" y="4635860"/>
+            <a:off x="4160796" y="3044625"/>
             <a:ext cx="1153178" cy="246221"/>
           </a:xfrm>
           <a:prstGeom prst="rect">
@@ -15879,7 +15879,7 @@
         </p:blipFill>
         <p:spPr>
           <a:xfrm>
-            <a:off x="4522108" y="4177193"/>
+            <a:off x="4503288" y="2617100"/>
             <a:ext cx="469900" cy="469900"/>
           </a:xfrm>
           <a:prstGeom prst="rect">
@@ -15915,7 +15915,7 @@
         </p:blipFill>
         <p:spPr>
           <a:xfrm>
-            <a:off x="6657421" y="414274"/>
+            <a:off x="6657421" y="164890"/>
             <a:ext cx="591034" cy="591034"/>
           </a:xfrm>
           <a:prstGeom prst="rect">
@@ -15937,7 +15937,7 @@
         </p:nvSpPr>
         <p:spPr>
           <a:xfrm>
-            <a:off x="6116843" y="996582"/>
+            <a:off x="6116843" y="747198"/>
             <a:ext cx="1651819" cy="246221"/>
           </a:xfrm>
           <a:prstGeom prst="rect">
@@ -15991,7 +15991,7 @@
         </p:blipFill>
         <p:spPr bwMode="auto">
           <a:xfrm>
-            <a:off x="9131875" y="408879"/>
+            <a:off x="9131875" y="159495"/>
             <a:ext cx="594360" cy="594360"/>
           </a:xfrm>
           <a:prstGeom prst="rect">
@@ -16038,7 +16038,7 @@
         </p:nvSpPr>
         <p:spPr bwMode="auto">
           <a:xfrm>
-            <a:off x="8332352" y="1016601"/>
+            <a:off x="8332352" y="767217"/>
             <a:ext cx="2268537" cy="246221"/>
           </a:xfrm>
           <a:prstGeom prst="rect">
@@ -16212,7 +16212,7 @@
         </p:blipFill>
         <p:spPr bwMode="auto">
           <a:xfrm>
-            <a:off x="7343528" y="4107738"/>
+            <a:off x="7343528" y="3432323"/>
             <a:ext cx="594360" cy="594360"/>
           </a:xfrm>
           <a:prstGeom prst="rect">
@@ -16259,7 +16259,7 @@
         </p:nvSpPr>
         <p:spPr bwMode="auto">
           <a:xfrm>
-            <a:off x="6531161" y="4694678"/>
+            <a:off x="6531161" y="4019263"/>
             <a:ext cx="2268537" cy="553998"/>
           </a:xfrm>
           <a:prstGeom prst="rect">
@@ -16450,7 +16450,7 @@
         </p:nvSpPr>
         <p:spPr bwMode="auto">
           <a:xfrm>
-            <a:off x="5645463" y="5071844"/>
+            <a:off x="5645463" y="4396429"/>
             <a:ext cx="1115904" cy="400110"/>
           </a:xfrm>
           <a:prstGeom prst="rect">
@@ -16635,7 +16635,7 @@
         </p:blipFill>
         <p:spPr bwMode="auto">
           <a:xfrm>
-            <a:off x="7331202" y="2563491"/>
+            <a:off x="7331202" y="2147851"/>
             <a:ext cx="594360" cy="594360"/>
           </a:xfrm>
           <a:prstGeom prst="rect">
@@ -16682,7 +16682,7 @@
         </p:nvSpPr>
         <p:spPr bwMode="auto">
           <a:xfrm>
-            <a:off x="6492865" y="3167574"/>
+            <a:off x="6492865" y="2741543"/>
             <a:ext cx="2292350" cy="553998"/>
           </a:xfrm>
           <a:prstGeom prst="rect">
@@ -16886,7 +16886,7 @@
         </p:blipFill>
         <p:spPr bwMode="auto">
           <a:xfrm>
-            <a:off x="7915920" y="404424"/>
+            <a:off x="7909570" y="155040"/>
             <a:ext cx="594360" cy="594360"/>
           </a:xfrm>
           <a:prstGeom prst="rect">
@@ -16933,7 +16933,7 @@
         </p:nvSpPr>
         <p:spPr bwMode="auto">
           <a:xfrm>
-            <a:off x="7113799" y="1020950"/>
+            <a:off x="7113799" y="771566"/>
             <a:ext cx="2243137" cy="246221"/>
           </a:xfrm>
           <a:prstGeom prst="rect">
@@ -17094,7 +17094,7 @@
         </p:nvSpPr>
         <p:spPr bwMode="auto">
           <a:xfrm>
-            <a:off x="1310932" y="4654714"/>
+            <a:off x="1351869" y="3063909"/>
             <a:ext cx="1403350" cy="400110"/>
           </a:xfrm>
           <a:prstGeom prst="rect">
@@ -17279,7 +17279,7 @@
         </p:blipFill>
         <p:spPr bwMode="auto">
           <a:xfrm>
-            <a:off x="1772137" y="4197514"/>
+            <a:off x="1813074" y="2617100"/>
             <a:ext cx="457200" cy="457200"/>
           </a:xfrm>
           <a:prstGeom prst="rect">
@@ -17326,7 +17326,7 @@
         </p:nvSpPr>
         <p:spPr bwMode="auto">
           <a:xfrm>
-            <a:off x="1921437" y="3737791"/>
+            <a:off x="1921437" y="3904044"/>
             <a:ext cx="1342852" cy="246221"/>
           </a:xfrm>
           <a:prstGeom prst="rect">
@@ -17471,24 +17471,37 @@
           </a:p>
         </p:txBody>
       </p:sp>
-      <p:sp>
-        <p:nvSpPr>
-          <p:cNvPr id="92" name="TextBox 27">
-            <a:extLst>
-              <a:ext uri="{FF2B5EF4-FFF2-40B4-BE49-F238E27FC236}">
-                <a16:creationId xmlns:a16="http://schemas.microsoft.com/office/drawing/2014/main" id="{421E4A39-24B0-3844-800A-1E388C61445E}"/>
-              </a:ext>
-            </a:extLst>
-          </p:cNvPr>
-          <p:cNvSpPr txBox="1">
-            <a:spLocks noChangeArrowheads="1"/>
-          </p:cNvSpPr>
+      <p:pic>
+        <p:nvPicPr>
+          <p:cNvPr id="95" name="Graphic 37">
+            <a:extLst>
+              <a:ext uri="{FF2B5EF4-FFF2-40B4-BE49-F238E27FC236}">
+                <a16:creationId xmlns:a16="http://schemas.microsoft.com/office/drawing/2014/main" id="{634F2CF6-4CAB-CB4D-BAFD-9B025CB0729C}"/>
+              </a:ext>
+            </a:extLst>
+          </p:cNvPr>
+          <p:cNvPicPr>
+            <a:picLocks noChangeAspect="1" noChangeArrowheads="1"/>
+          </p:cNvPicPr>
           <p:nvPr/>
-        </p:nvSpPr>
+        </p:nvPicPr>
+        <p:blipFill>
+          <a:blip r:embed="rId20">
+            <a:extLst>
+              <a:ext uri="{28A0092B-C50C-407E-A947-70E740481C1C}">
+                <a14:useLocalDpi xmlns:a14="http://schemas.microsoft.com/office/drawing/2010/main" val="0"/>
+              </a:ext>
+            </a:extLst>
+          </a:blip>
+          <a:srcRect/>
+          <a:stretch>
+            <a:fillRect/>
+          </a:stretch>
+        </p:blipFill>
         <p:spPr bwMode="auto">
           <a:xfrm>
-            <a:off x="1785493" y="4639679"/>
-            <a:ext cx="1644650" cy="246221"/>
+            <a:off x="2377466" y="3498454"/>
+            <a:ext cx="457200" cy="457200"/>
           </a:xfrm>
           <a:prstGeom prst="rect">
             <a:avLst/>
@@ -17517,127 +17530,13 @@
             </a:ext>
           </a:extLst>
         </p:spPr>
-        <p:txBody>
-          <a:bodyPr>
-            <a:spAutoFit/>
-          </a:bodyPr>
-          <a:lstStyle>
-            <a:lvl1pPr>
-              <a:defRPr>
-                <a:solidFill>
-                  <a:schemeClr val="tx1"/>
-                </a:solidFill>
-                <a:latin typeface="Calibri" panose="020F0502020204030204" pitchFamily="34" charset="0"/>
-              </a:defRPr>
-            </a:lvl1pPr>
-            <a:lvl2pPr marL="742950" indent="-285750">
-              <a:defRPr>
-                <a:solidFill>
-                  <a:schemeClr val="tx1"/>
-                </a:solidFill>
-                <a:latin typeface="Calibri" panose="020F0502020204030204" pitchFamily="34" charset="0"/>
-              </a:defRPr>
-            </a:lvl2pPr>
-            <a:lvl3pPr marL="1143000" indent="-228600">
-              <a:defRPr>
-                <a:solidFill>
-                  <a:schemeClr val="tx1"/>
-                </a:solidFill>
-                <a:latin typeface="Calibri" panose="020F0502020204030204" pitchFamily="34" charset="0"/>
-              </a:defRPr>
-            </a:lvl3pPr>
-            <a:lvl4pPr marL="1600200" indent="-228600">
-              <a:defRPr>
-                <a:solidFill>
-                  <a:schemeClr val="tx1"/>
-                </a:solidFill>
-                <a:latin typeface="Calibri" panose="020F0502020204030204" pitchFamily="34" charset="0"/>
-              </a:defRPr>
-            </a:lvl4pPr>
-            <a:lvl5pPr marL="2057400" indent="-228600">
-              <a:defRPr>
-                <a:solidFill>
-                  <a:schemeClr val="tx1"/>
-                </a:solidFill>
-                <a:latin typeface="Calibri" panose="020F0502020204030204" pitchFamily="34" charset="0"/>
-              </a:defRPr>
-            </a:lvl5pPr>
-            <a:lvl6pPr marL="2514600" indent="-228600" eaLnBrk="0" fontAlgn="base" hangingPunct="0">
-              <a:spcBef>
-                <a:spcPct val="0"/>
-              </a:spcBef>
-              <a:spcAft>
-                <a:spcPct val="0"/>
-              </a:spcAft>
-              <a:defRPr>
-                <a:solidFill>
-                  <a:schemeClr val="tx1"/>
-                </a:solidFill>
-                <a:latin typeface="Calibri" panose="020F0502020204030204" pitchFamily="34" charset="0"/>
-              </a:defRPr>
-            </a:lvl6pPr>
-            <a:lvl7pPr marL="2971800" indent="-228600" eaLnBrk="0" fontAlgn="base" hangingPunct="0">
-              <a:spcBef>
-                <a:spcPct val="0"/>
-              </a:spcBef>
-              <a:spcAft>
-                <a:spcPct val="0"/>
-              </a:spcAft>
-              <a:defRPr>
-                <a:solidFill>
-                  <a:schemeClr val="tx1"/>
-                </a:solidFill>
-                <a:latin typeface="Calibri" panose="020F0502020204030204" pitchFamily="34" charset="0"/>
-              </a:defRPr>
-            </a:lvl7pPr>
-            <a:lvl8pPr marL="3429000" indent="-228600" eaLnBrk="0" fontAlgn="base" hangingPunct="0">
-              <a:spcBef>
-                <a:spcPct val="0"/>
-              </a:spcBef>
-              <a:spcAft>
-                <a:spcPct val="0"/>
-              </a:spcAft>
-              <a:defRPr>
-                <a:solidFill>
-                  <a:schemeClr val="tx1"/>
-                </a:solidFill>
-                <a:latin typeface="Calibri" panose="020F0502020204030204" pitchFamily="34" charset="0"/>
-              </a:defRPr>
-            </a:lvl8pPr>
-            <a:lvl9pPr marL="3886200" indent="-228600" eaLnBrk="0" fontAlgn="base" hangingPunct="0">
-              <a:spcBef>
-                <a:spcPct val="0"/>
-              </a:spcBef>
-              <a:spcAft>
-                <a:spcPct val="0"/>
-              </a:spcAft>
-              <a:defRPr>
-                <a:solidFill>
-                  <a:schemeClr val="tx1"/>
-                </a:solidFill>
-                <a:latin typeface="Calibri" panose="020F0502020204030204" pitchFamily="34" charset="0"/>
-              </a:defRPr>
-            </a:lvl9pPr>
-          </a:lstStyle>
-          <a:p>
-            <a:pPr algn="ctr" eaLnBrk="1" hangingPunct="1"/>
-            <a:r>
-              <a:rPr lang="en-US" altLang="en-US" sz="1000" dirty="0">
-                <a:latin typeface="Arial" panose="020B0604020202020204" pitchFamily="34" charset="0"/>
-                <a:ea typeface="Amazon Ember" panose="020B0603020204020204" pitchFamily="34" charset="0"/>
-                <a:cs typeface="Arial" panose="020B0604020202020204" pitchFamily="34" charset="0"/>
-              </a:rPr>
-              <a:t>Router</a:t>
-            </a:r>
-          </a:p>
-        </p:txBody>
-      </p:sp>
+      </p:pic>
       <p:pic>
         <p:nvPicPr>
-          <p:cNvPr id="94" name="Graphic 31">
-            <a:extLst>
-              <a:ext uri="{FF2B5EF4-FFF2-40B4-BE49-F238E27FC236}">
-                <a16:creationId xmlns:a16="http://schemas.microsoft.com/office/drawing/2014/main" id="{BFDA0D18-F21E-F04F-92ED-EB240B3EF6A4}"/>
+          <p:cNvPr id="97" name="Graphic 17">
+            <a:extLst>
+              <a:ext uri="{FF2B5EF4-FFF2-40B4-BE49-F238E27FC236}">
+                <a16:creationId xmlns:a16="http://schemas.microsoft.com/office/drawing/2014/main" id="{EC1AE1BB-1A37-6744-8B83-DABCFFE5BB19}"/>
               </a:ext>
             </a:extLst>
           </p:cNvPr>
@@ -17647,7 +17546,7 @@
           <p:nvPr/>
         </p:nvPicPr>
         <p:blipFill>
-          <a:blip r:embed="rId20">
+          <a:blip r:embed="rId21">
             <a:extLst>
               <a:ext uri="{28A0092B-C50C-407E-A947-70E740481C1C}">
                 <a14:useLocalDpi xmlns:a14="http://schemas.microsoft.com/office/drawing/2010/main" val="0"/>
@@ -17661,8 +17560,8 @@
         </p:blipFill>
         <p:spPr bwMode="auto">
           <a:xfrm>
-            <a:off x="2379218" y="4182479"/>
-            <a:ext cx="457200" cy="457200"/>
+            <a:off x="8690808" y="3435007"/>
+            <a:ext cx="594360" cy="594360"/>
           </a:xfrm>
           <a:prstGeom prst="rect">
             <a:avLst/>
@@ -17692,37 +17591,24 @@
           </a:extLst>
         </p:spPr>
       </p:pic>
-      <p:pic>
-        <p:nvPicPr>
-          <p:cNvPr id="95" name="Graphic 37">
-            <a:extLst>
-              <a:ext uri="{FF2B5EF4-FFF2-40B4-BE49-F238E27FC236}">
-                <a16:creationId xmlns:a16="http://schemas.microsoft.com/office/drawing/2014/main" id="{634F2CF6-4CAB-CB4D-BAFD-9B025CB0729C}"/>
-              </a:ext>
-            </a:extLst>
-          </p:cNvPr>
-          <p:cNvPicPr>
-            <a:picLocks noChangeAspect="1" noChangeArrowheads="1"/>
-          </p:cNvPicPr>
+      <p:sp>
+        <p:nvSpPr>
+          <p:cNvPr id="98" name="TextBox 9">
+            <a:extLst>
+              <a:ext uri="{FF2B5EF4-FFF2-40B4-BE49-F238E27FC236}">
+                <a16:creationId xmlns:a16="http://schemas.microsoft.com/office/drawing/2014/main" id="{43DC4896-6A05-934D-96FC-42ABA52D5B86}"/>
+              </a:ext>
+            </a:extLst>
+          </p:cNvPr>
+          <p:cNvSpPr txBox="1">
+            <a:spLocks noChangeArrowheads="1"/>
+          </p:cNvSpPr>
           <p:nvPr/>
-        </p:nvPicPr>
-        <p:blipFill>
-          <a:blip r:embed="rId21">
-            <a:extLst>
-              <a:ext uri="{28A0092B-C50C-407E-A947-70E740481C1C}">
-                <a14:useLocalDpi xmlns:a14="http://schemas.microsoft.com/office/drawing/2010/main" val="0"/>
-              </a:ext>
-            </a:extLst>
-          </a:blip>
-          <a:srcRect/>
-          <a:stretch>
-            <a:fillRect/>
-          </a:stretch>
-        </p:blipFill>
+        </p:nvSpPr>
         <p:spPr bwMode="auto">
           <a:xfrm>
-            <a:off x="2377466" y="3311419"/>
-            <a:ext cx="457200" cy="457200"/>
+            <a:off x="7888687" y="4021947"/>
+            <a:ext cx="2243137" cy="707886"/>
           </a:xfrm>
           <a:prstGeom prst="rect">
             <a:avLst/>
@@ -17751,13 +17637,157 @@
             </a:ext>
           </a:extLst>
         </p:spPr>
-      </p:pic>
+        <p:txBody>
+          <a:bodyPr>
+            <a:spAutoFit/>
+          </a:bodyPr>
+          <a:lstStyle>
+            <a:lvl1pPr>
+              <a:defRPr>
+                <a:solidFill>
+                  <a:schemeClr val="tx1"/>
+                </a:solidFill>
+                <a:latin typeface="Calibri" panose="020F0502020204030204" pitchFamily="34" charset="0"/>
+              </a:defRPr>
+            </a:lvl1pPr>
+            <a:lvl2pPr marL="742950" indent="-285750">
+              <a:defRPr>
+                <a:solidFill>
+                  <a:schemeClr val="tx1"/>
+                </a:solidFill>
+                <a:latin typeface="Calibri" panose="020F0502020204030204" pitchFamily="34" charset="0"/>
+              </a:defRPr>
+            </a:lvl2pPr>
+            <a:lvl3pPr marL="1143000" indent="-228600">
+              <a:defRPr>
+                <a:solidFill>
+                  <a:schemeClr val="tx1"/>
+                </a:solidFill>
+                <a:latin typeface="Calibri" panose="020F0502020204030204" pitchFamily="34" charset="0"/>
+              </a:defRPr>
+            </a:lvl3pPr>
+            <a:lvl4pPr marL="1600200" indent="-228600">
+              <a:defRPr>
+                <a:solidFill>
+                  <a:schemeClr val="tx1"/>
+                </a:solidFill>
+                <a:latin typeface="Calibri" panose="020F0502020204030204" pitchFamily="34" charset="0"/>
+              </a:defRPr>
+            </a:lvl4pPr>
+            <a:lvl5pPr marL="2057400" indent="-228600">
+              <a:defRPr>
+                <a:solidFill>
+                  <a:schemeClr val="tx1"/>
+                </a:solidFill>
+                <a:latin typeface="Calibri" panose="020F0502020204030204" pitchFamily="34" charset="0"/>
+              </a:defRPr>
+            </a:lvl5pPr>
+            <a:lvl6pPr marL="2514600" indent="-228600" eaLnBrk="0" fontAlgn="base" hangingPunct="0">
+              <a:spcBef>
+                <a:spcPct val="0"/>
+              </a:spcBef>
+              <a:spcAft>
+                <a:spcPct val="0"/>
+              </a:spcAft>
+              <a:defRPr>
+                <a:solidFill>
+                  <a:schemeClr val="tx1"/>
+                </a:solidFill>
+                <a:latin typeface="Calibri" panose="020F0502020204030204" pitchFamily="34" charset="0"/>
+              </a:defRPr>
+            </a:lvl6pPr>
+            <a:lvl7pPr marL="2971800" indent="-228600" eaLnBrk="0" fontAlgn="base" hangingPunct="0">
+              <a:spcBef>
+                <a:spcPct val="0"/>
+              </a:spcBef>
+              <a:spcAft>
+                <a:spcPct val="0"/>
+              </a:spcAft>
+              <a:defRPr>
+                <a:solidFill>
+                  <a:schemeClr val="tx1"/>
+                </a:solidFill>
+                <a:latin typeface="Calibri" panose="020F0502020204030204" pitchFamily="34" charset="0"/>
+              </a:defRPr>
+            </a:lvl7pPr>
+            <a:lvl8pPr marL="3429000" indent="-228600" eaLnBrk="0" fontAlgn="base" hangingPunct="0">
+              <a:spcBef>
+                <a:spcPct val="0"/>
+              </a:spcBef>
+              <a:spcAft>
+                <a:spcPct val="0"/>
+              </a:spcAft>
+              <a:defRPr>
+                <a:solidFill>
+                  <a:schemeClr val="tx1"/>
+                </a:solidFill>
+                <a:latin typeface="Calibri" panose="020F0502020204030204" pitchFamily="34" charset="0"/>
+              </a:defRPr>
+            </a:lvl8pPr>
+            <a:lvl9pPr marL="3886200" indent="-228600" eaLnBrk="0" fontAlgn="base" hangingPunct="0">
+              <a:spcBef>
+                <a:spcPct val="0"/>
+              </a:spcBef>
+              <a:spcAft>
+                <a:spcPct val="0"/>
+              </a:spcAft>
+              <a:defRPr>
+                <a:solidFill>
+                  <a:schemeClr val="tx1"/>
+                </a:solidFill>
+                <a:latin typeface="Calibri" panose="020F0502020204030204" pitchFamily="34" charset="0"/>
+              </a:defRPr>
+            </a:lvl9pPr>
+          </a:lstStyle>
+          <a:p>
+            <a:pPr algn="ctr" eaLnBrk="1" hangingPunct="1"/>
+            <a:r>
+              <a:rPr lang="en-US" altLang="en-US" sz="1000" dirty="0">
+                <a:latin typeface="Arial" panose="020B0604020202020204" pitchFamily="34" charset="0"/>
+                <a:ea typeface="Amazon Ember" panose="020B0603020204020204" pitchFamily="34" charset="0"/>
+                <a:cs typeface="Arial" panose="020B0604020202020204" pitchFamily="34" charset="0"/>
+              </a:rPr>
+              <a:t>Amazon EBS</a:t>
+            </a:r>
+          </a:p>
+          <a:p>
+            <a:pPr algn="ctr" eaLnBrk="1" hangingPunct="1"/>
+            <a:r>
+              <a:rPr lang="en-US" altLang="en-US" sz="1000" dirty="0">
+                <a:latin typeface="Arial" panose="020B0604020202020204" pitchFamily="34" charset="0"/>
+                <a:ea typeface="Amazon Ember" panose="020B0603020204020204" pitchFamily="34" charset="0"/>
+                <a:cs typeface="Arial" panose="020B0604020202020204" pitchFamily="34" charset="0"/>
+              </a:rPr>
+              <a:t>Volumes</a:t>
+            </a:r>
+          </a:p>
+          <a:p>
+            <a:pPr algn="ctr" eaLnBrk="1" hangingPunct="1"/>
+            <a:r>
+              <a:rPr lang="en-US" altLang="en-US" sz="1000" dirty="0">
+                <a:latin typeface="Arial" panose="020B0604020202020204" pitchFamily="34" charset="0"/>
+                <a:ea typeface="Amazon Ember" panose="020B0603020204020204" pitchFamily="34" charset="0"/>
+                <a:cs typeface="Arial" panose="020B0604020202020204" pitchFamily="34" charset="0"/>
+              </a:rPr>
+              <a:t>gp2, st1, sc1</a:t>
+            </a:r>
+          </a:p>
+          <a:p>
+            <a:pPr algn="ctr" eaLnBrk="1" hangingPunct="1"/>
+            <a:endParaRPr lang="en-US" altLang="en-US" sz="1000" dirty="0">
+              <a:latin typeface="Arial" panose="020B0604020202020204" pitchFamily="34" charset="0"/>
+              <a:ea typeface="Amazon Ember" panose="020B0603020204020204" pitchFamily="34" charset="0"/>
+              <a:cs typeface="Arial" panose="020B0604020202020204" pitchFamily="34" charset="0"/>
+            </a:endParaRPr>
+          </a:p>
+        </p:txBody>
+      </p:sp>
       <p:pic>
         <p:nvPicPr>
-          <p:cNvPr id="97" name="Graphic 17">
-            <a:extLst>
-              <a:ext uri="{FF2B5EF4-FFF2-40B4-BE49-F238E27FC236}">
-                <a16:creationId xmlns:a16="http://schemas.microsoft.com/office/drawing/2014/main" id="{EC1AE1BB-1A37-6744-8B83-DABCFFE5BB19}"/>
+          <p:cNvPr id="99" name="Graphic 10">
+            <a:extLst>
+              <a:ext uri="{FF2B5EF4-FFF2-40B4-BE49-F238E27FC236}">
+                <a16:creationId xmlns:a16="http://schemas.microsoft.com/office/drawing/2014/main" id="{75214CD6-2F4C-5F44-975E-F9E1F4D1BEF9}"/>
               </a:ext>
             </a:extLst>
           </p:cNvPr>
@@ -17767,7 +17797,7 @@
           <p:nvPr/>
         </p:nvPicPr>
         <p:blipFill>
-          <a:blip r:embed="rId22">
+          <a:blip r:embed="rId17">
             <a:extLst>
               <a:ext uri="{28A0092B-C50C-407E-A947-70E740481C1C}">
                 <a14:useLocalDpi xmlns:a14="http://schemas.microsoft.com/office/drawing/2010/main" val="0"/>
@@ -17781,7 +17811,7 @@
         </p:blipFill>
         <p:spPr bwMode="auto">
           <a:xfrm>
-            <a:off x="8690808" y="4100031"/>
+            <a:off x="8604594" y="2144762"/>
             <a:ext cx="594360" cy="594360"/>
           </a:xfrm>
           <a:prstGeom prst="rect">
@@ -17814,10 +17844,10 @@
       </p:pic>
       <p:sp>
         <p:nvSpPr>
-          <p:cNvPr id="98" name="TextBox 9">
-            <a:extLst>
-              <a:ext uri="{FF2B5EF4-FFF2-40B4-BE49-F238E27FC236}">
-                <a16:creationId xmlns:a16="http://schemas.microsoft.com/office/drawing/2014/main" id="{43DC4896-6A05-934D-96FC-42ABA52D5B86}"/>
+          <p:cNvPr id="100" name="TextBox 20">
+            <a:extLst>
+              <a:ext uri="{FF2B5EF4-FFF2-40B4-BE49-F238E27FC236}">
+                <a16:creationId xmlns:a16="http://schemas.microsoft.com/office/drawing/2014/main" id="{7D75AA54-8E1E-6549-81C9-DCB0E2787BA0}"/>
               </a:ext>
             </a:extLst>
           </p:cNvPr>
@@ -17828,258 +17858,7 @@
         </p:nvSpPr>
         <p:spPr bwMode="auto">
           <a:xfrm>
-            <a:off x="7888687" y="4697362"/>
-            <a:ext cx="2243137" cy="707886"/>
-          </a:xfrm>
-          <a:prstGeom prst="rect">
-            <a:avLst/>
-          </a:prstGeom>
-          <a:noFill/>
-          <a:ln>
-            <a:noFill/>
-          </a:ln>
-          <a:extLst>
-            <a:ext uri="{909E8E84-426E-40DD-AFC4-6F175D3DCCD1}">
-              <a14:hiddenFill xmlns:a14="http://schemas.microsoft.com/office/drawing/2010/main">
-                <a:solidFill>
-                  <a:srgbClr val="FFFFFF"/>
-                </a:solidFill>
-              </a14:hiddenFill>
-            </a:ext>
-            <a:ext uri="{91240B29-F687-4F45-9708-019B960494DF}">
-              <a14:hiddenLine xmlns:a14="http://schemas.microsoft.com/office/drawing/2010/main" w="9525">
-                <a:solidFill>
-                  <a:srgbClr val="000000"/>
-                </a:solidFill>
-                <a:miter lim="800000"/>
-                <a:headEnd/>
-                <a:tailEnd/>
-              </a14:hiddenLine>
-            </a:ext>
-          </a:extLst>
-        </p:spPr>
-        <p:txBody>
-          <a:bodyPr>
-            <a:spAutoFit/>
-          </a:bodyPr>
-          <a:lstStyle>
-            <a:lvl1pPr>
-              <a:defRPr>
-                <a:solidFill>
-                  <a:schemeClr val="tx1"/>
-                </a:solidFill>
-                <a:latin typeface="Calibri" panose="020F0502020204030204" pitchFamily="34" charset="0"/>
-              </a:defRPr>
-            </a:lvl1pPr>
-            <a:lvl2pPr marL="742950" indent="-285750">
-              <a:defRPr>
-                <a:solidFill>
-                  <a:schemeClr val="tx1"/>
-                </a:solidFill>
-                <a:latin typeface="Calibri" panose="020F0502020204030204" pitchFamily="34" charset="0"/>
-              </a:defRPr>
-            </a:lvl2pPr>
-            <a:lvl3pPr marL="1143000" indent="-228600">
-              <a:defRPr>
-                <a:solidFill>
-                  <a:schemeClr val="tx1"/>
-                </a:solidFill>
-                <a:latin typeface="Calibri" panose="020F0502020204030204" pitchFamily="34" charset="0"/>
-              </a:defRPr>
-            </a:lvl3pPr>
-            <a:lvl4pPr marL="1600200" indent="-228600">
-              <a:defRPr>
-                <a:solidFill>
-                  <a:schemeClr val="tx1"/>
-                </a:solidFill>
-                <a:latin typeface="Calibri" panose="020F0502020204030204" pitchFamily="34" charset="0"/>
-              </a:defRPr>
-            </a:lvl4pPr>
-            <a:lvl5pPr marL="2057400" indent="-228600">
-              <a:defRPr>
-                <a:solidFill>
-                  <a:schemeClr val="tx1"/>
-                </a:solidFill>
-                <a:latin typeface="Calibri" panose="020F0502020204030204" pitchFamily="34" charset="0"/>
-              </a:defRPr>
-            </a:lvl5pPr>
-            <a:lvl6pPr marL="2514600" indent="-228600" eaLnBrk="0" fontAlgn="base" hangingPunct="0">
-              <a:spcBef>
-                <a:spcPct val="0"/>
-              </a:spcBef>
-              <a:spcAft>
-                <a:spcPct val="0"/>
-              </a:spcAft>
-              <a:defRPr>
-                <a:solidFill>
-                  <a:schemeClr val="tx1"/>
-                </a:solidFill>
-                <a:latin typeface="Calibri" panose="020F0502020204030204" pitchFamily="34" charset="0"/>
-              </a:defRPr>
-            </a:lvl6pPr>
-            <a:lvl7pPr marL="2971800" indent="-228600" eaLnBrk="0" fontAlgn="base" hangingPunct="0">
-              <a:spcBef>
-                <a:spcPct val="0"/>
-              </a:spcBef>
-              <a:spcAft>
-                <a:spcPct val="0"/>
-              </a:spcAft>
-              <a:defRPr>
-                <a:solidFill>
-                  <a:schemeClr val="tx1"/>
-                </a:solidFill>
-                <a:latin typeface="Calibri" panose="020F0502020204030204" pitchFamily="34" charset="0"/>
-              </a:defRPr>
-            </a:lvl7pPr>
-            <a:lvl8pPr marL="3429000" indent="-228600" eaLnBrk="0" fontAlgn="base" hangingPunct="0">
-              <a:spcBef>
-                <a:spcPct val="0"/>
-              </a:spcBef>
-              <a:spcAft>
-                <a:spcPct val="0"/>
-              </a:spcAft>
-              <a:defRPr>
-                <a:solidFill>
-                  <a:schemeClr val="tx1"/>
-                </a:solidFill>
-                <a:latin typeface="Calibri" panose="020F0502020204030204" pitchFamily="34" charset="0"/>
-              </a:defRPr>
-            </a:lvl8pPr>
-            <a:lvl9pPr marL="3886200" indent="-228600" eaLnBrk="0" fontAlgn="base" hangingPunct="0">
-              <a:spcBef>
-                <a:spcPct val="0"/>
-              </a:spcBef>
-              <a:spcAft>
-                <a:spcPct val="0"/>
-              </a:spcAft>
-              <a:defRPr>
-                <a:solidFill>
-                  <a:schemeClr val="tx1"/>
-                </a:solidFill>
-                <a:latin typeface="Calibri" panose="020F0502020204030204" pitchFamily="34" charset="0"/>
-              </a:defRPr>
-            </a:lvl9pPr>
-          </a:lstStyle>
-          <a:p>
-            <a:pPr algn="ctr" eaLnBrk="1" hangingPunct="1"/>
-            <a:r>
-              <a:rPr lang="en-US" altLang="en-US" sz="1000" dirty="0">
-                <a:latin typeface="Arial" panose="020B0604020202020204" pitchFamily="34" charset="0"/>
-                <a:ea typeface="Amazon Ember" panose="020B0603020204020204" pitchFamily="34" charset="0"/>
-                <a:cs typeface="Arial" panose="020B0604020202020204" pitchFamily="34" charset="0"/>
-              </a:rPr>
-              <a:t>Amazon EBS</a:t>
-            </a:r>
-          </a:p>
-          <a:p>
-            <a:pPr algn="ctr" eaLnBrk="1" hangingPunct="1"/>
-            <a:r>
-              <a:rPr lang="en-US" altLang="en-US" sz="1000" dirty="0">
-                <a:latin typeface="Arial" panose="020B0604020202020204" pitchFamily="34" charset="0"/>
-                <a:ea typeface="Amazon Ember" panose="020B0603020204020204" pitchFamily="34" charset="0"/>
-                <a:cs typeface="Arial" panose="020B0604020202020204" pitchFamily="34" charset="0"/>
-              </a:rPr>
-              <a:t>Volumes</a:t>
-            </a:r>
-          </a:p>
-          <a:p>
-            <a:pPr algn="ctr" eaLnBrk="1" hangingPunct="1"/>
-            <a:r>
-              <a:rPr lang="en-US" altLang="en-US" sz="1000" dirty="0">
-                <a:latin typeface="Arial" panose="020B0604020202020204" pitchFamily="34" charset="0"/>
-                <a:ea typeface="Amazon Ember" panose="020B0603020204020204" pitchFamily="34" charset="0"/>
-                <a:cs typeface="Arial" panose="020B0604020202020204" pitchFamily="34" charset="0"/>
-              </a:rPr>
-              <a:t>gp2, st1, sc1</a:t>
-            </a:r>
-          </a:p>
-          <a:p>
-            <a:pPr algn="ctr" eaLnBrk="1" hangingPunct="1"/>
-            <a:endParaRPr lang="en-US" altLang="en-US" sz="1000" dirty="0">
-              <a:latin typeface="Arial" panose="020B0604020202020204" pitchFamily="34" charset="0"/>
-              <a:ea typeface="Amazon Ember" panose="020B0603020204020204" pitchFamily="34" charset="0"/>
-              <a:cs typeface="Arial" panose="020B0604020202020204" pitchFamily="34" charset="0"/>
-            </a:endParaRPr>
-          </a:p>
-        </p:txBody>
-      </p:sp>
-      <p:pic>
-        <p:nvPicPr>
-          <p:cNvPr id="99" name="Graphic 10">
-            <a:extLst>
-              <a:ext uri="{FF2B5EF4-FFF2-40B4-BE49-F238E27FC236}">
-                <a16:creationId xmlns:a16="http://schemas.microsoft.com/office/drawing/2014/main" id="{75214CD6-2F4C-5F44-975E-F9E1F4D1BEF9}"/>
-              </a:ext>
-            </a:extLst>
-          </p:cNvPr>
-          <p:cNvPicPr>
-            <a:picLocks noChangeAspect="1" noChangeArrowheads="1"/>
-          </p:cNvPicPr>
-          <p:nvPr/>
-        </p:nvPicPr>
-        <p:blipFill>
-          <a:blip r:embed="rId17">
-            <a:extLst>
-              <a:ext uri="{28A0092B-C50C-407E-A947-70E740481C1C}">
-                <a14:useLocalDpi xmlns:a14="http://schemas.microsoft.com/office/drawing/2010/main" val="0"/>
-              </a:ext>
-            </a:extLst>
-          </a:blip>
-          <a:srcRect/>
-          <a:stretch>
-            <a:fillRect/>
-          </a:stretch>
-        </p:blipFill>
-        <p:spPr bwMode="auto">
-          <a:xfrm>
-            <a:off x="8604594" y="2560402"/>
-            <a:ext cx="594360" cy="594360"/>
-          </a:xfrm>
-          <a:prstGeom prst="rect">
-            <a:avLst/>
-          </a:prstGeom>
-          <a:noFill/>
-          <a:ln>
-            <a:noFill/>
-          </a:ln>
-          <a:extLst>
-            <a:ext uri="{909E8E84-426E-40DD-AFC4-6F175D3DCCD1}">
-              <a14:hiddenFill xmlns:a14="http://schemas.microsoft.com/office/drawing/2010/main">
-                <a:solidFill>
-                  <a:srgbClr val="FFFFFF"/>
-                </a:solidFill>
-              </a14:hiddenFill>
-            </a:ext>
-            <a:ext uri="{91240B29-F687-4F45-9708-019B960494DF}">
-              <a14:hiddenLine xmlns:a14="http://schemas.microsoft.com/office/drawing/2010/main" w="9525">
-                <a:solidFill>
-                  <a:srgbClr val="000000"/>
-                </a:solidFill>
-                <a:miter lim="800000"/>
-                <a:headEnd/>
-                <a:tailEnd/>
-              </a14:hiddenLine>
-            </a:ext>
-          </a:extLst>
-        </p:spPr>
-      </p:pic>
-      <p:sp>
-        <p:nvSpPr>
-          <p:cNvPr id="100" name="TextBox 20">
-            <a:extLst>
-              <a:ext uri="{FF2B5EF4-FFF2-40B4-BE49-F238E27FC236}">
-                <a16:creationId xmlns:a16="http://schemas.microsoft.com/office/drawing/2014/main" id="{7D75AA54-8E1E-6549-81C9-DCB0E2787BA0}"/>
-              </a:ext>
-            </a:extLst>
-          </p:cNvPr>
-          <p:cNvSpPr txBox="1">
-            <a:spLocks noChangeArrowheads="1"/>
-          </p:cNvSpPr>
-          <p:nvPr/>
-        </p:nvSpPr>
-        <p:spPr bwMode="auto">
-          <a:xfrm>
-            <a:off x="7776648" y="3164485"/>
+            <a:off x="7776648" y="2738454"/>
             <a:ext cx="2292350" cy="553998"/>
           </a:xfrm>
           <a:prstGeom prst="rect">
@@ -18270,7 +18049,7 @@
         </p:nvSpPr>
         <p:spPr bwMode="auto">
           <a:xfrm>
-            <a:off x="5631302" y="3273691"/>
+            <a:off x="5631302" y="2754141"/>
             <a:ext cx="1115904" cy="553998"/>
           </a:xfrm>
           <a:prstGeom prst="rect">
@@ -18429,7 +18208,7 @@
         </p:nvCxnSpPr>
         <p:spPr bwMode="auto">
           <a:xfrm>
-            <a:off x="7595517" y="3775548"/>
+            <a:off x="7595517" y="3255998"/>
             <a:ext cx="1371600" cy="0"/>
           </a:xfrm>
           <a:prstGeom prst="straightConnector1">
@@ -18474,7 +18253,7 @@
         </p:nvCxnSpPr>
         <p:spPr bwMode="auto">
           <a:xfrm flipV="1">
-            <a:off x="7595517" y="3775548"/>
+            <a:off x="7595517" y="3255998"/>
             <a:ext cx="0" cy="112703"/>
           </a:xfrm>
           <a:prstGeom prst="straightConnector1">
@@ -18519,7 +18298,7 @@
         </p:nvCxnSpPr>
         <p:spPr bwMode="auto">
           <a:xfrm flipV="1">
-            <a:off x="8967117" y="3775548"/>
+            <a:off x="8967117" y="3255998"/>
             <a:ext cx="0" cy="112703"/>
           </a:xfrm>
           <a:prstGeom prst="straightConnector1">
@@ -18564,9 +18343,9 @@
           <p:nvPr/>
         </p:nvCxnSpPr>
         <p:spPr bwMode="auto">
-          <a:xfrm flipV="1">
-            <a:off x="7601534" y="701604"/>
-            <a:ext cx="314386" cy="4455"/>
+          <a:xfrm>
+            <a:off x="7622032" y="450867"/>
+            <a:ext cx="287538" cy="1353"/>
           </a:xfrm>
           <a:prstGeom prst="straightConnector1">
             <a:avLst/>
@@ -18610,9 +18389,9 @@
           <p:nvPr/>
         </p:nvCxnSpPr>
         <p:spPr bwMode="auto">
-          <a:xfrm flipH="1" flipV="1">
-            <a:off x="7601534" y="706059"/>
-            <a:ext cx="26848" cy="1857432"/>
+          <a:xfrm flipV="1">
+            <a:off x="7628382" y="450867"/>
+            <a:ext cx="0" cy="1696984"/>
           </a:xfrm>
           <a:prstGeom prst="straightConnector1">
             <a:avLst/>
@@ -18655,54 +18434,9 @@
           <p:nvPr/>
         </p:nvCxnSpPr>
         <p:spPr bwMode="auto">
-          <a:xfrm flipV="1">
-            <a:off x="8858125" y="702856"/>
-            <a:ext cx="314386" cy="4455"/>
-          </a:xfrm>
-          <a:prstGeom prst="straightConnector1">
-            <a:avLst/>
-          </a:prstGeom>
-          <a:ln w="12700">
-            <a:solidFill>
-              <a:srgbClr val="545B64"/>
-            </a:solidFill>
-            <a:headEnd type="none" w="med" len="sm"/>
-            <a:tailEnd type="none" w="med" len="sm"/>
-          </a:ln>
-        </p:spPr>
-        <p:style>
-          <a:lnRef idx="1">
-            <a:schemeClr val="accent1"/>
-          </a:lnRef>
-          <a:fillRef idx="0">
-            <a:schemeClr val="accent1"/>
-          </a:fillRef>
-          <a:effectRef idx="0">
-            <a:schemeClr val="accent1"/>
-          </a:effectRef>
-          <a:fontRef idx="minor">
-            <a:schemeClr val="tx1"/>
-          </a:fontRef>
-        </p:style>
-      </p:cxnSp>
-      <p:cxnSp>
-        <p:nvCxnSpPr>
-          <p:cNvPr id="109" name="Straight Arrow Connector 108">
-            <a:extLst>
-              <a:ext uri="{FF2B5EF4-FFF2-40B4-BE49-F238E27FC236}">
-                <a16:creationId xmlns:a16="http://schemas.microsoft.com/office/drawing/2014/main" id="{8ECD5480-5D9B-B64F-87A9-E7C18B01D518}"/>
-              </a:ext>
-            </a:extLst>
-          </p:cNvPr>
-          <p:cNvCxnSpPr>
-            <a:cxnSpLocks/>
-          </p:cNvCxnSpPr>
-          <p:nvPr/>
-        </p:nvCxnSpPr>
-        <p:spPr bwMode="auto">
-          <a:xfrm flipH="1" flipV="1">
-            <a:off x="8858125" y="707311"/>
-            <a:ext cx="26848" cy="1857432"/>
+          <a:xfrm>
+            <a:off x="8898630" y="453472"/>
+            <a:ext cx="273881" cy="1"/>
           </a:xfrm>
           <a:prstGeom prst="straightConnector1">
             <a:avLst/>
@@ -18747,101 +18481,9 @@
           <p:nvPr/>
         </p:nvCxnSpPr>
         <p:spPr bwMode="auto">
-          <a:xfrm flipV="1">
-            <a:off x="7937888" y="4397211"/>
-            <a:ext cx="752920" cy="7707"/>
-          </a:xfrm>
-          <a:prstGeom prst="straightConnector1">
-            <a:avLst/>
-          </a:prstGeom>
-          <a:ln w="12700">
-            <a:solidFill>
-              <a:srgbClr val="545B64"/>
-            </a:solidFill>
-            <a:headEnd type="none" w="med" len="sm"/>
-            <a:tailEnd type="none" w="med" len="sm"/>
-          </a:ln>
-        </p:spPr>
-        <p:style>
-          <a:lnRef idx="1">
-            <a:schemeClr val="accent1"/>
-          </a:lnRef>
-          <a:fillRef idx="0">
-            <a:schemeClr val="accent1"/>
-          </a:fillRef>
-          <a:effectRef idx="0">
-            <a:schemeClr val="accent1"/>
-          </a:effectRef>
-          <a:fontRef idx="minor">
-            <a:schemeClr val="tx1"/>
-          </a:fontRef>
-        </p:style>
-      </p:cxnSp>
-      <p:cxnSp>
-        <p:nvCxnSpPr>
-          <p:cNvPr id="116" name="Straight Arrow Connector 115">
-            <a:extLst>
-              <a:ext uri="{FF2B5EF4-FFF2-40B4-BE49-F238E27FC236}">
-                <a16:creationId xmlns:a16="http://schemas.microsoft.com/office/drawing/2014/main" id="{2B269E94-FEB4-B641-B21B-109D0ECC4A2D}"/>
-              </a:ext>
-            </a:extLst>
-          </p:cNvPr>
-          <p:cNvCxnSpPr>
-            <a:cxnSpLocks/>
-            <a:stCxn id="94" idx="3"/>
-            <a:endCxn id="67" idx="1"/>
-          </p:cNvCxnSpPr>
-          <p:nvPr/>
-        </p:nvCxnSpPr>
-        <p:spPr bwMode="auto">
-          <a:xfrm>
-            <a:off x="2836418" y="4411079"/>
-            <a:ext cx="1685690" cy="1064"/>
-          </a:xfrm>
-          <a:prstGeom prst="straightConnector1">
-            <a:avLst/>
-          </a:prstGeom>
-          <a:ln w="12700">
-            <a:solidFill>
-              <a:srgbClr val="545B64"/>
-            </a:solidFill>
-            <a:headEnd type="none" w="med" len="sm"/>
-            <a:tailEnd type="none" w="med" len="sm"/>
-          </a:ln>
-        </p:spPr>
-        <p:style>
-          <a:lnRef idx="1">
-            <a:schemeClr val="accent1"/>
-          </a:lnRef>
-          <a:fillRef idx="0">
-            <a:schemeClr val="accent1"/>
-          </a:fillRef>
-          <a:effectRef idx="0">
-            <a:schemeClr val="accent1"/>
-          </a:effectRef>
-          <a:fontRef idx="minor">
-            <a:schemeClr val="tx1"/>
-          </a:fontRef>
-        </p:style>
-      </p:cxnSp>
-      <p:cxnSp>
-        <p:nvCxnSpPr>
-          <p:cNvPr id="117" name="Straight Arrow Connector 116">
-            <a:extLst>
-              <a:ext uri="{FF2B5EF4-FFF2-40B4-BE49-F238E27FC236}">
-                <a16:creationId xmlns:a16="http://schemas.microsoft.com/office/drawing/2014/main" id="{605F544E-8B7D-A54A-A0E5-4F635879E8E4}"/>
-              </a:ext>
-            </a:extLst>
-          </p:cNvPr>
-          <p:cNvCxnSpPr>
-            <a:cxnSpLocks/>
-          </p:cNvCxnSpPr>
-          <p:nvPr/>
-        </p:nvCxnSpPr>
-        <p:spPr bwMode="auto">
-          <a:xfrm>
-            <a:off x="4006850" y="3546948"/>
-            <a:ext cx="1412015" cy="0"/>
+          <a:xfrm>
+            <a:off x="7937888" y="3729503"/>
+            <a:ext cx="752920" cy="2684"/>
           </a:xfrm>
           <a:prstGeom prst="straightConnector1">
             <a:avLst/>
@@ -18880,59 +18522,15 @@
           </p:cNvPr>
           <p:cNvCxnSpPr>
             <a:cxnSpLocks/>
+            <a:stCxn id="75" idx="3"/>
             <a:endCxn id="42" idx="1"/>
           </p:cNvCxnSpPr>
           <p:nvPr/>
         </p:nvCxnSpPr>
         <p:spPr bwMode="auto">
           <a:xfrm>
-            <a:off x="5418865" y="4397211"/>
-            <a:ext cx="1924663" cy="7707"/>
-          </a:xfrm>
-          <a:prstGeom prst="straightConnector1">
-            <a:avLst/>
-          </a:prstGeom>
-          <a:ln w="12700">
-            <a:solidFill>
-              <a:srgbClr val="545B64"/>
-            </a:solidFill>
-            <a:headEnd type="none" w="med" len="sm"/>
-            <a:tailEnd type="none" w="med" len="sm"/>
-          </a:ln>
-        </p:spPr>
-        <p:style>
-          <a:lnRef idx="1">
-            <a:schemeClr val="accent1"/>
-          </a:lnRef>
-          <a:fillRef idx="0">
-            <a:schemeClr val="accent1"/>
-          </a:fillRef>
-          <a:effectRef idx="0">
-            <a:schemeClr val="accent1"/>
-          </a:effectRef>
-          <a:fontRef idx="minor">
-            <a:schemeClr val="tx1"/>
-          </a:fontRef>
-        </p:style>
-      </p:cxnSp>
-      <p:cxnSp>
-        <p:nvCxnSpPr>
-          <p:cNvPr id="119" name="Straight Arrow Connector 118">
-            <a:extLst>
-              <a:ext uri="{FF2B5EF4-FFF2-40B4-BE49-F238E27FC236}">
-                <a16:creationId xmlns:a16="http://schemas.microsoft.com/office/drawing/2014/main" id="{F45B05A8-006A-C74C-898E-47434EA3C111}"/>
-              </a:ext>
-            </a:extLst>
-          </p:cNvPr>
-          <p:cNvCxnSpPr>
-            <a:cxnSpLocks/>
-          </p:cNvCxnSpPr>
-          <p:nvPr/>
-        </p:nvCxnSpPr>
-        <p:spPr bwMode="auto">
-          <a:xfrm>
-            <a:off x="5418865" y="3551733"/>
-            <a:ext cx="0" cy="843758"/>
+            <a:off x="3996497" y="3728266"/>
+            <a:ext cx="3347031" cy="1237"/>
           </a:xfrm>
           <a:prstGeom prst="straightConnector1">
             <a:avLst/>
@@ -18976,7 +18574,7 @@
         </p:nvCxnSpPr>
         <p:spPr bwMode="auto">
           <a:xfrm>
-            <a:off x="6224363" y="4537163"/>
+            <a:off x="6224363" y="3861748"/>
             <a:ext cx="1108710" cy="0"/>
           </a:xfrm>
           <a:prstGeom prst="straightConnector1">
@@ -19021,7 +18619,7 @@
         </p:nvCxnSpPr>
         <p:spPr bwMode="auto">
           <a:xfrm flipV="1">
-            <a:off x="6223447" y="4542011"/>
+            <a:off x="6223447" y="3866596"/>
             <a:ext cx="0" cy="112703"/>
           </a:xfrm>
           <a:prstGeom prst="straightConnector1">
@@ -19062,13 +18660,14 @@
           <p:cNvCxnSpPr>
             <a:cxnSpLocks/>
             <a:stCxn id="95" idx="3"/>
+            <a:endCxn id="75" idx="1"/>
           </p:cNvCxnSpPr>
           <p:nvPr/>
         </p:nvCxnSpPr>
         <p:spPr bwMode="auto">
           <a:xfrm>
-            <a:off x="2834666" y="3540019"/>
-            <a:ext cx="714984" cy="6929"/>
+            <a:off x="2834666" y="3727054"/>
+            <a:ext cx="704631" cy="1212"/>
           </a:xfrm>
           <a:prstGeom prst="straightConnector1">
             <a:avLst/>
@@ -19096,26 +18695,1598 @@
           </a:fontRef>
         </p:style>
       </p:cxnSp>
+      <p:sp>
+        <p:nvSpPr>
+          <p:cNvPr id="124" name="TextBox 123">
+            <a:extLst>
+              <a:ext uri="{FF2B5EF4-FFF2-40B4-BE49-F238E27FC236}">
+                <a16:creationId xmlns:a16="http://schemas.microsoft.com/office/drawing/2014/main" id="{4A9E0648-F1A3-5D4E-BD75-44452334C8E4}"/>
+              </a:ext>
+            </a:extLst>
+          </p:cNvPr>
+          <p:cNvSpPr txBox="1"/>
+          <p:nvPr/>
+        </p:nvSpPr>
+        <p:spPr>
+          <a:xfrm>
+            <a:off x="5670985" y="3510038"/>
+            <a:ext cx="1829912" cy="246221"/>
+          </a:xfrm>
+          <a:prstGeom prst="rect">
+            <a:avLst/>
+          </a:prstGeom>
+          <a:noFill/>
+        </p:spPr>
+        <p:txBody>
+          <a:bodyPr wrap="square" rtlCol="0" anchor="t">
+            <a:spAutoFit/>
+          </a:bodyPr>
+          <a:lstStyle/>
+          <a:p>
+            <a:pPr algn="ctr"/>
+            <a:r>
+              <a:rPr lang="en-US" sz="1000" i="1" dirty="0" err="1">
+                <a:latin typeface="Arial" panose="020B0604020202020204" pitchFamily="34" charset="0"/>
+                <a:cs typeface="Arial" panose="020B0604020202020204" pitchFamily="34" charset="0"/>
+              </a:rPr>
+              <a:t>Qumulo</a:t>
+            </a:r>
+            <a:r>
+              <a:rPr lang="en-US" sz="1000" i="1" dirty="0">
+                <a:latin typeface="Arial" panose="020B0604020202020204" pitchFamily="34" charset="0"/>
+                <a:cs typeface="Arial" panose="020B0604020202020204" pitchFamily="34" charset="0"/>
+              </a:rPr>
+              <a:t> Management</a:t>
+            </a:r>
+          </a:p>
+        </p:txBody>
+      </p:sp>
+      <p:pic>
+        <p:nvPicPr>
+          <p:cNvPr id="69" name="Graphic 108">
+            <a:extLst>
+              <a:ext uri="{FF2B5EF4-FFF2-40B4-BE49-F238E27FC236}">
+                <a16:creationId xmlns:a16="http://schemas.microsoft.com/office/drawing/2014/main" id="{4BF4CAF5-3CDA-DF41-B927-A6FAFA35A347}"/>
+              </a:ext>
+            </a:extLst>
+          </p:cNvPr>
+          <p:cNvPicPr>
+            <a:picLocks noChangeAspect="1" noChangeArrowheads="1"/>
+          </p:cNvPicPr>
+          <p:nvPr/>
+        </p:nvPicPr>
+        <p:blipFill>
+          <a:blip r:embed="rId22">
+            <a:extLst>
+              <a:ext uri="{96DAC541-7B7A-43D3-8B79-37D633B846F1}">
+                <asvg:svgBlip xmlns:asvg="http://schemas.microsoft.com/office/drawing/2016/SVG/main" r:embed="rId23"/>
+              </a:ext>
+            </a:extLst>
+          </a:blip>
+          <a:srcRect/>
+          <a:stretch/>
+        </p:blipFill>
+        <p:spPr bwMode="auto">
+          <a:xfrm>
+            <a:off x="5973313" y="3948827"/>
+            <a:ext cx="457200" cy="457200"/>
+          </a:xfrm>
+          <a:prstGeom prst="rect">
+            <a:avLst/>
+          </a:prstGeom>
+          <a:noFill/>
+          <a:ln>
+            <a:noFill/>
+          </a:ln>
+          <a:extLst>
+            <a:ext uri="{909E8E84-426E-40DD-AFC4-6F175D3DCCD1}">
+              <a14:hiddenFill xmlns:a14="http://schemas.microsoft.com/office/drawing/2010/main">
+                <a:solidFill>
+                  <a:srgbClr val="FFFFFF"/>
+                </a:solidFill>
+              </a14:hiddenFill>
+            </a:ext>
+            <a:ext uri="{91240B29-F687-4F45-9708-019B960494DF}">
+              <a14:hiddenLine xmlns:a14="http://schemas.microsoft.com/office/drawing/2010/main" w="9525">
+                <a:solidFill>
+                  <a:srgbClr val="000000"/>
+                </a:solidFill>
+                <a:miter lim="800000"/>
+                <a:headEnd/>
+                <a:tailEnd/>
+              </a14:hiddenLine>
+            </a:ext>
+          </a:extLst>
+        </p:spPr>
+      </p:pic>
+      <p:pic>
+        <p:nvPicPr>
+          <p:cNvPr id="70" name="Graphic 15">
+            <a:extLst>
+              <a:ext uri="{FF2B5EF4-FFF2-40B4-BE49-F238E27FC236}">
+                <a16:creationId xmlns:a16="http://schemas.microsoft.com/office/drawing/2014/main" id="{DCBF1440-0336-A642-B2FA-274B29062FFC}"/>
+              </a:ext>
+            </a:extLst>
+          </p:cNvPr>
+          <p:cNvPicPr>
+            <a:picLocks noChangeAspect="1" noChangeArrowheads="1"/>
+          </p:cNvPicPr>
+          <p:nvPr/>
+        </p:nvPicPr>
+        <p:blipFill>
+          <a:blip r:embed="rId24">
+            <a:extLst>
+              <a:ext uri="{28A0092B-C50C-407E-A947-70E740481C1C}">
+                <a14:useLocalDpi xmlns:a14="http://schemas.microsoft.com/office/drawing/2010/main" val="0"/>
+              </a:ext>
+            </a:extLst>
+          </a:blip>
+          <a:srcRect/>
+          <a:stretch>
+            <a:fillRect/>
+          </a:stretch>
+        </p:blipFill>
+        <p:spPr bwMode="auto">
+          <a:xfrm>
+            <a:off x="5813405" y="159495"/>
+            <a:ext cx="591033" cy="591033"/>
+          </a:xfrm>
+          <a:prstGeom prst="rect">
+            <a:avLst/>
+          </a:prstGeom>
+          <a:noFill/>
+          <a:ln>
+            <a:noFill/>
+          </a:ln>
+          <a:extLst>
+            <a:ext uri="{909E8E84-426E-40DD-AFC4-6F175D3DCCD1}">
+              <a14:hiddenFill xmlns:a14="http://schemas.microsoft.com/office/drawing/2010/main">
+                <a:solidFill>
+                  <a:srgbClr val="FFFFFF"/>
+                </a:solidFill>
+              </a14:hiddenFill>
+            </a:ext>
+            <a:ext uri="{91240B29-F687-4F45-9708-019B960494DF}">
+              <a14:hiddenLine xmlns:a14="http://schemas.microsoft.com/office/drawing/2010/main" w="9525">
+                <a:solidFill>
+                  <a:srgbClr val="000000"/>
+                </a:solidFill>
+                <a:miter lim="800000"/>
+                <a:headEnd/>
+                <a:tailEnd/>
+              </a14:hiddenLine>
+            </a:ext>
+          </a:extLst>
+        </p:spPr>
+      </p:pic>
+      <p:sp>
+        <p:nvSpPr>
+          <p:cNvPr id="71" name="TextBox 11">
+            <a:extLst>
+              <a:ext uri="{FF2B5EF4-FFF2-40B4-BE49-F238E27FC236}">
+                <a16:creationId xmlns:a16="http://schemas.microsoft.com/office/drawing/2014/main" id="{961E1DE9-E2D2-6844-8BEE-C33EBA7F183F}"/>
+              </a:ext>
+            </a:extLst>
+          </p:cNvPr>
+          <p:cNvSpPr txBox="1">
+            <a:spLocks noChangeArrowheads="1"/>
+          </p:cNvSpPr>
+          <p:nvPr/>
+        </p:nvSpPr>
+        <p:spPr bwMode="auto">
+          <a:xfrm>
+            <a:off x="5232704" y="740694"/>
+            <a:ext cx="1778027" cy="400110"/>
+          </a:xfrm>
+          <a:prstGeom prst="rect">
+            <a:avLst/>
+          </a:prstGeom>
+          <a:noFill/>
+          <a:ln>
+            <a:noFill/>
+          </a:ln>
+          <a:extLst>
+            <a:ext uri="{909E8E84-426E-40DD-AFC4-6F175D3DCCD1}">
+              <a14:hiddenFill xmlns:a14="http://schemas.microsoft.com/office/drawing/2010/main">
+                <a:solidFill>
+                  <a:srgbClr val="FFFFFF"/>
+                </a:solidFill>
+              </a14:hiddenFill>
+            </a:ext>
+            <a:ext uri="{91240B29-F687-4F45-9708-019B960494DF}">
+              <a14:hiddenLine xmlns:a14="http://schemas.microsoft.com/office/drawing/2010/main" w="9525">
+                <a:solidFill>
+                  <a:srgbClr val="000000"/>
+                </a:solidFill>
+                <a:miter lim="800000"/>
+                <a:headEnd/>
+                <a:tailEnd/>
+              </a14:hiddenLine>
+            </a:ext>
+          </a:extLst>
+        </p:spPr>
+        <p:txBody>
+          <a:bodyPr wrap="square">
+            <a:spAutoFit/>
+          </a:bodyPr>
+          <a:lstStyle>
+            <a:lvl1pPr>
+              <a:defRPr>
+                <a:solidFill>
+                  <a:schemeClr val="tx1"/>
+                </a:solidFill>
+                <a:latin typeface="Calibri" panose="020F0502020204030204" pitchFamily="34" charset="0"/>
+              </a:defRPr>
+            </a:lvl1pPr>
+            <a:lvl2pPr marL="742950" indent="-285750">
+              <a:defRPr>
+                <a:solidFill>
+                  <a:schemeClr val="tx1"/>
+                </a:solidFill>
+                <a:latin typeface="Calibri" panose="020F0502020204030204" pitchFamily="34" charset="0"/>
+              </a:defRPr>
+            </a:lvl2pPr>
+            <a:lvl3pPr marL="1143000" indent="-228600">
+              <a:defRPr>
+                <a:solidFill>
+                  <a:schemeClr val="tx1"/>
+                </a:solidFill>
+                <a:latin typeface="Calibri" panose="020F0502020204030204" pitchFamily="34" charset="0"/>
+              </a:defRPr>
+            </a:lvl3pPr>
+            <a:lvl4pPr marL="1600200" indent="-228600">
+              <a:defRPr>
+                <a:solidFill>
+                  <a:schemeClr val="tx1"/>
+                </a:solidFill>
+                <a:latin typeface="Calibri" panose="020F0502020204030204" pitchFamily="34" charset="0"/>
+              </a:defRPr>
+            </a:lvl4pPr>
+            <a:lvl5pPr marL="2057400" indent="-228600">
+              <a:defRPr>
+                <a:solidFill>
+                  <a:schemeClr val="tx1"/>
+                </a:solidFill>
+                <a:latin typeface="Calibri" panose="020F0502020204030204" pitchFamily="34" charset="0"/>
+              </a:defRPr>
+            </a:lvl5pPr>
+            <a:lvl6pPr marL="2514600" indent="-228600" eaLnBrk="0" fontAlgn="base" hangingPunct="0">
+              <a:spcBef>
+                <a:spcPct val="0"/>
+              </a:spcBef>
+              <a:spcAft>
+                <a:spcPct val="0"/>
+              </a:spcAft>
+              <a:defRPr>
+                <a:solidFill>
+                  <a:schemeClr val="tx1"/>
+                </a:solidFill>
+                <a:latin typeface="Calibri" panose="020F0502020204030204" pitchFamily="34" charset="0"/>
+              </a:defRPr>
+            </a:lvl6pPr>
+            <a:lvl7pPr marL="2971800" indent="-228600" eaLnBrk="0" fontAlgn="base" hangingPunct="0">
+              <a:spcBef>
+                <a:spcPct val="0"/>
+              </a:spcBef>
+              <a:spcAft>
+                <a:spcPct val="0"/>
+              </a:spcAft>
+              <a:defRPr>
+                <a:solidFill>
+                  <a:schemeClr val="tx1"/>
+                </a:solidFill>
+                <a:latin typeface="Calibri" panose="020F0502020204030204" pitchFamily="34" charset="0"/>
+              </a:defRPr>
+            </a:lvl7pPr>
+            <a:lvl8pPr marL="3429000" indent="-228600" eaLnBrk="0" fontAlgn="base" hangingPunct="0">
+              <a:spcBef>
+                <a:spcPct val="0"/>
+              </a:spcBef>
+              <a:spcAft>
+                <a:spcPct val="0"/>
+              </a:spcAft>
+              <a:defRPr>
+                <a:solidFill>
+                  <a:schemeClr val="tx1"/>
+                </a:solidFill>
+                <a:latin typeface="Calibri" panose="020F0502020204030204" pitchFamily="34" charset="0"/>
+              </a:defRPr>
+            </a:lvl8pPr>
+            <a:lvl9pPr marL="3886200" indent="-228600" eaLnBrk="0" fontAlgn="base" hangingPunct="0">
+              <a:spcBef>
+                <a:spcPct val="0"/>
+              </a:spcBef>
+              <a:spcAft>
+                <a:spcPct val="0"/>
+              </a:spcAft>
+              <a:defRPr>
+                <a:solidFill>
+                  <a:schemeClr val="tx1"/>
+                </a:solidFill>
+                <a:latin typeface="Calibri" panose="020F0502020204030204" pitchFamily="34" charset="0"/>
+              </a:defRPr>
+            </a:lvl9pPr>
+          </a:lstStyle>
+          <a:p>
+            <a:pPr algn="ctr" eaLnBrk="1" hangingPunct="1"/>
+            <a:r>
+              <a:rPr lang="en-US" altLang="en-US" sz="1000" dirty="0">
+                <a:latin typeface="Arial" panose="020B0604020202020204" pitchFamily="34" charset="0"/>
+                <a:ea typeface="Amazon Ember" panose="020B0603020204020204" pitchFamily="34" charset="0"/>
+                <a:cs typeface="Arial" panose="020B0604020202020204" pitchFamily="34" charset="0"/>
+              </a:rPr>
+              <a:t>AWS Systems </a:t>
+            </a:r>
+          </a:p>
+          <a:p>
+            <a:pPr algn="ctr" eaLnBrk="1" hangingPunct="1"/>
+            <a:r>
+              <a:rPr lang="en-US" altLang="en-US" sz="1000" dirty="0">
+                <a:latin typeface="Arial" panose="020B0604020202020204" pitchFamily="34" charset="0"/>
+                <a:ea typeface="Amazon Ember" panose="020B0603020204020204" pitchFamily="34" charset="0"/>
+                <a:cs typeface="Arial" panose="020B0604020202020204" pitchFamily="34" charset="0"/>
+              </a:rPr>
+              <a:t>Manager</a:t>
+            </a:r>
+          </a:p>
+        </p:txBody>
+      </p:sp>
+      <p:pic>
+        <p:nvPicPr>
+          <p:cNvPr id="74" name="Graphic 21">
+            <a:extLst>
+              <a:ext uri="{FF2B5EF4-FFF2-40B4-BE49-F238E27FC236}">
+                <a16:creationId xmlns:a16="http://schemas.microsoft.com/office/drawing/2014/main" id="{D1EC144A-6827-1841-9B41-65E7AD840BAC}"/>
+              </a:ext>
+            </a:extLst>
+          </p:cNvPr>
+          <p:cNvPicPr>
+            <a:picLocks noChangeAspect="1" noChangeArrowheads="1"/>
+          </p:cNvPicPr>
+          <p:nvPr/>
+        </p:nvPicPr>
+        <p:blipFill>
+          <a:blip r:embed="rId25">
+            <a:extLst>
+              <a:ext uri="{28A0092B-C50C-407E-A947-70E740481C1C}">
+                <a14:useLocalDpi xmlns:a14="http://schemas.microsoft.com/office/drawing/2010/main" val="0"/>
+              </a:ext>
+            </a:extLst>
+          </a:blip>
+          <a:srcRect/>
+          <a:stretch>
+            <a:fillRect/>
+          </a:stretch>
+        </p:blipFill>
+        <p:spPr bwMode="auto">
+          <a:xfrm>
+            <a:off x="5893742" y="2170893"/>
+            <a:ext cx="594360" cy="594360"/>
+          </a:xfrm>
+          <a:prstGeom prst="rect">
+            <a:avLst/>
+          </a:prstGeom>
+          <a:noFill/>
+          <a:ln>
+            <a:noFill/>
+          </a:ln>
+          <a:extLst>
+            <a:ext uri="{909E8E84-426E-40DD-AFC4-6F175D3DCCD1}">
+              <a14:hiddenFill xmlns:a14="http://schemas.microsoft.com/office/drawing/2010/main">
+                <a:solidFill>
+                  <a:srgbClr val="FFFFFF"/>
+                </a:solidFill>
+              </a14:hiddenFill>
+            </a:ext>
+            <a:ext uri="{91240B29-F687-4F45-9708-019B960494DF}">
+              <a14:hiddenLine xmlns:a14="http://schemas.microsoft.com/office/drawing/2010/main" w="9525">
+                <a:solidFill>
+                  <a:srgbClr val="000000"/>
+                </a:solidFill>
+                <a:miter lim="800000"/>
+                <a:headEnd/>
+                <a:tailEnd/>
+              </a14:hiddenLine>
+            </a:ext>
+          </a:extLst>
+        </p:spPr>
+      </p:pic>
+      <p:pic>
+        <p:nvPicPr>
+          <p:cNvPr id="75" name="Graphic 24">
+            <a:extLst>
+              <a:ext uri="{FF2B5EF4-FFF2-40B4-BE49-F238E27FC236}">
+                <a16:creationId xmlns:a16="http://schemas.microsoft.com/office/drawing/2014/main" id="{5D5161E4-FC4F-544A-B592-99AE2D2256FD}"/>
+              </a:ext>
+            </a:extLst>
+          </p:cNvPr>
+          <p:cNvPicPr>
+            <a:picLocks noChangeAspect="1" noChangeArrowheads="1"/>
+          </p:cNvPicPr>
+          <p:nvPr/>
+        </p:nvPicPr>
+        <p:blipFill>
+          <a:blip r:embed="rId26">
+            <a:extLst>
+              <a:ext uri="{28A0092B-C50C-407E-A947-70E740481C1C}">
+                <a14:useLocalDpi xmlns:a14="http://schemas.microsoft.com/office/drawing/2010/main" val="0"/>
+              </a:ext>
+            </a:extLst>
+          </a:blip>
+          <a:srcRect/>
+          <a:stretch>
+            <a:fillRect/>
+          </a:stretch>
+        </p:blipFill>
+        <p:spPr bwMode="auto">
+          <a:xfrm>
+            <a:off x="3539297" y="3499666"/>
+            <a:ext cx="457200" cy="457200"/>
+          </a:xfrm>
+          <a:prstGeom prst="rect">
+            <a:avLst/>
+          </a:prstGeom>
+          <a:noFill/>
+          <a:ln>
+            <a:noFill/>
+          </a:ln>
+          <a:extLst>
+            <a:ext uri="{909E8E84-426E-40DD-AFC4-6F175D3DCCD1}">
+              <a14:hiddenFill xmlns:a14="http://schemas.microsoft.com/office/drawing/2010/main">
+                <a:solidFill>
+                  <a:srgbClr val="FFFFFF"/>
+                </a:solidFill>
+              </a14:hiddenFill>
+            </a:ext>
+            <a:ext uri="{91240B29-F687-4F45-9708-019B960494DF}">
+              <a14:hiddenLine xmlns:a14="http://schemas.microsoft.com/office/drawing/2010/main" w="9525">
+                <a:solidFill>
+                  <a:srgbClr val="000000"/>
+                </a:solidFill>
+                <a:miter lim="800000"/>
+                <a:headEnd/>
+                <a:tailEnd/>
+              </a14:hiddenLine>
+            </a:ext>
+          </a:extLst>
+        </p:spPr>
+      </p:pic>
+      <p:sp>
+        <p:nvSpPr>
+          <p:cNvPr id="76" name="TextBox 22">
+            <a:extLst>
+              <a:ext uri="{FF2B5EF4-FFF2-40B4-BE49-F238E27FC236}">
+                <a16:creationId xmlns:a16="http://schemas.microsoft.com/office/drawing/2014/main" id="{F05CA681-D745-ED40-A2F0-F68C61F65903}"/>
+              </a:ext>
+            </a:extLst>
+          </p:cNvPr>
+          <p:cNvSpPr txBox="1">
+            <a:spLocks noChangeArrowheads="1"/>
+          </p:cNvSpPr>
+          <p:nvPr/>
+        </p:nvSpPr>
+        <p:spPr bwMode="auto">
+          <a:xfrm>
+            <a:off x="3085041" y="3903418"/>
+            <a:ext cx="1339850" cy="246221"/>
+          </a:xfrm>
+          <a:prstGeom prst="rect">
+            <a:avLst/>
+          </a:prstGeom>
+          <a:noFill/>
+          <a:ln>
+            <a:noFill/>
+          </a:ln>
+          <a:extLst>
+            <a:ext uri="{909E8E84-426E-40DD-AFC4-6F175D3DCCD1}">
+              <a14:hiddenFill xmlns:a14="http://schemas.microsoft.com/office/drawing/2010/main">
+                <a:solidFill>
+                  <a:srgbClr val="FFFFFF"/>
+                </a:solidFill>
+              </a14:hiddenFill>
+            </a:ext>
+            <a:ext uri="{91240B29-F687-4F45-9708-019B960494DF}">
+              <a14:hiddenLine xmlns:a14="http://schemas.microsoft.com/office/drawing/2010/main" w="9525">
+                <a:solidFill>
+                  <a:srgbClr val="000000"/>
+                </a:solidFill>
+                <a:miter lim="800000"/>
+                <a:headEnd/>
+                <a:tailEnd/>
+              </a14:hiddenLine>
+            </a:ext>
+          </a:extLst>
+        </p:spPr>
+        <p:style>
+          <a:lnRef idx="0">
+            <a:scrgbClr r="0" g="0" b="0"/>
+          </a:lnRef>
+          <a:fillRef idx="0">
+            <a:scrgbClr r="0" g="0" b="0"/>
+          </a:fillRef>
+          <a:effectRef idx="0">
+            <a:scrgbClr r="0" g="0" b="0"/>
+          </a:effectRef>
+          <a:fontRef idx="major"/>
+        </p:style>
+        <p:txBody>
+          <a:bodyPr wrap="square">
+            <a:spAutoFit/>
+          </a:bodyPr>
+          <a:lstStyle>
+            <a:lvl1pPr>
+              <a:defRPr>
+                <a:latin typeface="+mj-lt"/>
+                <a:ea typeface="+mj-ea"/>
+                <a:cs typeface="+mj-cs"/>
+              </a:defRPr>
+            </a:lvl1pPr>
+            <a:lvl2pPr>
+              <a:defRPr>
+                <a:latin typeface="+mj-lt"/>
+                <a:ea typeface="+mj-ea"/>
+                <a:cs typeface="+mj-cs"/>
+              </a:defRPr>
+            </a:lvl2pPr>
+            <a:lvl3pPr>
+              <a:defRPr>
+                <a:latin typeface="+mj-lt"/>
+                <a:ea typeface="+mj-ea"/>
+                <a:cs typeface="+mj-cs"/>
+              </a:defRPr>
+            </a:lvl3pPr>
+            <a:lvl4pPr>
+              <a:defRPr>
+                <a:latin typeface="+mj-lt"/>
+                <a:ea typeface="+mj-ea"/>
+                <a:cs typeface="+mj-cs"/>
+              </a:defRPr>
+            </a:lvl4pPr>
+            <a:lvl5pPr>
+              <a:defRPr>
+                <a:latin typeface="+mj-lt"/>
+                <a:ea typeface="+mj-ea"/>
+                <a:cs typeface="+mj-cs"/>
+              </a:defRPr>
+            </a:lvl5pPr>
+            <a:lvl6pPr>
+              <a:defRPr>
+                <a:latin typeface="+mj-lt"/>
+                <a:ea typeface="+mj-ea"/>
+                <a:cs typeface="+mj-cs"/>
+              </a:defRPr>
+            </a:lvl6pPr>
+            <a:lvl7pPr>
+              <a:defRPr>
+                <a:latin typeface="+mj-lt"/>
+                <a:ea typeface="+mj-ea"/>
+                <a:cs typeface="+mj-cs"/>
+              </a:defRPr>
+            </a:lvl7pPr>
+            <a:lvl8pPr>
+              <a:defRPr>
+                <a:latin typeface="+mj-lt"/>
+                <a:ea typeface="+mj-ea"/>
+                <a:cs typeface="+mj-cs"/>
+              </a:defRPr>
+            </a:lvl8pPr>
+            <a:lvl9pPr>
+              <a:defRPr>
+                <a:latin typeface="+mj-lt"/>
+                <a:ea typeface="+mj-ea"/>
+                <a:cs typeface="+mj-cs"/>
+              </a:defRPr>
+            </a:lvl9pPr>
+          </a:lstStyle>
+          <a:p>
+            <a:pPr algn="ctr" eaLnBrk="1" hangingPunct="1"/>
+            <a:r>
+              <a:rPr lang="en-US" altLang="en-US" sz="1000" dirty="0">
+                <a:latin typeface="Arial" panose="020B0604020202020204" pitchFamily="34" charset="0"/>
+                <a:ea typeface="Amazon Ember" panose="020B0603020204020204" pitchFamily="34" charset="0"/>
+                <a:cs typeface="Arial" panose="020B0604020202020204" pitchFamily="34" charset="0"/>
+              </a:rPr>
+              <a:t>Optional: NLB</a:t>
+            </a:r>
+          </a:p>
+        </p:txBody>
+      </p:sp>
+      <p:pic>
+        <p:nvPicPr>
+          <p:cNvPr id="77" name="Graphic 19">
+            <a:extLst>
+              <a:ext uri="{FF2B5EF4-FFF2-40B4-BE49-F238E27FC236}">
+                <a16:creationId xmlns:a16="http://schemas.microsoft.com/office/drawing/2014/main" id="{A9F82018-528E-5A45-AB4A-6EE4E6014E71}"/>
+              </a:ext>
+            </a:extLst>
+          </p:cNvPr>
+          <p:cNvPicPr>
+            <a:picLocks noChangeAspect="1" noChangeArrowheads="1"/>
+          </p:cNvPicPr>
+          <p:nvPr/>
+        </p:nvPicPr>
+        <p:blipFill>
+          <a:blip r:embed="rId27">
+            <a:extLst>
+              <a:ext uri="{28A0092B-C50C-407E-A947-70E740481C1C}">
+                <a14:useLocalDpi xmlns:a14="http://schemas.microsoft.com/office/drawing/2010/main" val="0"/>
+              </a:ext>
+            </a:extLst>
+          </a:blip>
+          <a:srcRect/>
+          <a:stretch>
+            <a:fillRect/>
+          </a:stretch>
+        </p:blipFill>
+        <p:spPr bwMode="auto">
+          <a:xfrm>
+            <a:off x="4975740" y="166739"/>
+            <a:ext cx="595978" cy="595978"/>
+          </a:xfrm>
+          <a:prstGeom prst="rect">
+            <a:avLst/>
+          </a:prstGeom>
+          <a:noFill/>
+          <a:ln>
+            <a:noFill/>
+          </a:ln>
+          <a:extLst>
+            <a:ext uri="{909E8E84-426E-40DD-AFC4-6F175D3DCCD1}">
+              <a14:hiddenFill xmlns:a14="http://schemas.microsoft.com/office/drawing/2010/main">
+                <a:solidFill>
+                  <a:srgbClr val="FFFFFF"/>
+                </a:solidFill>
+              </a14:hiddenFill>
+            </a:ext>
+            <a:ext uri="{91240B29-F687-4F45-9708-019B960494DF}">
+              <a14:hiddenLine xmlns:a14="http://schemas.microsoft.com/office/drawing/2010/main" w="9525">
+                <a:solidFill>
+                  <a:srgbClr val="000000"/>
+                </a:solidFill>
+                <a:miter lim="800000"/>
+                <a:headEnd/>
+                <a:tailEnd/>
+              </a14:hiddenLine>
+            </a:ext>
+          </a:extLst>
+        </p:spPr>
+      </p:pic>
+      <p:sp>
+        <p:nvSpPr>
+          <p:cNvPr id="78" name="TextBox 12">
+            <a:extLst>
+              <a:ext uri="{FF2B5EF4-FFF2-40B4-BE49-F238E27FC236}">
+                <a16:creationId xmlns:a16="http://schemas.microsoft.com/office/drawing/2014/main" id="{FA984FBF-FB60-8940-AF5F-CED24877132E}"/>
+              </a:ext>
+            </a:extLst>
+          </p:cNvPr>
+          <p:cNvSpPr txBox="1">
+            <a:spLocks noChangeArrowheads="1"/>
+          </p:cNvSpPr>
+          <p:nvPr/>
+        </p:nvSpPr>
+        <p:spPr bwMode="auto">
+          <a:xfrm>
+            <a:off x="4760741" y="765873"/>
+            <a:ext cx="1035068" cy="246221"/>
+          </a:xfrm>
+          <a:prstGeom prst="rect">
+            <a:avLst/>
+          </a:prstGeom>
+          <a:noFill/>
+          <a:ln>
+            <a:noFill/>
+          </a:ln>
+          <a:extLst>
+            <a:ext uri="{909E8E84-426E-40DD-AFC4-6F175D3DCCD1}">
+              <a14:hiddenFill xmlns:a14="http://schemas.microsoft.com/office/drawing/2010/main">
+                <a:solidFill>
+                  <a:srgbClr val="FFFFFF"/>
+                </a:solidFill>
+              </a14:hiddenFill>
+            </a:ext>
+            <a:ext uri="{91240B29-F687-4F45-9708-019B960494DF}">
+              <a14:hiddenLine xmlns:a14="http://schemas.microsoft.com/office/drawing/2010/main" w="9525">
+                <a:solidFill>
+                  <a:srgbClr val="000000"/>
+                </a:solidFill>
+                <a:miter lim="800000"/>
+                <a:headEnd/>
+                <a:tailEnd/>
+              </a14:hiddenLine>
+            </a:ext>
+          </a:extLst>
+        </p:spPr>
+        <p:txBody>
+          <a:bodyPr wrap="square">
+            <a:spAutoFit/>
+          </a:bodyPr>
+          <a:lstStyle>
+            <a:lvl1pPr>
+              <a:defRPr>
+                <a:solidFill>
+                  <a:schemeClr val="tx1"/>
+                </a:solidFill>
+                <a:latin typeface="Calibri" panose="020F0502020204030204" pitchFamily="34" charset="0"/>
+              </a:defRPr>
+            </a:lvl1pPr>
+            <a:lvl2pPr marL="742950" indent="-285750">
+              <a:defRPr>
+                <a:solidFill>
+                  <a:schemeClr val="tx1"/>
+                </a:solidFill>
+                <a:latin typeface="Calibri" panose="020F0502020204030204" pitchFamily="34" charset="0"/>
+              </a:defRPr>
+            </a:lvl2pPr>
+            <a:lvl3pPr marL="1143000" indent="-228600">
+              <a:defRPr>
+                <a:solidFill>
+                  <a:schemeClr val="tx1"/>
+                </a:solidFill>
+                <a:latin typeface="Calibri" panose="020F0502020204030204" pitchFamily="34" charset="0"/>
+              </a:defRPr>
+            </a:lvl3pPr>
+            <a:lvl4pPr marL="1600200" indent="-228600">
+              <a:defRPr>
+                <a:solidFill>
+                  <a:schemeClr val="tx1"/>
+                </a:solidFill>
+                <a:latin typeface="Calibri" panose="020F0502020204030204" pitchFamily="34" charset="0"/>
+              </a:defRPr>
+            </a:lvl4pPr>
+            <a:lvl5pPr marL="2057400" indent="-228600">
+              <a:defRPr>
+                <a:solidFill>
+                  <a:schemeClr val="tx1"/>
+                </a:solidFill>
+                <a:latin typeface="Calibri" panose="020F0502020204030204" pitchFamily="34" charset="0"/>
+              </a:defRPr>
+            </a:lvl5pPr>
+            <a:lvl6pPr marL="2514600" indent="-228600" eaLnBrk="0" fontAlgn="base" hangingPunct="0">
+              <a:spcBef>
+                <a:spcPct val="0"/>
+              </a:spcBef>
+              <a:spcAft>
+                <a:spcPct val="0"/>
+              </a:spcAft>
+              <a:defRPr>
+                <a:solidFill>
+                  <a:schemeClr val="tx1"/>
+                </a:solidFill>
+                <a:latin typeface="Calibri" panose="020F0502020204030204" pitchFamily="34" charset="0"/>
+              </a:defRPr>
+            </a:lvl6pPr>
+            <a:lvl7pPr marL="2971800" indent="-228600" eaLnBrk="0" fontAlgn="base" hangingPunct="0">
+              <a:spcBef>
+                <a:spcPct val="0"/>
+              </a:spcBef>
+              <a:spcAft>
+                <a:spcPct val="0"/>
+              </a:spcAft>
+              <a:defRPr>
+                <a:solidFill>
+                  <a:schemeClr val="tx1"/>
+                </a:solidFill>
+                <a:latin typeface="Calibri" panose="020F0502020204030204" pitchFamily="34" charset="0"/>
+              </a:defRPr>
+            </a:lvl7pPr>
+            <a:lvl8pPr marL="3429000" indent="-228600" eaLnBrk="0" fontAlgn="base" hangingPunct="0">
+              <a:spcBef>
+                <a:spcPct val="0"/>
+              </a:spcBef>
+              <a:spcAft>
+                <a:spcPct val="0"/>
+              </a:spcAft>
+              <a:defRPr>
+                <a:solidFill>
+                  <a:schemeClr val="tx1"/>
+                </a:solidFill>
+                <a:latin typeface="Calibri" panose="020F0502020204030204" pitchFamily="34" charset="0"/>
+              </a:defRPr>
+            </a:lvl8pPr>
+            <a:lvl9pPr marL="3886200" indent="-228600" eaLnBrk="0" fontAlgn="base" hangingPunct="0">
+              <a:spcBef>
+                <a:spcPct val="0"/>
+              </a:spcBef>
+              <a:spcAft>
+                <a:spcPct val="0"/>
+              </a:spcAft>
+              <a:defRPr>
+                <a:solidFill>
+                  <a:schemeClr val="tx1"/>
+                </a:solidFill>
+                <a:latin typeface="Calibri" panose="020F0502020204030204" pitchFamily="34" charset="0"/>
+              </a:defRPr>
+            </a:lvl9pPr>
+          </a:lstStyle>
+          <a:p>
+            <a:pPr algn="ctr" eaLnBrk="1" hangingPunct="1"/>
+            <a:r>
+              <a:rPr lang="en-US" altLang="en-US" sz="1000" dirty="0">
+                <a:latin typeface="Arial" panose="020B0604020202020204" pitchFamily="34" charset="0"/>
+                <a:ea typeface="Amazon Ember" panose="020B0603020204020204" pitchFamily="34" charset="0"/>
+                <a:cs typeface="Arial" panose="020B0604020202020204" pitchFamily="34" charset="0"/>
+              </a:rPr>
+              <a:t>AWS IAM</a:t>
+            </a:r>
+          </a:p>
+        </p:txBody>
+      </p:sp>
+      <p:pic>
+        <p:nvPicPr>
+          <p:cNvPr id="80" name="Graphic 17">
+            <a:extLst>
+              <a:ext uri="{FF2B5EF4-FFF2-40B4-BE49-F238E27FC236}">
+                <a16:creationId xmlns:a16="http://schemas.microsoft.com/office/drawing/2014/main" id="{C9A65B73-C953-4C43-92E0-70465C118649}"/>
+              </a:ext>
+            </a:extLst>
+          </p:cNvPr>
+          <p:cNvPicPr>
+            <a:picLocks noChangeAspect="1" noChangeArrowheads="1"/>
+          </p:cNvPicPr>
+          <p:nvPr/>
+        </p:nvPicPr>
+        <p:blipFill>
+          <a:blip r:embed="rId28">
+            <a:extLst>
+              <a:ext uri="{28A0092B-C50C-407E-A947-70E740481C1C}">
+                <a14:useLocalDpi xmlns:a14="http://schemas.microsoft.com/office/drawing/2010/main" val="0"/>
+              </a:ext>
+            </a:extLst>
+          </a:blip>
+          <a:srcRect/>
+          <a:stretch>
+            <a:fillRect/>
+          </a:stretch>
+        </p:blipFill>
+        <p:spPr bwMode="auto">
+          <a:xfrm>
+            <a:off x="4128449" y="165012"/>
+            <a:ext cx="595315" cy="595315"/>
+          </a:xfrm>
+          <a:prstGeom prst="rect">
+            <a:avLst/>
+          </a:prstGeom>
+          <a:noFill/>
+          <a:ln>
+            <a:noFill/>
+          </a:ln>
+          <a:extLst>
+            <a:ext uri="{909E8E84-426E-40DD-AFC4-6F175D3DCCD1}">
+              <a14:hiddenFill xmlns:a14="http://schemas.microsoft.com/office/drawing/2010/main">
+                <a:solidFill>
+                  <a:srgbClr val="FFFFFF"/>
+                </a:solidFill>
+              </a14:hiddenFill>
+            </a:ext>
+            <a:ext uri="{91240B29-F687-4F45-9708-019B960494DF}">
+              <a14:hiddenLine xmlns:a14="http://schemas.microsoft.com/office/drawing/2010/main" w="9525">
+                <a:solidFill>
+                  <a:srgbClr val="000000"/>
+                </a:solidFill>
+                <a:miter lim="800000"/>
+                <a:headEnd/>
+                <a:tailEnd/>
+              </a14:hiddenLine>
+            </a:ext>
+          </a:extLst>
+        </p:spPr>
+      </p:pic>
+      <p:sp>
+        <p:nvSpPr>
+          <p:cNvPr id="81" name="TextBox 11">
+            <a:extLst>
+              <a:ext uri="{FF2B5EF4-FFF2-40B4-BE49-F238E27FC236}">
+                <a16:creationId xmlns:a16="http://schemas.microsoft.com/office/drawing/2014/main" id="{BDD7DE52-905B-6D48-BDFD-4664381AD57E}"/>
+              </a:ext>
+            </a:extLst>
+          </p:cNvPr>
+          <p:cNvSpPr txBox="1">
+            <a:spLocks noChangeArrowheads="1"/>
+          </p:cNvSpPr>
+          <p:nvPr/>
+        </p:nvSpPr>
+        <p:spPr bwMode="auto">
+          <a:xfrm>
+            <a:off x="3752395" y="767210"/>
+            <a:ext cx="1339444" cy="400110"/>
+          </a:xfrm>
+          <a:prstGeom prst="rect">
+            <a:avLst/>
+          </a:prstGeom>
+          <a:noFill/>
+          <a:ln>
+            <a:noFill/>
+          </a:ln>
+          <a:extLst>
+            <a:ext uri="{909E8E84-426E-40DD-AFC4-6F175D3DCCD1}">
+              <a14:hiddenFill xmlns:a14="http://schemas.microsoft.com/office/drawing/2010/main">
+                <a:solidFill>
+                  <a:srgbClr val="FFFFFF"/>
+                </a:solidFill>
+              </a14:hiddenFill>
+            </a:ext>
+            <a:ext uri="{91240B29-F687-4F45-9708-019B960494DF}">
+              <a14:hiddenLine xmlns:a14="http://schemas.microsoft.com/office/drawing/2010/main" w="9525">
+                <a:solidFill>
+                  <a:srgbClr val="000000"/>
+                </a:solidFill>
+                <a:miter lim="800000"/>
+                <a:headEnd/>
+                <a:tailEnd/>
+              </a14:hiddenLine>
+            </a:ext>
+          </a:extLst>
+        </p:spPr>
+        <p:txBody>
+          <a:bodyPr wrap="square">
+            <a:spAutoFit/>
+          </a:bodyPr>
+          <a:lstStyle>
+            <a:lvl1pPr>
+              <a:defRPr>
+                <a:solidFill>
+                  <a:schemeClr val="tx1"/>
+                </a:solidFill>
+                <a:latin typeface="Calibri" panose="020F0502020204030204" pitchFamily="34" charset="0"/>
+              </a:defRPr>
+            </a:lvl1pPr>
+            <a:lvl2pPr marL="742950" indent="-285750">
+              <a:defRPr>
+                <a:solidFill>
+                  <a:schemeClr val="tx1"/>
+                </a:solidFill>
+                <a:latin typeface="Calibri" panose="020F0502020204030204" pitchFamily="34" charset="0"/>
+              </a:defRPr>
+            </a:lvl2pPr>
+            <a:lvl3pPr marL="1143000" indent="-228600">
+              <a:defRPr>
+                <a:solidFill>
+                  <a:schemeClr val="tx1"/>
+                </a:solidFill>
+                <a:latin typeface="Calibri" panose="020F0502020204030204" pitchFamily="34" charset="0"/>
+              </a:defRPr>
+            </a:lvl3pPr>
+            <a:lvl4pPr marL="1600200" indent="-228600">
+              <a:defRPr>
+                <a:solidFill>
+                  <a:schemeClr val="tx1"/>
+                </a:solidFill>
+                <a:latin typeface="Calibri" panose="020F0502020204030204" pitchFamily="34" charset="0"/>
+              </a:defRPr>
+            </a:lvl4pPr>
+            <a:lvl5pPr marL="2057400" indent="-228600">
+              <a:defRPr>
+                <a:solidFill>
+                  <a:schemeClr val="tx1"/>
+                </a:solidFill>
+                <a:latin typeface="Calibri" panose="020F0502020204030204" pitchFamily="34" charset="0"/>
+              </a:defRPr>
+            </a:lvl5pPr>
+            <a:lvl6pPr marL="2514600" indent="-228600" eaLnBrk="0" fontAlgn="base" hangingPunct="0">
+              <a:spcBef>
+                <a:spcPct val="0"/>
+              </a:spcBef>
+              <a:spcAft>
+                <a:spcPct val="0"/>
+              </a:spcAft>
+              <a:defRPr>
+                <a:solidFill>
+                  <a:schemeClr val="tx1"/>
+                </a:solidFill>
+                <a:latin typeface="Calibri" panose="020F0502020204030204" pitchFamily="34" charset="0"/>
+              </a:defRPr>
+            </a:lvl6pPr>
+            <a:lvl7pPr marL="2971800" indent="-228600" eaLnBrk="0" fontAlgn="base" hangingPunct="0">
+              <a:spcBef>
+                <a:spcPct val="0"/>
+              </a:spcBef>
+              <a:spcAft>
+                <a:spcPct val="0"/>
+              </a:spcAft>
+              <a:defRPr>
+                <a:solidFill>
+                  <a:schemeClr val="tx1"/>
+                </a:solidFill>
+                <a:latin typeface="Calibri" panose="020F0502020204030204" pitchFamily="34" charset="0"/>
+              </a:defRPr>
+            </a:lvl7pPr>
+            <a:lvl8pPr marL="3429000" indent="-228600" eaLnBrk="0" fontAlgn="base" hangingPunct="0">
+              <a:spcBef>
+                <a:spcPct val="0"/>
+              </a:spcBef>
+              <a:spcAft>
+                <a:spcPct val="0"/>
+              </a:spcAft>
+              <a:defRPr>
+                <a:solidFill>
+                  <a:schemeClr val="tx1"/>
+                </a:solidFill>
+                <a:latin typeface="Calibri" panose="020F0502020204030204" pitchFamily="34" charset="0"/>
+              </a:defRPr>
+            </a:lvl8pPr>
+            <a:lvl9pPr marL="3886200" indent="-228600" eaLnBrk="0" fontAlgn="base" hangingPunct="0">
+              <a:spcBef>
+                <a:spcPct val="0"/>
+              </a:spcBef>
+              <a:spcAft>
+                <a:spcPct val="0"/>
+              </a:spcAft>
+              <a:defRPr>
+                <a:solidFill>
+                  <a:schemeClr val="tx1"/>
+                </a:solidFill>
+                <a:latin typeface="Calibri" panose="020F0502020204030204" pitchFamily="34" charset="0"/>
+              </a:defRPr>
+            </a:lvl9pPr>
+          </a:lstStyle>
+          <a:p>
+            <a:pPr algn="ctr" eaLnBrk="1" hangingPunct="1"/>
+            <a:r>
+              <a:rPr lang="en-US" altLang="en-US" sz="1000" dirty="0">
+                <a:latin typeface="Arial" panose="020B0604020202020204" pitchFamily="34" charset="0"/>
+                <a:ea typeface="Amazon Ember" panose="020B0603020204020204" pitchFamily="34" charset="0"/>
+                <a:cs typeface="Arial" panose="020B0604020202020204" pitchFamily="34" charset="0"/>
+              </a:rPr>
+              <a:t>AWS Secrets</a:t>
+            </a:r>
+          </a:p>
+          <a:p>
+            <a:pPr algn="ctr" eaLnBrk="1" hangingPunct="1"/>
+            <a:r>
+              <a:rPr lang="en-US" altLang="en-US" sz="1000" dirty="0">
+                <a:latin typeface="Arial" panose="020B0604020202020204" pitchFamily="34" charset="0"/>
+                <a:ea typeface="Amazon Ember" panose="020B0603020204020204" pitchFamily="34" charset="0"/>
+                <a:cs typeface="Arial" panose="020B0604020202020204" pitchFamily="34" charset="0"/>
+              </a:rPr>
+              <a:t> Manager</a:t>
+            </a:r>
+          </a:p>
+        </p:txBody>
+      </p:sp>
+      <p:pic>
+        <p:nvPicPr>
+          <p:cNvPr id="82" name="Graphic 7">
+            <a:extLst>
+              <a:ext uri="{FF2B5EF4-FFF2-40B4-BE49-F238E27FC236}">
+                <a16:creationId xmlns:a16="http://schemas.microsoft.com/office/drawing/2014/main" id="{D8A4905B-A884-4F4C-A120-6DBB6A20202F}"/>
+              </a:ext>
+            </a:extLst>
+          </p:cNvPr>
+          <p:cNvPicPr>
+            <a:picLocks noChangeAspect="1" noChangeArrowheads="1"/>
+          </p:cNvPicPr>
+          <p:nvPr/>
+        </p:nvPicPr>
+        <p:blipFill>
+          <a:blip r:embed="rId29">
+            <a:extLst>
+              <a:ext uri="{28A0092B-C50C-407E-A947-70E740481C1C}">
+                <a14:useLocalDpi xmlns:a14="http://schemas.microsoft.com/office/drawing/2010/main" val="0"/>
+              </a:ext>
+            </a:extLst>
+          </a:blip>
+          <a:srcRect/>
+          <a:stretch>
+            <a:fillRect/>
+          </a:stretch>
+        </p:blipFill>
+        <p:spPr bwMode="auto">
+          <a:xfrm>
+            <a:off x="3303351" y="172605"/>
+            <a:ext cx="579144" cy="579144"/>
+          </a:xfrm>
+          <a:prstGeom prst="rect">
+            <a:avLst/>
+          </a:prstGeom>
+          <a:noFill/>
+          <a:ln>
+            <a:noFill/>
+          </a:ln>
+          <a:extLst>
+            <a:ext uri="{909E8E84-426E-40DD-AFC4-6F175D3DCCD1}">
+              <a14:hiddenFill xmlns:a14="http://schemas.microsoft.com/office/drawing/2010/main">
+                <a:solidFill>
+                  <a:srgbClr val="FFFFFF"/>
+                </a:solidFill>
+              </a14:hiddenFill>
+            </a:ext>
+            <a:ext uri="{91240B29-F687-4F45-9708-019B960494DF}">
+              <a14:hiddenLine xmlns:a14="http://schemas.microsoft.com/office/drawing/2010/main" w="9525">
+                <a:solidFill>
+                  <a:srgbClr val="000000"/>
+                </a:solidFill>
+                <a:miter lim="800000"/>
+                <a:headEnd/>
+                <a:tailEnd/>
+              </a14:hiddenLine>
+            </a:ext>
+          </a:extLst>
+        </p:spPr>
+      </p:pic>
+      <p:sp>
+        <p:nvSpPr>
+          <p:cNvPr id="83" name="TextBox 9">
+            <a:extLst>
+              <a:ext uri="{FF2B5EF4-FFF2-40B4-BE49-F238E27FC236}">
+                <a16:creationId xmlns:a16="http://schemas.microsoft.com/office/drawing/2014/main" id="{BB423690-BD4E-2E43-8E66-0120662E336A}"/>
+              </a:ext>
+            </a:extLst>
+          </p:cNvPr>
+          <p:cNvSpPr txBox="1">
+            <a:spLocks noChangeArrowheads="1"/>
+          </p:cNvSpPr>
+          <p:nvPr/>
+        </p:nvSpPr>
+        <p:spPr bwMode="auto">
+          <a:xfrm>
+            <a:off x="3047198" y="761486"/>
+            <a:ext cx="1102903" cy="246221"/>
+          </a:xfrm>
+          <a:prstGeom prst="rect">
+            <a:avLst/>
+          </a:prstGeom>
+          <a:noFill/>
+          <a:ln>
+            <a:noFill/>
+          </a:ln>
+          <a:extLst>
+            <a:ext uri="{909E8E84-426E-40DD-AFC4-6F175D3DCCD1}">
+              <a14:hiddenFill xmlns:a14="http://schemas.microsoft.com/office/drawing/2010/main">
+                <a:solidFill>
+                  <a:srgbClr val="FFFFFF"/>
+                </a:solidFill>
+              </a14:hiddenFill>
+            </a:ext>
+            <a:ext uri="{91240B29-F687-4F45-9708-019B960494DF}">
+              <a14:hiddenLine xmlns:a14="http://schemas.microsoft.com/office/drawing/2010/main" w="9525">
+                <a:solidFill>
+                  <a:srgbClr val="000000"/>
+                </a:solidFill>
+                <a:miter lim="800000"/>
+                <a:headEnd/>
+                <a:tailEnd/>
+              </a14:hiddenLine>
+            </a:ext>
+          </a:extLst>
+        </p:spPr>
+        <p:txBody>
+          <a:bodyPr wrap="square">
+            <a:spAutoFit/>
+          </a:bodyPr>
+          <a:lstStyle>
+            <a:lvl1pPr>
+              <a:defRPr>
+                <a:solidFill>
+                  <a:schemeClr val="tx1"/>
+                </a:solidFill>
+                <a:latin typeface="Calibri" panose="020F0502020204030204" pitchFamily="34" charset="0"/>
+              </a:defRPr>
+            </a:lvl1pPr>
+            <a:lvl2pPr marL="742950" indent="-285750">
+              <a:defRPr>
+                <a:solidFill>
+                  <a:schemeClr val="tx1"/>
+                </a:solidFill>
+                <a:latin typeface="Calibri" panose="020F0502020204030204" pitchFamily="34" charset="0"/>
+              </a:defRPr>
+            </a:lvl2pPr>
+            <a:lvl3pPr marL="1143000" indent="-228600">
+              <a:defRPr>
+                <a:solidFill>
+                  <a:schemeClr val="tx1"/>
+                </a:solidFill>
+                <a:latin typeface="Calibri" panose="020F0502020204030204" pitchFamily="34" charset="0"/>
+              </a:defRPr>
+            </a:lvl3pPr>
+            <a:lvl4pPr marL="1600200" indent="-228600">
+              <a:defRPr>
+                <a:solidFill>
+                  <a:schemeClr val="tx1"/>
+                </a:solidFill>
+                <a:latin typeface="Calibri" panose="020F0502020204030204" pitchFamily="34" charset="0"/>
+              </a:defRPr>
+            </a:lvl4pPr>
+            <a:lvl5pPr marL="2057400" indent="-228600">
+              <a:defRPr>
+                <a:solidFill>
+                  <a:schemeClr val="tx1"/>
+                </a:solidFill>
+                <a:latin typeface="Calibri" panose="020F0502020204030204" pitchFamily="34" charset="0"/>
+              </a:defRPr>
+            </a:lvl5pPr>
+            <a:lvl6pPr marL="2514600" indent="-228600" eaLnBrk="0" fontAlgn="base" hangingPunct="0">
+              <a:spcBef>
+                <a:spcPct val="0"/>
+              </a:spcBef>
+              <a:spcAft>
+                <a:spcPct val="0"/>
+              </a:spcAft>
+              <a:defRPr>
+                <a:solidFill>
+                  <a:schemeClr val="tx1"/>
+                </a:solidFill>
+                <a:latin typeface="Calibri" panose="020F0502020204030204" pitchFamily="34" charset="0"/>
+              </a:defRPr>
+            </a:lvl6pPr>
+            <a:lvl7pPr marL="2971800" indent="-228600" eaLnBrk="0" fontAlgn="base" hangingPunct="0">
+              <a:spcBef>
+                <a:spcPct val="0"/>
+              </a:spcBef>
+              <a:spcAft>
+                <a:spcPct val="0"/>
+              </a:spcAft>
+              <a:defRPr>
+                <a:solidFill>
+                  <a:schemeClr val="tx1"/>
+                </a:solidFill>
+                <a:latin typeface="Calibri" panose="020F0502020204030204" pitchFamily="34" charset="0"/>
+              </a:defRPr>
+            </a:lvl7pPr>
+            <a:lvl8pPr marL="3429000" indent="-228600" eaLnBrk="0" fontAlgn="base" hangingPunct="0">
+              <a:spcBef>
+                <a:spcPct val="0"/>
+              </a:spcBef>
+              <a:spcAft>
+                <a:spcPct val="0"/>
+              </a:spcAft>
+              <a:defRPr>
+                <a:solidFill>
+                  <a:schemeClr val="tx1"/>
+                </a:solidFill>
+                <a:latin typeface="Calibri" panose="020F0502020204030204" pitchFamily="34" charset="0"/>
+              </a:defRPr>
+            </a:lvl8pPr>
+            <a:lvl9pPr marL="3886200" indent="-228600" eaLnBrk="0" fontAlgn="base" hangingPunct="0">
+              <a:spcBef>
+                <a:spcPct val="0"/>
+              </a:spcBef>
+              <a:spcAft>
+                <a:spcPct val="0"/>
+              </a:spcAft>
+              <a:defRPr>
+                <a:solidFill>
+                  <a:schemeClr val="tx1"/>
+                </a:solidFill>
+                <a:latin typeface="Calibri" panose="020F0502020204030204" pitchFamily="34" charset="0"/>
+              </a:defRPr>
+            </a:lvl9pPr>
+          </a:lstStyle>
+          <a:p>
+            <a:pPr algn="ctr" eaLnBrk="1" hangingPunct="1"/>
+            <a:r>
+              <a:rPr lang="en-US" altLang="en-US" sz="1000" dirty="0">
+                <a:latin typeface="Arial" panose="020B0604020202020204" pitchFamily="34" charset="0"/>
+                <a:ea typeface="Amazon Ember" panose="020B0603020204020204" pitchFamily="34" charset="0"/>
+                <a:cs typeface="Arial" panose="020B0604020202020204" pitchFamily="34" charset="0"/>
+              </a:rPr>
+              <a:t>AWS KMS</a:t>
+            </a:r>
+          </a:p>
+        </p:txBody>
+      </p:sp>
+      <p:sp>
+        <p:nvSpPr>
+          <p:cNvPr id="68" name="Rectangle 67">
+            <a:extLst>
+              <a:ext uri="{FF2B5EF4-FFF2-40B4-BE49-F238E27FC236}">
+                <a16:creationId xmlns:a16="http://schemas.microsoft.com/office/drawing/2014/main" id="{A8543216-F4B1-DE4A-A8D7-F761EAFB9267}"/>
+              </a:ext>
+            </a:extLst>
+          </p:cNvPr>
+          <p:cNvSpPr/>
+          <p:nvPr/>
+        </p:nvSpPr>
+        <p:spPr>
+          <a:xfrm>
+            <a:off x="2375802" y="4934801"/>
+            <a:ext cx="7381262" cy="899574"/>
+          </a:xfrm>
+          <a:prstGeom prst="rect">
+            <a:avLst/>
+          </a:prstGeom>
+          <a:noFill/>
+          <a:ln w="12700">
+            <a:solidFill>
+              <a:srgbClr val="007DBC"/>
+            </a:solidFill>
+            <a:prstDash val="dash"/>
+          </a:ln>
+        </p:spPr>
+        <p:style>
+          <a:lnRef idx="2">
+            <a:schemeClr val="accent1">
+              <a:shade val="50000"/>
+            </a:schemeClr>
+          </a:lnRef>
+          <a:fillRef idx="1">
+            <a:schemeClr val="accent1"/>
+          </a:fillRef>
+          <a:effectRef idx="0">
+            <a:schemeClr val="accent1"/>
+          </a:effectRef>
+          <a:fontRef idx="minor">
+            <a:schemeClr val="lt1"/>
+          </a:fontRef>
+        </p:style>
+        <p:txBody>
+          <a:bodyPr rot="0" spcFirstLastPara="0" vertOverflow="overflow" horzOverflow="overflow" vert="horz" wrap="square" lIns="91440" tIns="91440" rIns="91440" bIns="45720" numCol="1" spcCol="0" rtlCol="0" fromWordArt="0" anchor="t" anchorCtr="0" forceAA="0" compatLnSpc="1">
+            <a:prstTxWarp prst="textNoShape">
+              <a:avLst/>
+            </a:prstTxWarp>
+            <a:noAutofit/>
+          </a:bodyPr>
+          <a:lstStyle/>
+          <a:p>
+            <a:pPr algn="ctr"/>
+            <a:r>
+              <a:rPr lang="en-US" sz="1200" dirty="0">
+                <a:solidFill>
+                  <a:srgbClr val="007DBC"/>
+                </a:solidFill>
+                <a:latin typeface="Arial" panose="020B0604020202020204" pitchFamily="34" charset="0"/>
+                <a:cs typeface="Arial" panose="020B0604020202020204" pitchFamily="34" charset="0"/>
+              </a:rPr>
+              <a:t>Availability Zone 2 - DR</a:t>
+            </a:r>
+          </a:p>
+        </p:txBody>
+      </p:sp>
+      <p:sp>
+        <p:nvSpPr>
+          <p:cNvPr id="84" name="Rectangle 83">
+            <a:extLst>
+              <a:ext uri="{FF2B5EF4-FFF2-40B4-BE49-F238E27FC236}">
+                <a16:creationId xmlns:a16="http://schemas.microsoft.com/office/drawing/2014/main" id="{23DC943C-AC94-8441-B000-C8517D677BC8}"/>
+              </a:ext>
+            </a:extLst>
+          </p:cNvPr>
+          <p:cNvSpPr/>
+          <p:nvPr/>
+        </p:nvSpPr>
+        <p:spPr>
+          <a:xfrm>
+            <a:off x="2563909" y="5208278"/>
+            <a:ext cx="2255362" cy="544818"/>
+          </a:xfrm>
+          <a:prstGeom prst="rect">
+            <a:avLst/>
+          </a:prstGeom>
+          <a:solidFill>
+            <a:srgbClr val="1D8900">
+              <a:alpha val="9804"/>
+            </a:srgbClr>
+          </a:solidFill>
+          <a:ln w="12700">
+            <a:noFill/>
+            <a:prstDash val="solid"/>
+          </a:ln>
+        </p:spPr>
+        <p:style>
+          <a:lnRef idx="2">
+            <a:schemeClr val="accent1">
+              <a:shade val="50000"/>
+            </a:schemeClr>
+          </a:lnRef>
+          <a:fillRef idx="1">
+            <a:schemeClr val="accent1"/>
+          </a:fillRef>
+          <a:effectRef idx="0">
+            <a:schemeClr val="accent1"/>
+          </a:effectRef>
+          <a:fontRef idx="minor">
+            <a:schemeClr val="lt1"/>
+          </a:fontRef>
+        </p:style>
+        <p:txBody>
+          <a:bodyPr rot="0" spcFirstLastPara="0" vertOverflow="overflow" horzOverflow="overflow" vert="horz" wrap="square" lIns="338328" tIns="45720" rIns="91440" bIns="45720" numCol="1" spcCol="0" rtlCol="0" fromWordArt="0" anchor="t" anchorCtr="0" forceAA="0" compatLnSpc="1">
+            <a:prstTxWarp prst="textNoShape">
+              <a:avLst/>
+            </a:prstTxWarp>
+            <a:noAutofit/>
+          </a:bodyPr>
+          <a:lstStyle/>
+          <a:p>
+            <a:pPr algn="l"/>
+            <a:r>
+              <a:rPr lang="en-US" sz="1200" dirty="0">
+                <a:solidFill>
+                  <a:srgbClr val="1E8900"/>
+                </a:solidFill>
+                <a:latin typeface="Arial" panose="020B0604020202020204" pitchFamily="34" charset="0"/>
+                <a:cs typeface="Arial" panose="020B0604020202020204" pitchFamily="34" charset="0"/>
+              </a:rPr>
+              <a:t>Public subnet </a:t>
+            </a:r>
+          </a:p>
+          <a:p>
+            <a:pPr algn="l"/>
+            <a:r>
+              <a:rPr lang="en-US" sz="1200" dirty="0">
+                <a:solidFill>
+                  <a:srgbClr val="1E8900"/>
+                </a:solidFill>
+                <a:latin typeface="Arial" panose="020B0604020202020204" pitchFamily="34" charset="0"/>
+                <a:cs typeface="Arial" panose="020B0604020202020204" pitchFamily="34" charset="0"/>
+              </a:rPr>
+              <a:t>10.0.16.0/20</a:t>
+            </a:r>
+          </a:p>
+        </p:txBody>
+      </p:sp>
+      <p:pic>
+        <p:nvPicPr>
+          <p:cNvPr id="86" name="Graphic 85">
+            <a:extLst>
+              <a:ext uri="{FF2B5EF4-FFF2-40B4-BE49-F238E27FC236}">
+                <a16:creationId xmlns:a16="http://schemas.microsoft.com/office/drawing/2014/main" id="{A6CB0A17-28F3-A344-A08C-99579C79A766}"/>
+              </a:ext>
+            </a:extLst>
+          </p:cNvPr>
+          <p:cNvPicPr>
+            <a:picLocks noChangeAspect="1"/>
+          </p:cNvPicPr>
+          <p:nvPr/>
+        </p:nvPicPr>
+        <p:blipFill>
+          <a:blip r:embed="rId7">
+            <a:extLst>
+              <a:ext uri="{96DAC541-7B7A-43D3-8B79-37D633B846F1}">
+                <asvg:svgBlip xmlns:asvg="http://schemas.microsoft.com/office/drawing/2016/SVG/main" r:embed="rId8"/>
+              </a:ext>
+            </a:extLst>
+          </a:blip>
+          <a:stretch>
+            <a:fillRect/>
+          </a:stretch>
+        </p:blipFill>
+        <p:spPr>
+          <a:xfrm>
+            <a:off x="2574992" y="5210005"/>
+            <a:ext cx="274320" cy="274320"/>
+          </a:xfrm>
+          <a:prstGeom prst="rect">
+            <a:avLst/>
+          </a:prstGeom>
+        </p:spPr>
+      </p:pic>
+      <p:sp>
+        <p:nvSpPr>
+          <p:cNvPr id="87" name="Rectangle 86">
+            <a:extLst>
+              <a:ext uri="{FF2B5EF4-FFF2-40B4-BE49-F238E27FC236}">
+                <a16:creationId xmlns:a16="http://schemas.microsoft.com/office/drawing/2014/main" id="{156CB059-5383-7F41-A028-7D8F5E1C029F}"/>
+              </a:ext>
+            </a:extLst>
+          </p:cNvPr>
+          <p:cNvSpPr/>
+          <p:nvPr/>
+        </p:nvSpPr>
+        <p:spPr>
+          <a:xfrm>
+            <a:off x="4984143" y="5208277"/>
+            <a:ext cx="4573382" cy="550095"/>
+          </a:xfrm>
+          <a:prstGeom prst="rect">
+            <a:avLst/>
+          </a:prstGeom>
+          <a:solidFill>
+            <a:srgbClr val="007CBC">
+              <a:alpha val="9804"/>
+            </a:srgbClr>
+          </a:solidFill>
+          <a:ln w="12700">
+            <a:noFill/>
+            <a:prstDash val="solid"/>
+          </a:ln>
+        </p:spPr>
+        <p:style>
+          <a:lnRef idx="2">
+            <a:schemeClr val="accent1">
+              <a:shade val="50000"/>
+            </a:schemeClr>
+          </a:lnRef>
+          <a:fillRef idx="1">
+            <a:schemeClr val="accent1"/>
+          </a:fillRef>
+          <a:effectRef idx="0">
+            <a:schemeClr val="accent1"/>
+          </a:effectRef>
+          <a:fontRef idx="minor">
+            <a:schemeClr val="lt1"/>
+          </a:fontRef>
+        </p:style>
+        <p:txBody>
+          <a:bodyPr rot="0" spcFirstLastPara="0" vertOverflow="overflow" horzOverflow="overflow" vert="horz" wrap="square" lIns="338328" tIns="45720" rIns="91440" bIns="45720" numCol="1" spcCol="0" rtlCol="0" fromWordArt="0" anchor="t" anchorCtr="0" forceAA="0" compatLnSpc="1">
+            <a:prstTxWarp prst="textNoShape">
+              <a:avLst/>
+            </a:prstTxWarp>
+            <a:noAutofit/>
+          </a:bodyPr>
+          <a:lstStyle/>
+          <a:p>
+            <a:pPr algn="l"/>
+            <a:r>
+              <a:rPr lang="en-US" sz="1200" dirty="0">
+                <a:solidFill>
+                  <a:srgbClr val="007DBC"/>
+                </a:solidFill>
+                <a:latin typeface="Arial" panose="020B0604020202020204" pitchFamily="34" charset="0"/>
+                <a:cs typeface="Arial" panose="020B0604020202020204" pitchFamily="34" charset="0"/>
+              </a:rPr>
+              <a:t>Private subnet</a:t>
+            </a:r>
+          </a:p>
+          <a:p>
+            <a:pPr algn="l"/>
+            <a:r>
+              <a:rPr lang="en-US" sz="1200" dirty="0">
+                <a:solidFill>
+                  <a:srgbClr val="007DBC"/>
+                </a:solidFill>
+                <a:latin typeface="Arial" panose="020B0604020202020204" pitchFamily="34" charset="0"/>
+                <a:cs typeface="Arial" panose="020B0604020202020204" pitchFamily="34" charset="0"/>
+              </a:rPr>
+              <a:t>10.0.144.0/20</a:t>
+            </a:r>
+          </a:p>
+        </p:txBody>
+      </p:sp>
+      <p:pic>
+        <p:nvPicPr>
+          <p:cNvPr id="90" name="Graphic 89">
+            <a:extLst>
+              <a:ext uri="{FF2B5EF4-FFF2-40B4-BE49-F238E27FC236}">
+                <a16:creationId xmlns:a16="http://schemas.microsoft.com/office/drawing/2014/main" id="{1B93F908-DB92-204D-95AB-64CBD1432689}"/>
+              </a:ext>
+            </a:extLst>
+          </p:cNvPr>
+          <p:cNvPicPr>
+            <a:picLocks noChangeAspect="1"/>
+          </p:cNvPicPr>
+          <p:nvPr/>
+        </p:nvPicPr>
+        <p:blipFill>
+          <a:blip r:embed="rId9">
+            <a:extLst>
+              <a:ext uri="{96DAC541-7B7A-43D3-8B79-37D633B846F1}">
+                <asvg:svgBlip xmlns:asvg="http://schemas.microsoft.com/office/drawing/2016/SVG/main" r:embed="rId10"/>
+              </a:ext>
+            </a:extLst>
+          </a:blip>
+          <a:stretch>
+            <a:fillRect/>
+          </a:stretch>
+        </p:blipFill>
+        <p:spPr>
+          <a:xfrm>
+            <a:off x="4995779" y="5203835"/>
+            <a:ext cx="274320" cy="274320"/>
+          </a:xfrm>
+          <a:prstGeom prst="rect">
+            <a:avLst/>
+          </a:prstGeom>
+        </p:spPr>
+      </p:pic>
       <p:cxnSp>
         <p:nvCxnSpPr>
-          <p:cNvPr id="123" name="Straight Arrow Connector 122">
-            <a:extLst>
-              <a:ext uri="{FF2B5EF4-FFF2-40B4-BE49-F238E27FC236}">
-                <a16:creationId xmlns:a16="http://schemas.microsoft.com/office/drawing/2014/main" id="{85968E5C-53C3-D447-9C39-8C8FFF4ABEF0}"/>
+          <p:cNvPr id="91" name="Straight Arrow Connector 90">
+            <a:extLst>
+              <a:ext uri="{FF2B5EF4-FFF2-40B4-BE49-F238E27FC236}">
+                <a16:creationId xmlns:a16="http://schemas.microsoft.com/office/drawing/2014/main" id="{B2C25A49-0C41-5040-85F8-7DB2AB8114D7}"/>
               </a:ext>
             </a:extLst>
           </p:cNvPr>
           <p:cNvCxnSpPr>
             <a:cxnSpLocks/>
-            <a:stCxn id="95" idx="2"/>
-            <a:endCxn id="94" idx="0"/>
+            <a:stCxn id="99" idx="0"/>
           </p:cNvCxnSpPr>
           <p:nvPr/>
         </p:nvCxnSpPr>
         <p:spPr bwMode="auto">
-          <a:xfrm>
-            <a:off x="2606066" y="3768619"/>
-            <a:ext cx="1752" cy="413860"/>
+          <a:xfrm flipV="1">
+            <a:off x="8901774" y="450867"/>
+            <a:ext cx="0" cy="1693895"/>
           </a:xfrm>
           <a:prstGeom prst="straightConnector1">
             <a:avLst/>
@@ -19143,1276 +20314,6 @@
           </a:fontRef>
         </p:style>
       </p:cxnSp>
-      <p:sp>
-        <p:nvSpPr>
-          <p:cNvPr id="124" name="TextBox 123">
-            <a:extLst>
-              <a:ext uri="{FF2B5EF4-FFF2-40B4-BE49-F238E27FC236}">
-                <a16:creationId xmlns:a16="http://schemas.microsoft.com/office/drawing/2014/main" id="{4A9E0648-F1A3-5D4E-BD75-44452334C8E4}"/>
-              </a:ext>
-            </a:extLst>
-          </p:cNvPr>
-          <p:cNvSpPr txBox="1"/>
-          <p:nvPr/>
-        </p:nvSpPr>
-        <p:spPr>
-          <a:xfrm>
-            <a:off x="5670985" y="4185453"/>
-            <a:ext cx="1829912" cy="246221"/>
-          </a:xfrm>
-          <a:prstGeom prst="rect">
-            <a:avLst/>
-          </a:prstGeom>
-          <a:noFill/>
-        </p:spPr>
-        <p:txBody>
-          <a:bodyPr wrap="square" rtlCol="0" anchor="t">
-            <a:spAutoFit/>
-          </a:bodyPr>
-          <a:lstStyle/>
-          <a:p>
-            <a:pPr algn="ctr"/>
-            <a:r>
-              <a:rPr lang="en-US" sz="1000" i="1" dirty="0" err="1">
-                <a:latin typeface="Arial" panose="020B0604020202020204" pitchFamily="34" charset="0"/>
-                <a:cs typeface="Arial" panose="020B0604020202020204" pitchFamily="34" charset="0"/>
-              </a:rPr>
-              <a:t>Qumulo</a:t>
-            </a:r>
-            <a:r>
-              <a:rPr lang="en-US" sz="1000" i="1" dirty="0">
-                <a:latin typeface="Arial" panose="020B0604020202020204" pitchFamily="34" charset="0"/>
-                <a:cs typeface="Arial" panose="020B0604020202020204" pitchFamily="34" charset="0"/>
-              </a:rPr>
-              <a:t> Management</a:t>
-            </a:r>
-          </a:p>
-        </p:txBody>
-      </p:sp>
-      <p:pic>
-        <p:nvPicPr>
-          <p:cNvPr id="69" name="Graphic 108">
-            <a:extLst>
-              <a:ext uri="{FF2B5EF4-FFF2-40B4-BE49-F238E27FC236}">
-                <a16:creationId xmlns:a16="http://schemas.microsoft.com/office/drawing/2014/main" id="{4BF4CAF5-3CDA-DF41-B927-A6FAFA35A347}"/>
-              </a:ext>
-            </a:extLst>
-          </p:cNvPr>
-          <p:cNvPicPr>
-            <a:picLocks noChangeAspect="1" noChangeArrowheads="1"/>
-          </p:cNvPicPr>
-          <p:nvPr/>
-        </p:nvPicPr>
-        <p:blipFill>
-          <a:blip r:embed="rId23">
-            <a:extLst>
-              <a:ext uri="{96DAC541-7B7A-43D3-8B79-37D633B846F1}">
-                <asvg:svgBlip xmlns:asvg="http://schemas.microsoft.com/office/drawing/2016/SVG/main" r:embed="rId24"/>
-              </a:ext>
-            </a:extLst>
-          </a:blip>
-          <a:srcRect/>
-          <a:stretch/>
-        </p:blipFill>
-        <p:spPr bwMode="auto">
-          <a:xfrm>
-            <a:off x="5973313" y="4624242"/>
-            <a:ext cx="457200" cy="457200"/>
-          </a:xfrm>
-          <a:prstGeom prst="rect">
-            <a:avLst/>
-          </a:prstGeom>
-          <a:noFill/>
-          <a:ln>
-            <a:noFill/>
-          </a:ln>
-          <a:extLst>
-            <a:ext uri="{909E8E84-426E-40DD-AFC4-6F175D3DCCD1}">
-              <a14:hiddenFill xmlns:a14="http://schemas.microsoft.com/office/drawing/2010/main">
-                <a:solidFill>
-                  <a:srgbClr val="FFFFFF"/>
-                </a:solidFill>
-              </a14:hiddenFill>
-            </a:ext>
-            <a:ext uri="{91240B29-F687-4F45-9708-019B960494DF}">
-              <a14:hiddenLine xmlns:a14="http://schemas.microsoft.com/office/drawing/2010/main" w="9525">
-                <a:solidFill>
-                  <a:srgbClr val="000000"/>
-                </a:solidFill>
-                <a:miter lim="800000"/>
-                <a:headEnd/>
-                <a:tailEnd/>
-              </a14:hiddenLine>
-            </a:ext>
-          </a:extLst>
-        </p:spPr>
-      </p:pic>
-      <p:pic>
-        <p:nvPicPr>
-          <p:cNvPr id="70" name="Graphic 15">
-            <a:extLst>
-              <a:ext uri="{FF2B5EF4-FFF2-40B4-BE49-F238E27FC236}">
-                <a16:creationId xmlns:a16="http://schemas.microsoft.com/office/drawing/2014/main" id="{DCBF1440-0336-A642-B2FA-274B29062FFC}"/>
-              </a:ext>
-            </a:extLst>
-          </p:cNvPr>
-          <p:cNvPicPr>
-            <a:picLocks noChangeAspect="1" noChangeArrowheads="1"/>
-          </p:cNvPicPr>
-          <p:nvPr/>
-        </p:nvPicPr>
-        <p:blipFill>
-          <a:blip r:embed="rId25">
-            <a:extLst>
-              <a:ext uri="{28A0092B-C50C-407E-A947-70E740481C1C}">
-                <a14:useLocalDpi xmlns:a14="http://schemas.microsoft.com/office/drawing/2010/main" val="0"/>
-              </a:ext>
-            </a:extLst>
-          </a:blip>
-          <a:srcRect/>
-          <a:stretch>
-            <a:fillRect/>
-          </a:stretch>
-        </p:blipFill>
-        <p:spPr bwMode="auto">
-          <a:xfrm>
-            <a:off x="5813405" y="408879"/>
-            <a:ext cx="591033" cy="591033"/>
-          </a:xfrm>
-          <a:prstGeom prst="rect">
-            <a:avLst/>
-          </a:prstGeom>
-          <a:noFill/>
-          <a:ln>
-            <a:noFill/>
-          </a:ln>
-          <a:extLst>
-            <a:ext uri="{909E8E84-426E-40DD-AFC4-6F175D3DCCD1}">
-              <a14:hiddenFill xmlns:a14="http://schemas.microsoft.com/office/drawing/2010/main">
-                <a:solidFill>
-                  <a:srgbClr val="FFFFFF"/>
-                </a:solidFill>
-              </a14:hiddenFill>
-            </a:ext>
-            <a:ext uri="{91240B29-F687-4F45-9708-019B960494DF}">
-              <a14:hiddenLine xmlns:a14="http://schemas.microsoft.com/office/drawing/2010/main" w="9525">
-                <a:solidFill>
-                  <a:srgbClr val="000000"/>
-                </a:solidFill>
-                <a:miter lim="800000"/>
-                <a:headEnd/>
-                <a:tailEnd/>
-              </a14:hiddenLine>
-            </a:ext>
-          </a:extLst>
-        </p:spPr>
-      </p:pic>
-      <p:sp>
-        <p:nvSpPr>
-          <p:cNvPr id="71" name="TextBox 11">
-            <a:extLst>
-              <a:ext uri="{FF2B5EF4-FFF2-40B4-BE49-F238E27FC236}">
-                <a16:creationId xmlns:a16="http://schemas.microsoft.com/office/drawing/2014/main" id="{961E1DE9-E2D2-6844-8BEE-C33EBA7F183F}"/>
-              </a:ext>
-            </a:extLst>
-          </p:cNvPr>
-          <p:cNvSpPr txBox="1">
-            <a:spLocks noChangeArrowheads="1"/>
-          </p:cNvSpPr>
-          <p:nvPr/>
-        </p:nvSpPr>
-        <p:spPr bwMode="auto">
-          <a:xfrm>
-            <a:off x="5232704" y="990078"/>
-            <a:ext cx="1778027" cy="400110"/>
-          </a:xfrm>
-          <a:prstGeom prst="rect">
-            <a:avLst/>
-          </a:prstGeom>
-          <a:noFill/>
-          <a:ln>
-            <a:noFill/>
-          </a:ln>
-          <a:extLst>
-            <a:ext uri="{909E8E84-426E-40DD-AFC4-6F175D3DCCD1}">
-              <a14:hiddenFill xmlns:a14="http://schemas.microsoft.com/office/drawing/2010/main">
-                <a:solidFill>
-                  <a:srgbClr val="FFFFFF"/>
-                </a:solidFill>
-              </a14:hiddenFill>
-            </a:ext>
-            <a:ext uri="{91240B29-F687-4F45-9708-019B960494DF}">
-              <a14:hiddenLine xmlns:a14="http://schemas.microsoft.com/office/drawing/2010/main" w="9525">
-                <a:solidFill>
-                  <a:srgbClr val="000000"/>
-                </a:solidFill>
-                <a:miter lim="800000"/>
-                <a:headEnd/>
-                <a:tailEnd/>
-              </a14:hiddenLine>
-            </a:ext>
-          </a:extLst>
-        </p:spPr>
-        <p:txBody>
-          <a:bodyPr wrap="square">
-            <a:spAutoFit/>
-          </a:bodyPr>
-          <a:lstStyle>
-            <a:lvl1pPr>
-              <a:defRPr>
-                <a:solidFill>
-                  <a:schemeClr val="tx1"/>
-                </a:solidFill>
-                <a:latin typeface="Calibri" panose="020F0502020204030204" pitchFamily="34" charset="0"/>
-              </a:defRPr>
-            </a:lvl1pPr>
-            <a:lvl2pPr marL="742950" indent="-285750">
-              <a:defRPr>
-                <a:solidFill>
-                  <a:schemeClr val="tx1"/>
-                </a:solidFill>
-                <a:latin typeface="Calibri" panose="020F0502020204030204" pitchFamily="34" charset="0"/>
-              </a:defRPr>
-            </a:lvl2pPr>
-            <a:lvl3pPr marL="1143000" indent="-228600">
-              <a:defRPr>
-                <a:solidFill>
-                  <a:schemeClr val="tx1"/>
-                </a:solidFill>
-                <a:latin typeface="Calibri" panose="020F0502020204030204" pitchFamily="34" charset="0"/>
-              </a:defRPr>
-            </a:lvl3pPr>
-            <a:lvl4pPr marL="1600200" indent="-228600">
-              <a:defRPr>
-                <a:solidFill>
-                  <a:schemeClr val="tx1"/>
-                </a:solidFill>
-                <a:latin typeface="Calibri" panose="020F0502020204030204" pitchFamily="34" charset="0"/>
-              </a:defRPr>
-            </a:lvl4pPr>
-            <a:lvl5pPr marL="2057400" indent="-228600">
-              <a:defRPr>
-                <a:solidFill>
-                  <a:schemeClr val="tx1"/>
-                </a:solidFill>
-                <a:latin typeface="Calibri" panose="020F0502020204030204" pitchFamily="34" charset="0"/>
-              </a:defRPr>
-            </a:lvl5pPr>
-            <a:lvl6pPr marL="2514600" indent="-228600" eaLnBrk="0" fontAlgn="base" hangingPunct="0">
-              <a:spcBef>
-                <a:spcPct val="0"/>
-              </a:spcBef>
-              <a:spcAft>
-                <a:spcPct val="0"/>
-              </a:spcAft>
-              <a:defRPr>
-                <a:solidFill>
-                  <a:schemeClr val="tx1"/>
-                </a:solidFill>
-                <a:latin typeface="Calibri" panose="020F0502020204030204" pitchFamily="34" charset="0"/>
-              </a:defRPr>
-            </a:lvl6pPr>
-            <a:lvl7pPr marL="2971800" indent="-228600" eaLnBrk="0" fontAlgn="base" hangingPunct="0">
-              <a:spcBef>
-                <a:spcPct val="0"/>
-              </a:spcBef>
-              <a:spcAft>
-                <a:spcPct val="0"/>
-              </a:spcAft>
-              <a:defRPr>
-                <a:solidFill>
-                  <a:schemeClr val="tx1"/>
-                </a:solidFill>
-                <a:latin typeface="Calibri" panose="020F0502020204030204" pitchFamily="34" charset="0"/>
-              </a:defRPr>
-            </a:lvl7pPr>
-            <a:lvl8pPr marL="3429000" indent="-228600" eaLnBrk="0" fontAlgn="base" hangingPunct="0">
-              <a:spcBef>
-                <a:spcPct val="0"/>
-              </a:spcBef>
-              <a:spcAft>
-                <a:spcPct val="0"/>
-              </a:spcAft>
-              <a:defRPr>
-                <a:solidFill>
-                  <a:schemeClr val="tx1"/>
-                </a:solidFill>
-                <a:latin typeface="Calibri" panose="020F0502020204030204" pitchFamily="34" charset="0"/>
-              </a:defRPr>
-            </a:lvl8pPr>
-            <a:lvl9pPr marL="3886200" indent="-228600" eaLnBrk="0" fontAlgn="base" hangingPunct="0">
-              <a:spcBef>
-                <a:spcPct val="0"/>
-              </a:spcBef>
-              <a:spcAft>
-                <a:spcPct val="0"/>
-              </a:spcAft>
-              <a:defRPr>
-                <a:solidFill>
-                  <a:schemeClr val="tx1"/>
-                </a:solidFill>
-                <a:latin typeface="Calibri" panose="020F0502020204030204" pitchFamily="34" charset="0"/>
-              </a:defRPr>
-            </a:lvl9pPr>
-          </a:lstStyle>
-          <a:p>
-            <a:pPr algn="ctr" eaLnBrk="1" hangingPunct="1"/>
-            <a:r>
-              <a:rPr lang="en-US" altLang="en-US" sz="1000" dirty="0">
-                <a:latin typeface="Arial" panose="020B0604020202020204" pitchFamily="34" charset="0"/>
-                <a:ea typeface="Amazon Ember" panose="020B0603020204020204" pitchFamily="34" charset="0"/>
-                <a:cs typeface="Arial" panose="020B0604020202020204" pitchFamily="34" charset="0"/>
-              </a:rPr>
-              <a:t>AWS Systems </a:t>
-            </a:r>
-          </a:p>
-          <a:p>
-            <a:pPr algn="ctr" eaLnBrk="1" hangingPunct="1"/>
-            <a:r>
-              <a:rPr lang="en-US" altLang="en-US" sz="1000" dirty="0">
-                <a:latin typeface="Arial" panose="020B0604020202020204" pitchFamily="34" charset="0"/>
-                <a:ea typeface="Amazon Ember" panose="020B0603020204020204" pitchFamily="34" charset="0"/>
-                <a:cs typeface="Arial" panose="020B0604020202020204" pitchFamily="34" charset="0"/>
-              </a:rPr>
-              <a:t>Manager</a:t>
-            </a:r>
-          </a:p>
-        </p:txBody>
-      </p:sp>
-      <p:pic>
-        <p:nvPicPr>
-          <p:cNvPr id="74" name="Graphic 21">
-            <a:extLst>
-              <a:ext uri="{FF2B5EF4-FFF2-40B4-BE49-F238E27FC236}">
-                <a16:creationId xmlns:a16="http://schemas.microsoft.com/office/drawing/2014/main" id="{D1EC144A-6827-1841-9B41-65E7AD840BAC}"/>
-              </a:ext>
-            </a:extLst>
-          </p:cNvPr>
-          <p:cNvPicPr>
-            <a:picLocks noChangeAspect="1" noChangeArrowheads="1"/>
-          </p:cNvPicPr>
-          <p:nvPr/>
-        </p:nvPicPr>
-        <p:blipFill>
-          <a:blip r:embed="rId26">
-            <a:extLst>
-              <a:ext uri="{28A0092B-C50C-407E-A947-70E740481C1C}">
-                <a14:useLocalDpi xmlns:a14="http://schemas.microsoft.com/office/drawing/2010/main" val="0"/>
-              </a:ext>
-            </a:extLst>
-          </a:blip>
-          <a:srcRect/>
-          <a:stretch>
-            <a:fillRect/>
-          </a:stretch>
-        </p:blipFill>
-        <p:spPr bwMode="auto">
-          <a:xfrm>
-            <a:off x="5892254" y="2669819"/>
-            <a:ext cx="594360" cy="594360"/>
-          </a:xfrm>
-          <a:prstGeom prst="rect">
-            <a:avLst/>
-          </a:prstGeom>
-          <a:noFill/>
-          <a:ln>
-            <a:noFill/>
-          </a:ln>
-          <a:extLst>
-            <a:ext uri="{909E8E84-426E-40DD-AFC4-6F175D3DCCD1}">
-              <a14:hiddenFill xmlns:a14="http://schemas.microsoft.com/office/drawing/2010/main">
-                <a:solidFill>
-                  <a:srgbClr val="FFFFFF"/>
-                </a:solidFill>
-              </a14:hiddenFill>
-            </a:ext>
-            <a:ext uri="{91240B29-F687-4F45-9708-019B960494DF}">
-              <a14:hiddenLine xmlns:a14="http://schemas.microsoft.com/office/drawing/2010/main" w="9525">
-                <a:solidFill>
-                  <a:srgbClr val="000000"/>
-                </a:solidFill>
-                <a:miter lim="800000"/>
-                <a:headEnd/>
-                <a:tailEnd/>
-              </a14:hiddenLine>
-            </a:ext>
-          </a:extLst>
-        </p:spPr>
-      </p:pic>
-      <p:pic>
-        <p:nvPicPr>
-          <p:cNvPr id="75" name="Graphic 24">
-            <a:extLst>
-              <a:ext uri="{FF2B5EF4-FFF2-40B4-BE49-F238E27FC236}">
-                <a16:creationId xmlns:a16="http://schemas.microsoft.com/office/drawing/2014/main" id="{5D5161E4-FC4F-544A-B592-99AE2D2256FD}"/>
-              </a:ext>
-            </a:extLst>
-          </p:cNvPr>
-          <p:cNvPicPr>
-            <a:picLocks noChangeAspect="1" noChangeArrowheads="1"/>
-          </p:cNvPicPr>
-          <p:nvPr/>
-        </p:nvPicPr>
-        <p:blipFill>
-          <a:blip r:embed="rId27">
-            <a:extLst>
-              <a:ext uri="{28A0092B-C50C-407E-A947-70E740481C1C}">
-                <a14:useLocalDpi xmlns:a14="http://schemas.microsoft.com/office/drawing/2010/main" val="0"/>
-              </a:ext>
-            </a:extLst>
-          </a:blip>
-          <a:srcRect/>
-          <a:stretch>
-            <a:fillRect/>
-          </a:stretch>
-        </p:blipFill>
-        <p:spPr bwMode="auto">
-          <a:xfrm>
-            <a:off x="3539297" y="3333413"/>
-            <a:ext cx="457200" cy="457200"/>
-          </a:xfrm>
-          <a:prstGeom prst="rect">
-            <a:avLst/>
-          </a:prstGeom>
-          <a:noFill/>
-          <a:ln>
-            <a:noFill/>
-          </a:ln>
-          <a:extLst>
-            <a:ext uri="{909E8E84-426E-40DD-AFC4-6F175D3DCCD1}">
-              <a14:hiddenFill xmlns:a14="http://schemas.microsoft.com/office/drawing/2010/main">
-                <a:solidFill>
-                  <a:srgbClr val="FFFFFF"/>
-                </a:solidFill>
-              </a14:hiddenFill>
-            </a:ext>
-            <a:ext uri="{91240B29-F687-4F45-9708-019B960494DF}">
-              <a14:hiddenLine xmlns:a14="http://schemas.microsoft.com/office/drawing/2010/main" w="9525">
-                <a:solidFill>
-                  <a:srgbClr val="000000"/>
-                </a:solidFill>
-                <a:miter lim="800000"/>
-                <a:headEnd/>
-                <a:tailEnd/>
-              </a14:hiddenLine>
-            </a:ext>
-          </a:extLst>
-        </p:spPr>
-      </p:pic>
-      <p:sp>
-        <p:nvSpPr>
-          <p:cNvPr id="76" name="TextBox 22">
-            <a:extLst>
-              <a:ext uri="{FF2B5EF4-FFF2-40B4-BE49-F238E27FC236}">
-                <a16:creationId xmlns:a16="http://schemas.microsoft.com/office/drawing/2014/main" id="{F05CA681-D745-ED40-A2F0-F68C61F65903}"/>
-              </a:ext>
-            </a:extLst>
-          </p:cNvPr>
-          <p:cNvSpPr txBox="1">
-            <a:spLocks noChangeArrowheads="1"/>
-          </p:cNvSpPr>
-          <p:nvPr/>
-        </p:nvSpPr>
-        <p:spPr bwMode="auto">
-          <a:xfrm>
-            <a:off x="3085041" y="3737165"/>
-            <a:ext cx="1339850" cy="246221"/>
-          </a:xfrm>
-          <a:prstGeom prst="rect">
-            <a:avLst/>
-          </a:prstGeom>
-          <a:noFill/>
-          <a:ln>
-            <a:noFill/>
-          </a:ln>
-          <a:extLst>
-            <a:ext uri="{909E8E84-426E-40DD-AFC4-6F175D3DCCD1}">
-              <a14:hiddenFill xmlns:a14="http://schemas.microsoft.com/office/drawing/2010/main">
-                <a:solidFill>
-                  <a:srgbClr val="FFFFFF"/>
-                </a:solidFill>
-              </a14:hiddenFill>
-            </a:ext>
-            <a:ext uri="{91240B29-F687-4F45-9708-019B960494DF}">
-              <a14:hiddenLine xmlns:a14="http://schemas.microsoft.com/office/drawing/2010/main" w="9525">
-                <a:solidFill>
-                  <a:srgbClr val="000000"/>
-                </a:solidFill>
-                <a:miter lim="800000"/>
-                <a:headEnd/>
-                <a:tailEnd/>
-              </a14:hiddenLine>
-            </a:ext>
-          </a:extLst>
-        </p:spPr>
-        <p:style>
-          <a:lnRef idx="0">
-            <a:scrgbClr r="0" g="0" b="0"/>
-          </a:lnRef>
-          <a:fillRef idx="0">
-            <a:scrgbClr r="0" g="0" b="0"/>
-          </a:fillRef>
-          <a:effectRef idx="0">
-            <a:scrgbClr r="0" g="0" b="0"/>
-          </a:effectRef>
-          <a:fontRef idx="major"/>
-        </p:style>
-        <p:txBody>
-          <a:bodyPr wrap="square">
-            <a:spAutoFit/>
-          </a:bodyPr>
-          <a:lstStyle>
-            <a:lvl1pPr>
-              <a:defRPr>
-                <a:latin typeface="+mj-lt"/>
-                <a:ea typeface="+mj-ea"/>
-                <a:cs typeface="+mj-cs"/>
-              </a:defRPr>
-            </a:lvl1pPr>
-            <a:lvl2pPr>
-              <a:defRPr>
-                <a:latin typeface="+mj-lt"/>
-                <a:ea typeface="+mj-ea"/>
-                <a:cs typeface="+mj-cs"/>
-              </a:defRPr>
-            </a:lvl2pPr>
-            <a:lvl3pPr>
-              <a:defRPr>
-                <a:latin typeface="+mj-lt"/>
-                <a:ea typeface="+mj-ea"/>
-                <a:cs typeface="+mj-cs"/>
-              </a:defRPr>
-            </a:lvl3pPr>
-            <a:lvl4pPr>
-              <a:defRPr>
-                <a:latin typeface="+mj-lt"/>
-                <a:ea typeface="+mj-ea"/>
-                <a:cs typeface="+mj-cs"/>
-              </a:defRPr>
-            </a:lvl4pPr>
-            <a:lvl5pPr>
-              <a:defRPr>
-                <a:latin typeface="+mj-lt"/>
-                <a:ea typeface="+mj-ea"/>
-                <a:cs typeface="+mj-cs"/>
-              </a:defRPr>
-            </a:lvl5pPr>
-            <a:lvl6pPr>
-              <a:defRPr>
-                <a:latin typeface="+mj-lt"/>
-                <a:ea typeface="+mj-ea"/>
-                <a:cs typeface="+mj-cs"/>
-              </a:defRPr>
-            </a:lvl6pPr>
-            <a:lvl7pPr>
-              <a:defRPr>
-                <a:latin typeface="+mj-lt"/>
-                <a:ea typeface="+mj-ea"/>
-                <a:cs typeface="+mj-cs"/>
-              </a:defRPr>
-            </a:lvl7pPr>
-            <a:lvl8pPr>
-              <a:defRPr>
-                <a:latin typeface="+mj-lt"/>
-                <a:ea typeface="+mj-ea"/>
-                <a:cs typeface="+mj-cs"/>
-              </a:defRPr>
-            </a:lvl8pPr>
-            <a:lvl9pPr>
-              <a:defRPr>
-                <a:latin typeface="+mj-lt"/>
-                <a:ea typeface="+mj-ea"/>
-                <a:cs typeface="+mj-cs"/>
-              </a:defRPr>
-            </a:lvl9pPr>
-          </a:lstStyle>
-          <a:p>
-            <a:pPr algn="ctr" eaLnBrk="1" hangingPunct="1"/>
-            <a:r>
-              <a:rPr lang="en-US" altLang="en-US" sz="1000" dirty="0">
-                <a:latin typeface="Arial" panose="020B0604020202020204" pitchFamily="34" charset="0"/>
-                <a:ea typeface="Amazon Ember" panose="020B0603020204020204" pitchFamily="34" charset="0"/>
-                <a:cs typeface="Arial" panose="020B0604020202020204" pitchFamily="34" charset="0"/>
-              </a:rPr>
-              <a:t>Optional: NLB</a:t>
-            </a:r>
-          </a:p>
-        </p:txBody>
-      </p:sp>
-      <p:pic>
-        <p:nvPicPr>
-          <p:cNvPr id="77" name="Graphic 19">
-            <a:extLst>
-              <a:ext uri="{FF2B5EF4-FFF2-40B4-BE49-F238E27FC236}">
-                <a16:creationId xmlns:a16="http://schemas.microsoft.com/office/drawing/2014/main" id="{A9F82018-528E-5A45-AB4A-6EE4E6014E71}"/>
-              </a:ext>
-            </a:extLst>
-          </p:cNvPr>
-          <p:cNvPicPr>
-            <a:picLocks noChangeAspect="1" noChangeArrowheads="1"/>
-          </p:cNvPicPr>
-          <p:nvPr/>
-        </p:nvPicPr>
-        <p:blipFill>
-          <a:blip r:embed="rId28">
-            <a:extLst>
-              <a:ext uri="{28A0092B-C50C-407E-A947-70E740481C1C}">
-                <a14:useLocalDpi xmlns:a14="http://schemas.microsoft.com/office/drawing/2010/main" val="0"/>
-              </a:ext>
-            </a:extLst>
-          </a:blip>
-          <a:srcRect/>
-          <a:stretch>
-            <a:fillRect/>
-          </a:stretch>
-        </p:blipFill>
-        <p:spPr bwMode="auto">
-          <a:xfrm>
-            <a:off x="4975740" y="416123"/>
-            <a:ext cx="595978" cy="595978"/>
-          </a:xfrm>
-          <a:prstGeom prst="rect">
-            <a:avLst/>
-          </a:prstGeom>
-          <a:noFill/>
-          <a:ln>
-            <a:noFill/>
-          </a:ln>
-          <a:extLst>
-            <a:ext uri="{909E8E84-426E-40DD-AFC4-6F175D3DCCD1}">
-              <a14:hiddenFill xmlns:a14="http://schemas.microsoft.com/office/drawing/2010/main">
-                <a:solidFill>
-                  <a:srgbClr val="FFFFFF"/>
-                </a:solidFill>
-              </a14:hiddenFill>
-            </a:ext>
-            <a:ext uri="{91240B29-F687-4F45-9708-019B960494DF}">
-              <a14:hiddenLine xmlns:a14="http://schemas.microsoft.com/office/drawing/2010/main" w="9525">
-                <a:solidFill>
-                  <a:srgbClr val="000000"/>
-                </a:solidFill>
-                <a:miter lim="800000"/>
-                <a:headEnd/>
-                <a:tailEnd/>
-              </a14:hiddenLine>
-            </a:ext>
-          </a:extLst>
-        </p:spPr>
-      </p:pic>
-      <p:sp>
-        <p:nvSpPr>
-          <p:cNvPr id="78" name="TextBox 12">
-            <a:extLst>
-              <a:ext uri="{FF2B5EF4-FFF2-40B4-BE49-F238E27FC236}">
-                <a16:creationId xmlns:a16="http://schemas.microsoft.com/office/drawing/2014/main" id="{FA984FBF-FB60-8940-AF5F-CED24877132E}"/>
-              </a:ext>
-            </a:extLst>
-          </p:cNvPr>
-          <p:cNvSpPr txBox="1">
-            <a:spLocks noChangeArrowheads="1"/>
-          </p:cNvSpPr>
-          <p:nvPr/>
-        </p:nvSpPr>
-        <p:spPr bwMode="auto">
-          <a:xfrm>
-            <a:off x="4760741" y="1015257"/>
-            <a:ext cx="1035068" cy="246221"/>
-          </a:xfrm>
-          <a:prstGeom prst="rect">
-            <a:avLst/>
-          </a:prstGeom>
-          <a:noFill/>
-          <a:ln>
-            <a:noFill/>
-          </a:ln>
-          <a:extLst>
-            <a:ext uri="{909E8E84-426E-40DD-AFC4-6F175D3DCCD1}">
-              <a14:hiddenFill xmlns:a14="http://schemas.microsoft.com/office/drawing/2010/main">
-                <a:solidFill>
-                  <a:srgbClr val="FFFFFF"/>
-                </a:solidFill>
-              </a14:hiddenFill>
-            </a:ext>
-            <a:ext uri="{91240B29-F687-4F45-9708-019B960494DF}">
-              <a14:hiddenLine xmlns:a14="http://schemas.microsoft.com/office/drawing/2010/main" w="9525">
-                <a:solidFill>
-                  <a:srgbClr val="000000"/>
-                </a:solidFill>
-                <a:miter lim="800000"/>
-                <a:headEnd/>
-                <a:tailEnd/>
-              </a14:hiddenLine>
-            </a:ext>
-          </a:extLst>
-        </p:spPr>
-        <p:txBody>
-          <a:bodyPr wrap="square">
-            <a:spAutoFit/>
-          </a:bodyPr>
-          <a:lstStyle>
-            <a:lvl1pPr>
-              <a:defRPr>
-                <a:solidFill>
-                  <a:schemeClr val="tx1"/>
-                </a:solidFill>
-                <a:latin typeface="Calibri" panose="020F0502020204030204" pitchFamily="34" charset="0"/>
-              </a:defRPr>
-            </a:lvl1pPr>
-            <a:lvl2pPr marL="742950" indent="-285750">
-              <a:defRPr>
-                <a:solidFill>
-                  <a:schemeClr val="tx1"/>
-                </a:solidFill>
-                <a:latin typeface="Calibri" panose="020F0502020204030204" pitchFamily="34" charset="0"/>
-              </a:defRPr>
-            </a:lvl2pPr>
-            <a:lvl3pPr marL="1143000" indent="-228600">
-              <a:defRPr>
-                <a:solidFill>
-                  <a:schemeClr val="tx1"/>
-                </a:solidFill>
-                <a:latin typeface="Calibri" panose="020F0502020204030204" pitchFamily="34" charset="0"/>
-              </a:defRPr>
-            </a:lvl3pPr>
-            <a:lvl4pPr marL="1600200" indent="-228600">
-              <a:defRPr>
-                <a:solidFill>
-                  <a:schemeClr val="tx1"/>
-                </a:solidFill>
-                <a:latin typeface="Calibri" panose="020F0502020204030204" pitchFamily="34" charset="0"/>
-              </a:defRPr>
-            </a:lvl4pPr>
-            <a:lvl5pPr marL="2057400" indent="-228600">
-              <a:defRPr>
-                <a:solidFill>
-                  <a:schemeClr val="tx1"/>
-                </a:solidFill>
-                <a:latin typeface="Calibri" panose="020F0502020204030204" pitchFamily="34" charset="0"/>
-              </a:defRPr>
-            </a:lvl5pPr>
-            <a:lvl6pPr marL="2514600" indent="-228600" eaLnBrk="0" fontAlgn="base" hangingPunct="0">
-              <a:spcBef>
-                <a:spcPct val="0"/>
-              </a:spcBef>
-              <a:spcAft>
-                <a:spcPct val="0"/>
-              </a:spcAft>
-              <a:defRPr>
-                <a:solidFill>
-                  <a:schemeClr val="tx1"/>
-                </a:solidFill>
-                <a:latin typeface="Calibri" panose="020F0502020204030204" pitchFamily="34" charset="0"/>
-              </a:defRPr>
-            </a:lvl6pPr>
-            <a:lvl7pPr marL="2971800" indent="-228600" eaLnBrk="0" fontAlgn="base" hangingPunct="0">
-              <a:spcBef>
-                <a:spcPct val="0"/>
-              </a:spcBef>
-              <a:spcAft>
-                <a:spcPct val="0"/>
-              </a:spcAft>
-              <a:defRPr>
-                <a:solidFill>
-                  <a:schemeClr val="tx1"/>
-                </a:solidFill>
-                <a:latin typeface="Calibri" panose="020F0502020204030204" pitchFamily="34" charset="0"/>
-              </a:defRPr>
-            </a:lvl7pPr>
-            <a:lvl8pPr marL="3429000" indent="-228600" eaLnBrk="0" fontAlgn="base" hangingPunct="0">
-              <a:spcBef>
-                <a:spcPct val="0"/>
-              </a:spcBef>
-              <a:spcAft>
-                <a:spcPct val="0"/>
-              </a:spcAft>
-              <a:defRPr>
-                <a:solidFill>
-                  <a:schemeClr val="tx1"/>
-                </a:solidFill>
-                <a:latin typeface="Calibri" panose="020F0502020204030204" pitchFamily="34" charset="0"/>
-              </a:defRPr>
-            </a:lvl8pPr>
-            <a:lvl9pPr marL="3886200" indent="-228600" eaLnBrk="0" fontAlgn="base" hangingPunct="0">
-              <a:spcBef>
-                <a:spcPct val="0"/>
-              </a:spcBef>
-              <a:spcAft>
-                <a:spcPct val="0"/>
-              </a:spcAft>
-              <a:defRPr>
-                <a:solidFill>
-                  <a:schemeClr val="tx1"/>
-                </a:solidFill>
-                <a:latin typeface="Calibri" panose="020F0502020204030204" pitchFamily="34" charset="0"/>
-              </a:defRPr>
-            </a:lvl9pPr>
-          </a:lstStyle>
-          <a:p>
-            <a:pPr algn="ctr" eaLnBrk="1" hangingPunct="1"/>
-            <a:r>
-              <a:rPr lang="en-US" altLang="en-US" sz="1000" dirty="0">
-                <a:latin typeface="Arial" panose="020B0604020202020204" pitchFamily="34" charset="0"/>
-                <a:ea typeface="Amazon Ember" panose="020B0603020204020204" pitchFamily="34" charset="0"/>
-                <a:cs typeface="Arial" panose="020B0604020202020204" pitchFamily="34" charset="0"/>
-              </a:rPr>
-              <a:t>AWS IAM</a:t>
-            </a:r>
-          </a:p>
-        </p:txBody>
-      </p:sp>
-      <p:pic>
-        <p:nvPicPr>
-          <p:cNvPr id="80" name="Graphic 17">
-            <a:extLst>
-              <a:ext uri="{FF2B5EF4-FFF2-40B4-BE49-F238E27FC236}">
-                <a16:creationId xmlns:a16="http://schemas.microsoft.com/office/drawing/2014/main" id="{C9A65B73-C953-4C43-92E0-70465C118649}"/>
-              </a:ext>
-            </a:extLst>
-          </p:cNvPr>
-          <p:cNvPicPr>
-            <a:picLocks noChangeAspect="1" noChangeArrowheads="1"/>
-          </p:cNvPicPr>
-          <p:nvPr/>
-        </p:nvPicPr>
-        <p:blipFill>
-          <a:blip r:embed="rId29">
-            <a:extLst>
-              <a:ext uri="{28A0092B-C50C-407E-A947-70E740481C1C}">
-                <a14:useLocalDpi xmlns:a14="http://schemas.microsoft.com/office/drawing/2010/main" val="0"/>
-              </a:ext>
-            </a:extLst>
-          </a:blip>
-          <a:srcRect/>
-          <a:stretch>
-            <a:fillRect/>
-          </a:stretch>
-        </p:blipFill>
-        <p:spPr bwMode="auto">
-          <a:xfrm>
-            <a:off x="4128449" y="414396"/>
-            <a:ext cx="595315" cy="595315"/>
-          </a:xfrm>
-          <a:prstGeom prst="rect">
-            <a:avLst/>
-          </a:prstGeom>
-          <a:noFill/>
-          <a:ln>
-            <a:noFill/>
-          </a:ln>
-          <a:extLst>
-            <a:ext uri="{909E8E84-426E-40DD-AFC4-6F175D3DCCD1}">
-              <a14:hiddenFill xmlns:a14="http://schemas.microsoft.com/office/drawing/2010/main">
-                <a:solidFill>
-                  <a:srgbClr val="FFFFFF"/>
-                </a:solidFill>
-              </a14:hiddenFill>
-            </a:ext>
-            <a:ext uri="{91240B29-F687-4F45-9708-019B960494DF}">
-              <a14:hiddenLine xmlns:a14="http://schemas.microsoft.com/office/drawing/2010/main" w="9525">
-                <a:solidFill>
-                  <a:srgbClr val="000000"/>
-                </a:solidFill>
-                <a:miter lim="800000"/>
-                <a:headEnd/>
-                <a:tailEnd/>
-              </a14:hiddenLine>
-            </a:ext>
-          </a:extLst>
-        </p:spPr>
-      </p:pic>
-      <p:sp>
-        <p:nvSpPr>
-          <p:cNvPr id="81" name="TextBox 11">
-            <a:extLst>
-              <a:ext uri="{FF2B5EF4-FFF2-40B4-BE49-F238E27FC236}">
-                <a16:creationId xmlns:a16="http://schemas.microsoft.com/office/drawing/2014/main" id="{BDD7DE52-905B-6D48-BDFD-4664381AD57E}"/>
-              </a:ext>
-            </a:extLst>
-          </p:cNvPr>
-          <p:cNvSpPr txBox="1">
-            <a:spLocks noChangeArrowheads="1"/>
-          </p:cNvSpPr>
-          <p:nvPr/>
-        </p:nvSpPr>
-        <p:spPr bwMode="auto">
-          <a:xfrm>
-            <a:off x="3752395" y="1016594"/>
-            <a:ext cx="1339444" cy="400110"/>
-          </a:xfrm>
-          <a:prstGeom prst="rect">
-            <a:avLst/>
-          </a:prstGeom>
-          <a:noFill/>
-          <a:ln>
-            <a:noFill/>
-          </a:ln>
-          <a:extLst>
-            <a:ext uri="{909E8E84-426E-40DD-AFC4-6F175D3DCCD1}">
-              <a14:hiddenFill xmlns:a14="http://schemas.microsoft.com/office/drawing/2010/main">
-                <a:solidFill>
-                  <a:srgbClr val="FFFFFF"/>
-                </a:solidFill>
-              </a14:hiddenFill>
-            </a:ext>
-            <a:ext uri="{91240B29-F687-4F45-9708-019B960494DF}">
-              <a14:hiddenLine xmlns:a14="http://schemas.microsoft.com/office/drawing/2010/main" w="9525">
-                <a:solidFill>
-                  <a:srgbClr val="000000"/>
-                </a:solidFill>
-                <a:miter lim="800000"/>
-                <a:headEnd/>
-                <a:tailEnd/>
-              </a14:hiddenLine>
-            </a:ext>
-          </a:extLst>
-        </p:spPr>
-        <p:txBody>
-          <a:bodyPr wrap="square">
-            <a:spAutoFit/>
-          </a:bodyPr>
-          <a:lstStyle>
-            <a:lvl1pPr>
-              <a:defRPr>
-                <a:solidFill>
-                  <a:schemeClr val="tx1"/>
-                </a:solidFill>
-                <a:latin typeface="Calibri" panose="020F0502020204030204" pitchFamily="34" charset="0"/>
-              </a:defRPr>
-            </a:lvl1pPr>
-            <a:lvl2pPr marL="742950" indent="-285750">
-              <a:defRPr>
-                <a:solidFill>
-                  <a:schemeClr val="tx1"/>
-                </a:solidFill>
-                <a:latin typeface="Calibri" panose="020F0502020204030204" pitchFamily="34" charset="0"/>
-              </a:defRPr>
-            </a:lvl2pPr>
-            <a:lvl3pPr marL="1143000" indent="-228600">
-              <a:defRPr>
-                <a:solidFill>
-                  <a:schemeClr val="tx1"/>
-                </a:solidFill>
-                <a:latin typeface="Calibri" panose="020F0502020204030204" pitchFamily="34" charset="0"/>
-              </a:defRPr>
-            </a:lvl3pPr>
-            <a:lvl4pPr marL="1600200" indent="-228600">
-              <a:defRPr>
-                <a:solidFill>
-                  <a:schemeClr val="tx1"/>
-                </a:solidFill>
-                <a:latin typeface="Calibri" panose="020F0502020204030204" pitchFamily="34" charset="0"/>
-              </a:defRPr>
-            </a:lvl4pPr>
-            <a:lvl5pPr marL="2057400" indent="-228600">
-              <a:defRPr>
-                <a:solidFill>
-                  <a:schemeClr val="tx1"/>
-                </a:solidFill>
-                <a:latin typeface="Calibri" panose="020F0502020204030204" pitchFamily="34" charset="0"/>
-              </a:defRPr>
-            </a:lvl5pPr>
-            <a:lvl6pPr marL="2514600" indent="-228600" eaLnBrk="0" fontAlgn="base" hangingPunct="0">
-              <a:spcBef>
-                <a:spcPct val="0"/>
-              </a:spcBef>
-              <a:spcAft>
-                <a:spcPct val="0"/>
-              </a:spcAft>
-              <a:defRPr>
-                <a:solidFill>
-                  <a:schemeClr val="tx1"/>
-                </a:solidFill>
-                <a:latin typeface="Calibri" panose="020F0502020204030204" pitchFamily="34" charset="0"/>
-              </a:defRPr>
-            </a:lvl6pPr>
-            <a:lvl7pPr marL="2971800" indent="-228600" eaLnBrk="0" fontAlgn="base" hangingPunct="0">
-              <a:spcBef>
-                <a:spcPct val="0"/>
-              </a:spcBef>
-              <a:spcAft>
-                <a:spcPct val="0"/>
-              </a:spcAft>
-              <a:defRPr>
-                <a:solidFill>
-                  <a:schemeClr val="tx1"/>
-                </a:solidFill>
-                <a:latin typeface="Calibri" panose="020F0502020204030204" pitchFamily="34" charset="0"/>
-              </a:defRPr>
-            </a:lvl7pPr>
-            <a:lvl8pPr marL="3429000" indent="-228600" eaLnBrk="0" fontAlgn="base" hangingPunct="0">
-              <a:spcBef>
-                <a:spcPct val="0"/>
-              </a:spcBef>
-              <a:spcAft>
-                <a:spcPct val="0"/>
-              </a:spcAft>
-              <a:defRPr>
-                <a:solidFill>
-                  <a:schemeClr val="tx1"/>
-                </a:solidFill>
-                <a:latin typeface="Calibri" panose="020F0502020204030204" pitchFamily="34" charset="0"/>
-              </a:defRPr>
-            </a:lvl8pPr>
-            <a:lvl9pPr marL="3886200" indent="-228600" eaLnBrk="0" fontAlgn="base" hangingPunct="0">
-              <a:spcBef>
-                <a:spcPct val="0"/>
-              </a:spcBef>
-              <a:spcAft>
-                <a:spcPct val="0"/>
-              </a:spcAft>
-              <a:defRPr>
-                <a:solidFill>
-                  <a:schemeClr val="tx1"/>
-                </a:solidFill>
-                <a:latin typeface="Calibri" panose="020F0502020204030204" pitchFamily="34" charset="0"/>
-              </a:defRPr>
-            </a:lvl9pPr>
-          </a:lstStyle>
-          <a:p>
-            <a:pPr algn="ctr" eaLnBrk="1" hangingPunct="1"/>
-            <a:r>
-              <a:rPr lang="en-US" altLang="en-US" sz="1000" dirty="0">
-                <a:latin typeface="Arial" panose="020B0604020202020204" pitchFamily="34" charset="0"/>
-                <a:ea typeface="Amazon Ember" panose="020B0603020204020204" pitchFamily="34" charset="0"/>
-                <a:cs typeface="Arial" panose="020B0604020202020204" pitchFamily="34" charset="0"/>
-              </a:rPr>
-              <a:t>AWS Secrets</a:t>
-            </a:r>
-          </a:p>
-          <a:p>
-            <a:pPr algn="ctr" eaLnBrk="1" hangingPunct="1"/>
-            <a:r>
-              <a:rPr lang="en-US" altLang="en-US" sz="1000" dirty="0">
-                <a:latin typeface="Arial" panose="020B0604020202020204" pitchFamily="34" charset="0"/>
-                <a:ea typeface="Amazon Ember" panose="020B0603020204020204" pitchFamily="34" charset="0"/>
-                <a:cs typeface="Arial" panose="020B0604020202020204" pitchFamily="34" charset="0"/>
-              </a:rPr>
-              <a:t> Manager</a:t>
-            </a:r>
-          </a:p>
-        </p:txBody>
-      </p:sp>
-      <p:pic>
-        <p:nvPicPr>
-          <p:cNvPr id="82" name="Graphic 7">
-            <a:extLst>
-              <a:ext uri="{FF2B5EF4-FFF2-40B4-BE49-F238E27FC236}">
-                <a16:creationId xmlns:a16="http://schemas.microsoft.com/office/drawing/2014/main" id="{D8A4905B-A884-4F4C-A120-6DBB6A20202F}"/>
-              </a:ext>
-            </a:extLst>
-          </p:cNvPr>
-          <p:cNvPicPr>
-            <a:picLocks noChangeAspect="1" noChangeArrowheads="1"/>
-          </p:cNvPicPr>
-          <p:nvPr/>
-        </p:nvPicPr>
-        <p:blipFill>
-          <a:blip r:embed="rId30">
-            <a:extLst>
-              <a:ext uri="{28A0092B-C50C-407E-A947-70E740481C1C}">
-                <a14:useLocalDpi xmlns:a14="http://schemas.microsoft.com/office/drawing/2010/main" val="0"/>
-              </a:ext>
-            </a:extLst>
-          </a:blip>
-          <a:srcRect/>
-          <a:stretch>
-            <a:fillRect/>
-          </a:stretch>
-        </p:blipFill>
-        <p:spPr bwMode="auto">
-          <a:xfrm>
-            <a:off x="3303351" y="421989"/>
-            <a:ext cx="579144" cy="579144"/>
-          </a:xfrm>
-          <a:prstGeom prst="rect">
-            <a:avLst/>
-          </a:prstGeom>
-          <a:noFill/>
-          <a:ln>
-            <a:noFill/>
-          </a:ln>
-          <a:extLst>
-            <a:ext uri="{909E8E84-426E-40DD-AFC4-6F175D3DCCD1}">
-              <a14:hiddenFill xmlns:a14="http://schemas.microsoft.com/office/drawing/2010/main">
-                <a:solidFill>
-                  <a:srgbClr val="FFFFFF"/>
-                </a:solidFill>
-              </a14:hiddenFill>
-            </a:ext>
-            <a:ext uri="{91240B29-F687-4F45-9708-019B960494DF}">
-              <a14:hiddenLine xmlns:a14="http://schemas.microsoft.com/office/drawing/2010/main" w="9525">
-                <a:solidFill>
-                  <a:srgbClr val="000000"/>
-                </a:solidFill>
-                <a:miter lim="800000"/>
-                <a:headEnd/>
-                <a:tailEnd/>
-              </a14:hiddenLine>
-            </a:ext>
-          </a:extLst>
-        </p:spPr>
-      </p:pic>
-      <p:sp>
-        <p:nvSpPr>
-          <p:cNvPr id="83" name="TextBox 9">
-            <a:extLst>
-              <a:ext uri="{FF2B5EF4-FFF2-40B4-BE49-F238E27FC236}">
-                <a16:creationId xmlns:a16="http://schemas.microsoft.com/office/drawing/2014/main" id="{BB423690-BD4E-2E43-8E66-0120662E336A}"/>
-              </a:ext>
-            </a:extLst>
-          </p:cNvPr>
-          <p:cNvSpPr txBox="1">
-            <a:spLocks noChangeArrowheads="1"/>
-          </p:cNvSpPr>
-          <p:nvPr/>
-        </p:nvSpPr>
-        <p:spPr bwMode="auto">
-          <a:xfrm>
-            <a:off x="3047198" y="1010870"/>
-            <a:ext cx="1102903" cy="246221"/>
-          </a:xfrm>
-          <a:prstGeom prst="rect">
-            <a:avLst/>
-          </a:prstGeom>
-          <a:noFill/>
-          <a:ln>
-            <a:noFill/>
-          </a:ln>
-          <a:extLst>
-            <a:ext uri="{909E8E84-426E-40DD-AFC4-6F175D3DCCD1}">
-              <a14:hiddenFill xmlns:a14="http://schemas.microsoft.com/office/drawing/2010/main">
-                <a:solidFill>
-                  <a:srgbClr val="FFFFFF"/>
-                </a:solidFill>
-              </a14:hiddenFill>
-            </a:ext>
-            <a:ext uri="{91240B29-F687-4F45-9708-019B960494DF}">
-              <a14:hiddenLine xmlns:a14="http://schemas.microsoft.com/office/drawing/2010/main" w="9525">
-                <a:solidFill>
-                  <a:srgbClr val="000000"/>
-                </a:solidFill>
-                <a:miter lim="800000"/>
-                <a:headEnd/>
-                <a:tailEnd/>
-              </a14:hiddenLine>
-            </a:ext>
-          </a:extLst>
-        </p:spPr>
-        <p:txBody>
-          <a:bodyPr wrap="square">
-            <a:spAutoFit/>
-          </a:bodyPr>
-          <a:lstStyle>
-            <a:lvl1pPr>
-              <a:defRPr>
-                <a:solidFill>
-                  <a:schemeClr val="tx1"/>
-                </a:solidFill>
-                <a:latin typeface="Calibri" panose="020F0502020204030204" pitchFamily="34" charset="0"/>
-              </a:defRPr>
-            </a:lvl1pPr>
-            <a:lvl2pPr marL="742950" indent="-285750">
-              <a:defRPr>
-                <a:solidFill>
-                  <a:schemeClr val="tx1"/>
-                </a:solidFill>
-                <a:latin typeface="Calibri" panose="020F0502020204030204" pitchFamily="34" charset="0"/>
-              </a:defRPr>
-            </a:lvl2pPr>
-            <a:lvl3pPr marL="1143000" indent="-228600">
-              <a:defRPr>
-                <a:solidFill>
-                  <a:schemeClr val="tx1"/>
-                </a:solidFill>
-                <a:latin typeface="Calibri" panose="020F0502020204030204" pitchFamily="34" charset="0"/>
-              </a:defRPr>
-            </a:lvl3pPr>
-            <a:lvl4pPr marL="1600200" indent="-228600">
-              <a:defRPr>
-                <a:solidFill>
-                  <a:schemeClr val="tx1"/>
-                </a:solidFill>
-                <a:latin typeface="Calibri" panose="020F0502020204030204" pitchFamily="34" charset="0"/>
-              </a:defRPr>
-            </a:lvl4pPr>
-            <a:lvl5pPr marL="2057400" indent="-228600">
-              <a:defRPr>
-                <a:solidFill>
-                  <a:schemeClr val="tx1"/>
-                </a:solidFill>
-                <a:latin typeface="Calibri" panose="020F0502020204030204" pitchFamily="34" charset="0"/>
-              </a:defRPr>
-            </a:lvl5pPr>
-            <a:lvl6pPr marL="2514600" indent="-228600" eaLnBrk="0" fontAlgn="base" hangingPunct="0">
-              <a:spcBef>
-                <a:spcPct val="0"/>
-              </a:spcBef>
-              <a:spcAft>
-                <a:spcPct val="0"/>
-              </a:spcAft>
-              <a:defRPr>
-                <a:solidFill>
-                  <a:schemeClr val="tx1"/>
-                </a:solidFill>
-                <a:latin typeface="Calibri" panose="020F0502020204030204" pitchFamily="34" charset="0"/>
-              </a:defRPr>
-            </a:lvl6pPr>
-            <a:lvl7pPr marL="2971800" indent="-228600" eaLnBrk="0" fontAlgn="base" hangingPunct="0">
-              <a:spcBef>
-                <a:spcPct val="0"/>
-              </a:spcBef>
-              <a:spcAft>
-                <a:spcPct val="0"/>
-              </a:spcAft>
-              <a:defRPr>
-                <a:solidFill>
-                  <a:schemeClr val="tx1"/>
-                </a:solidFill>
-                <a:latin typeface="Calibri" panose="020F0502020204030204" pitchFamily="34" charset="0"/>
-              </a:defRPr>
-            </a:lvl7pPr>
-            <a:lvl8pPr marL="3429000" indent="-228600" eaLnBrk="0" fontAlgn="base" hangingPunct="0">
-              <a:spcBef>
-                <a:spcPct val="0"/>
-              </a:spcBef>
-              <a:spcAft>
-                <a:spcPct val="0"/>
-              </a:spcAft>
-              <a:defRPr>
-                <a:solidFill>
-                  <a:schemeClr val="tx1"/>
-                </a:solidFill>
-                <a:latin typeface="Calibri" panose="020F0502020204030204" pitchFamily="34" charset="0"/>
-              </a:defRPr>
-            </a:lvl8pPr>
-            <a:lvl9pPr marL="3886200" indent="-228600" eaLnBrk="0" fontAlgn="base" hangingPunct="0">
-              <a:spcBef>
-                <a:spcPct val="0"/>
-              </a:spcBef>
-              <a:spcAft>
-                <a:spcPct val="0"/>
-              </a:spcAft>
-              <a:defRPr>
-                <a:solidFill>
-                  <a:schemeClr val="tx1"/>
-                </a:solidFill>
-                <a:latin typeface="Calibri" panose="020F0502020204030204" pitchFamily="34" charset="0"/>
-              </a:defRPr>
-            </a:lvl9pPr>
-          </a:lstStyle>
-          <a:p>
-            <a:pPr algn="ctr" eaLnBrk="1" hangingPunct="1"/>
-            <a:r>
-              <a:rPr lang="en-US" altLang="en-US" sz="1000" dirty="0">
-                <a:latin typeface="Arial" panose="020B0604020202020204" pitchFamily="34" charset="0"/>
-                <a:ea typeface="Amazon Ember" panose="020B0603020204020204" pitchFamily="34" charset="0"/>
-                <a:cs typeface="Arial" panose="020B0604020202020204" pitchFamily="34" charset="0"/>
-              </a:rPr>
-              <a:t>AWS KMS</a:t>
-            </a:r>
-          </a:p>
-        </p:txBody>
-      </p:sp>
     </p:spTree>
     <p:extLst>
       <p:ext uri="{BB962C8B-B14F-4D97-AF65-F5344CB8AC3E}">

</xml_diff>

<commit_message>
Production doc builds - 2021/10/12 15:53:03 UTC
</commit_message>
<xml_diff>
--- a/docs/images/architecture_diagram.pptx
+++ b/docs/images/architecture_diagram.pptx
@@ -325,7 +325,7 @@
               <a:pPr>
                 <a:defRPr/>
               </a:pPr>
-              <a:t>8/2/21</a:t>
+              <a:t>9/14/21</a:t>
             </a:fld>
             <a:endParaRPr lang="en-US" dirty="0"/>
           </a:p>
@@ -15318,8 +15318,8 @@
         </p:nvSpPr>
         <p:spPr>
           <a:xfrm>
-            <a:off x="2576411" y="2231883"/>
-            <a:ext cx="2255362" cy="3415884"/>
+            <a:off x="2576411" y="1712333"/>
+            <a:ext cx="2255362" cy="3072412"/>
           </a:xfrm>
           <a:prstGeom prst="rect">
             <a:avLst/>
@@ -15400,8 +15400,8 @@
         </p:nvSpPr>
         <p:spPr>
           <a:xfrm>
-            <a:off x="2010493" y="1859973"/>
-            <a:ext cx="7943997" cy="3931228"/>
+            <a:off x="2010493" y="1112068"/>
+            <a:ext cx="7943997" cy="4810750"/>
           </a:xfrm>
           <a:prstGeom prst="rect">
             <a:avLst/>
@@ -15467,8 +15467,8 @@
         </p:nvSpPr>
         <p:spPr>
           <a:xfrm>
-            <a:off x="4996645" y="2243677"/>
-            <a:ext cx="4573382" cy="3404089"/>
+            <a:off x="4996645" y="1724128"/>
+            <a:ext cx="4573382" cy="3072412"/>
           </a:xfrm>
           <a:prstGeom prst="rect">
             <a:avLst/>
@@ -15530,7 +15530,7 @@
                 <a:latin typeface="Arial" panose="020B0604020202020204" pitchFamily="34" charset="0"/>
                 <a:cs typeface="Arial" panose="020B0604020202020204" pitchFamily="34" charset="0"/>
               </a:rPr>
-              <a:t>10.0.16.0/20</a:t>
+              <a:t>10.0.128.0/20</a:t>
             </a:r>
           </a:p>
         </p:txBody>
@@ -15549,8 +15549,8 @@
         </p:nvSpPr>
         <p:spPr>
           <a:xfrm>
-            <a:off x="1696825" y="341189"/>
-            <a:ext cx="8434999" cy="5592020"/>
+            <a:off x="1696825" y="91805"/>
+            <a:ext cx="8434999" cy="5914140"/>
           </a:xfrm>
           <a:prstGeom prst="rect">
             <a:avLst/>
@@ -15615,8 +15615,8 @@
         </p:nvSpPr>
         <p:spPr>
           <a:xfrm>
-            <a:off x="2375802" y="1514531"/>
-            <a:ext cx="7381262" cy="3971868"/>
+            <a:off x="2375802" y="1431327"/>
+            <a:ext cx="7381262" cy="3442007"/>
           </a:xfrm>
           <a:prstGeom prst="rect">
             <a:avLst/>
@@ -15663,7 +15663,7 @@
                 <a:latin typeface="Arial" panose="020B0604020202020204" pitchFamily="34" charset="0"/>
                 <a:cs typeface="Arial" panose="020B0604020202020204" pitchFamily="34" charset="0"/>
               </a:rPr>
-              <a:t>Availability Zone 1</a:t>
+              <a:t>Availability Zone 1 - Production</a:t>
             </a:r>
           </a:p>
         </p:txBody>
@@ -15696,7 +15696,7 @@
         </p:blipFill>
         <p:spPr>
           <a:xfrm>
-            <a:off x="1698364" y="347857"/>
+            <a:off x="1698364" y="98473"/>
             <a:ext cx="330200" cy="330200"/>
           </a:xfrm>
           <a:prstGeom prst="rect">
@@ -15732,7 +15732,7 @@
         </p:blipFill>
         <p:spPr>
           <a:xfrm>
-            <a:off x="2013276" y="1859973"/>
+            <a:off x="2002248" y="1125521"/>
             <a:ext cx="330200" cy="330200"/>
           </a:xfrm>
           <a:prstGeom prst="rect">
@@ -15768,7 +15768,7 @@
         </p:blipFill>
         <p:spPr>
           <a:xfrm>
-            <a:off x="2577782" y="2241386"/>
+            <a:off x="2577782" y="1721836"/>
             <a:ext cx="274320" cy="274320"/>
           </a:xfrm>
           <a:prstGeom prst="rect">
@@ -15804,7 +15804,7 @@
         </p:blipFill>
         <p:spPr>
           <a:xfrm>
-            <a:off x="5009644" y="2247271"/>
+            <a:off x="5009644" y="1727721"/>
             <a:ext cx="274320" cy="274320"/>
           </a:xfrm>
           <a:prstGeom prst="rect">
@@ -15826,7 +15826,7 @@
         </p:nvSpPr>
         <p:spPr>
           <a:xfrm>
-            <a:off x="4179024" y="4635860"/>
+            <a:off x="4160796" y="3044625"/>
             <a:ext cx="1153178" cy="246221"/>
           </a:xfrm>
           <a:prstGeom prst="rect">
@@ -15879,7 +15879,7 @@
         </p:blipFill>
         <p:spPr>
           <a:xfrm>
-            <a:off x="4522108" y="4177193"/>
+            <a:off x="4503288" y="2617100"/>
             <a:ext cx="469900" cy="469900"/>
           </a:xfrm>
           <a:prstGeom prst="rect">
@@ -15915,7 +15915,7 @@
         </p:blipFill>
         <p:spPr>
           <a:xfrm>
-            <a:off x="6657421" y="414274"/>
+            <a:off x="6657421" y="164890"/>
             <a:ext cx="591034" cy="591034"/>
           </a:xfrm>
           <a:prstGeom prst="rect">
@@ -15937,7 +15937,7 @@
         </p:nvSpPr>
         <p:spPr>
           <a:xfrm>
-            <a:off x="6116843" y="996582"/>
+            <a:off x="6116843" y="747198"/>
             <a:ext cx="1651819" cy="246221"/>
           </a:xfrm>
           <a:prstGeom prst="rect">
@@ -15991,7 +15991,7 @@
         </p:blipFill>
         <p:spPr bwMode="auto">
           <a:xfrm>
-            <a:off x="9131875" y="408879"/>
+            <a:off x="9131875" y="159495"/>
             <a:ext cx="594360" cy="594360"/>
           </a:xfrm>
           <a:prstGeom prst="rect">
@@ -16038,7 +16038,7 @@
         </p:nvSpPr>
         <p:spPr bwMode="auto">
           <a:xfrm>
-            <a:off x="8332352" y="1016601"/>
+            <a:off x="8332352" y="767217"/>
             <a:ext cx="2268537" cy="246221"/>
           </a:xfrm>
           <a:prstGeom prst="rect">
@@ -16212,7 +16212,7 @@
         </p:blipFill>
         <p:spPr bwMode="auto">
           <a:xfrm>
-            <a:off x="7343528" y="4107738"/>
+            <a:off x="7343528" y="3432323"/>
             <a:ext cx="594360" cy="594360"/>
           </a:xfrm>
           <a:prstGeom prst="rect">
@@ -16259,7 +16259,7 @@
         </p:nvSpPr>
         <p:spPr bwMode="auto">
           <a:xfrm>
-            <a:off x="6531161" y="4694678"/>
+            <a:off x="6531161" y="4019263"/>
             <a:ext cx="2268537" cy="553998"/>
           </a:xfrm>
           <a:prstGeom prst="rect">
@@ -16450,7 +16450,7 @@
         </p:nvSpPr>
         <p:spPr bwMode="auto">
           <a:xfrm>
-            <a:off x="5645463" y="5071844"/>
+            <a:off x="5645463" y="4396429"/>
             <a:ext cx="1115904" cy="400110"/>
           </a:xfrm>
           <a:prstGeom prst="rect">
@@ -16635,7 +16635,7 @@
         </p:blipFill>
         <p:spPr bwMode="auto">
           <a:xfrm>
-            <a:off x="7331202" y="2563491"/>
+            <a:off x="7331202" y="2147851"/>
             <a:ext cx="594360" cy="594360"/>
           </a:xfrm>
           <a:prstGeom prst="rect">
@@ -16682,7 +16682,7 @@
         </p:nvSpPr>
         <p:spPr bwMode="auto">
           <a:xfrm>
-            <a:off x="6492865" y="3167574"/>
+            <a:off x="6492865" y="2741543"/>
             <a:ext cx="2292350" cy="553998"/>
           </a:xfrm>
           <a:prstGeom prst="rect">
@@ -16886,7 +16886,7 @@
         </p:blipFill>
         <p:spPr bwMode="auto">
           <a:xfrm>
-            <a:off x="7915920" y="404424"/>
+            <a:off x="7909570" y="155040"/>
             <a:ext cx="594360" cy="594360"/>
           </a:xfrm>
           <a:prstGeom prst="rect">
@@ -16933,7 +16933,7 @@
         </p:nvSpPr>
         <p:spPr bwMode="auto">
           <a:xfrm>
-            <a:off x="7113799" y="1020950"/>
+            <a:off x="7113799" y="771566"/>
             <a:ext cx="2243137" cy="246221"/>
           </a:xfrm>
           <a:prstGeom prst="rect">
@@ -17094,7 +17094,7 @@
         </p:nvSpPr>
         <p:spPr bwMode="auto">
           <a:xfrm>
-            <a:off x="1310932" y="4654714"/>
+            <a:off x="1351869" y="3063909"/>
             <a:ext cx="1403350" cy="400110"/>
           </a:xfrm>
           <a:prstGeom prst="rect">
@@ -17279,7 +17279,7 @@
         </p:blipFill>
         <p:spPr bwMode="auto">
           <a:xfrm>
-            <a:off x="1772137" y="4197514"/>
+            <a:off x="1813074" y="2617100"/>
             <a:ext cx="457200" cy="457200"/>
           </a:xfrm>
           <a:prstGeom prst="rect">
@@ -17326,7 +17326,7 @@
         </p:nvSpPr>
         <p:spPr bwMode="auto">
           <a:xfrm>
-            <a:off x="1921437" y="3737791"/>
+            <a:off x="1921437" y="3904044"/>
             <a:ext cx="1342852" cy="246221"/>
           </a:xfrm>
           <a:prstGeom prst="rect">
@@ -17471,24 +17471,37 @@
           </a:p>
         </p:txBody>
       </p:sp>
-      <p:sp>
-        <p:nvSpPr>
-          <p:cNvPr id="92" name="TextBox 27">
-            <a:extLst>
-              <a:ext uri="{FF2B5EF4-FFF2-40B4-BE49-F238E27FC236}">
-                <a16:creationId xmlns:a16="http://schemas.microsoft.com/office/drawing/2014/main" id="{421E4A39-24B0-3844-800A-1E388C61445E}"/>
-              </a:ext>
-            </a:extLst>
-          </p:cNvPr>
-          <p:cNvSpPr txBox="1">
-            <a:spLocks noChangeArrowheads="1"/>
-          </p:cNvSpPr>
+      <p:pic>
+        <p:nvPicPr>
+          <p:cNvPr id="95" name="Graphic 37">
+            <a:extLst>
+              <a:ext uri="{FF2B5EF4-FFF2-40B4-BE49-F238E27FC236}">
+                <a16:creationId xmlns:a16="http://schemas.microsoft.com/office/drawing/2014/main" id="{634F2CF6-4CAB-CB4D-BAFD-9B025CB0729C}"/>
+              </a:ext>
+            </a:extLst>
+          </p:cNvPr>
+          <p:cNvPicPr>
+            <a:picLocks noChangeAspect="1" noChangeArrowheads="1"/>
+          </p:cNvPicPr>
           <p:nvPr/>
-        </p:nvSpPr>
+        </p:nvPicPr>
+        <p:blipFill>
+          <a:blip r:embed="rId20">
+            <a:extLst>
+              <a:ext uri="{28A0092B-C50C-407E-A947-70E740481C1C}">
+                <a14:useLocalDpi xmlns:a14="http://schemas.microsoft.com/office/drawing/2010/main" val="0"/>
+              </a:ext>
+            </a:extLst>
+          </a:blip>
+          <a:srcRect/>
+          <a:stretch>
+            <a:fillRect/>
+          </a:stretch>
+        </p:blipFill>
         <p:spPr bwMode="auto">
           <a:xfrm>
-            <a:off x="1785493" y="4639679"/>
-            <a:ext cx="1644650" cy="246221"/>
+            <a:off x="2377466" y="3498454"/>
+            <a:ext cx="457200" cy="457200"/>
           </a:xfrm>
           <a:prstGeom prst="rect">
             <a:avLst/>
@@ -17517,127 +17530,13 @@
             </a:ext>
           </a:extLst>
         </p:spPr>
-        <p:txBody>
-          <a:bodyPr>
-            <a:spAutoFit/>
-          </a:bodyPr>
-          <a:lstStyle>
-            <a:lvl1pPr>
-              <a:defRPr>
-                <a:solidFill>
-                  <a:schemeClr val="tx1"/>
-                </a:solidFill>
-                <a:latin typeface="Calibri" panose="020F0502020204030204" pitchFamily="34" charset="0"/>
-              </a:defRPr>
-            </a:lvl1pPr>
-            <a:lvl2pPr marL="742950" indent="-285750">
-              <a:defRPr>
-                <a:solidFill>
-                  <a:schemeClr val="tx1"/>
-                </a:solidFill>
-                <a:latin typeface="Calibri" panose="020F0502020204030204" pitchFamily="34" charset="0"/>
-              </a:defRPr>
-            </a:lvl2pPr>
-            <a:lvl3pPr marL="1143000" indent="-228600">
-              <a:defRPr>
-                <a:solidFill>
-                  <a:schemeClr val="tx1"/>
-                </a:solidFill>
-                <a:latin typeface="Calibri" panose="020F0502020204030204" pitchFamily="34" charset="0"/>
-              </a:defRPr>
-            </a:lvl3pPr>
-            <a:lvl4pPr marL="1600200" indent="-228600">
-              <a:defRPr>
-                <a:solidFill>
-                  <a:schemeClr val="tx1"/>
-                </a:solidFill>
-                <a:latin typeface="Calibri" panose="020F0502020204030204" pitchFamily="34" charset="0"/>
-              </a:defRPr>
-            </a:lvl4pPr>
-            <a:lvl5pPr marL="2057400" indent="-228600">
-              <a:defRPr>
-                <a:solidFill>
-                  <a:schemeClr val="tx1"/>
-                </a:solidFill>
-                <a:latin typeface="Calibri" panose="020F0502020204030204" pitchFamily="34" charset="0"/>
-              </a:defRPr>
-            </a:lvl5pPr>
-            <a:lvl6pPr marL="2514600" indent="-228600" eaLnBrk="0" fontAlgn="base" hangingPunct="0">
-              <a:spcBef>
-                <a:spcPct val="0"/>
-              </a:spcBef>
-              <a:spcAft>
-                <a:spcPct val="0"/>
-              </a:spcAft>
-              <a:defRPr>
-                <a:solidFill>
-                  <a:schemeClr val="tx1"/>
-                </a:solidFill>
-                <a:latin typeface="Calibri" panose="020F0502020204030204" pitchFamily="34" charset="0"/>
-              </a:defRPr>
-            </a:lvl6pPr>
-            <a:lvl7pPr marL="2971800" indent="-228600" eaLnBrk="0" fontAlgn="base" hangingPunct="0">
-              <a:spcBef>
-                <a:spcPct val="0"/>
-              </a:spcBef>
-              <a:spcAft>
-                <a:spcPct val="0"/>
-              </a:spcAft>
-              <a:defRPr>
-                <a:solidFill>
-                  <a:schemeClr val="tx1"/>
-                </a:solidFill>
-                <a:latin typeface="Calibri" panose="020F0502020204030204" pitchFamily="34" charset="0"/>
-              </a:defRPr>
-            </a:lvl7pPr>
-            <a:lvl8pPr marL="3429000" indent="-228600" eaLnBrk="0" fontAlgn="base" hangingPunct="0">
-              <a:spcBef>
-                <a:spcPct val="0"/>
-              </a:spcBef>
-              <a:spcAft>
-                <a:spcPct val="0"/>
-              </a:spcAft>
-              <a:defRPr>
-                <a:solidFill>
-                  <a:schemeClr val="tx1"/>
-                </a:solidFill>
-                <a:latin typeface="Calibri" panose="020F0502020204030204" pitchFamily="34" charset="0"/>
-              </a:defRPr>
-            </a:lvl8pPr>
-            <a:lvl9pPr marL="3886200" indent="-228600" eaLnBrk="0" fontAlgn="base" hangingPunct="0">
-              <a:spcBef>
-                <a:spcPct val="0"/>
-              </a:spcBef>
-              <a:spcAft>
-                <a:spcPct val="0"/>
-              </a:spcAft>
-              <a:defRPr>
-                <a:solidFill>
-                  <a:schemeClr val="tx1"/>
-                </a:solidFill>
-                <a:latin typeface="Calibri" panose="020F0502020204030204" pitchFamily="34" charset="0"/>
-              </a:defRPr>
-            </a:lvl9pPr>
-          </a:lstStyle>
-          <a:p>
-            <a:pPr algn="ctr" eaLnBrk="1" hangingPunct="1"/>
-            <a:r>
-              <a:rPr lang="en-US" altLang="en-US" sz="1000" dirty="0">
-                <a:latin typeface="Arial" panose="020B0604020202020204" pitchFamily="34" charset="0"/>
-                <a:ea typeface="Amazon Ember" panose="020B0603020204020204" pitchFamily="34" charset="0"/>
-                <a:cs typeface="Arial" panose="020B0604020202020204" pitchFamily="34" charset="0"/>
-              </a:rPr>
-              <a:t>Router</a:t>
-            </a:r>
-          </a:p>
-        </p:txBody>
-      </p:sp>
+      </p:pic>
       <p:pic>
         <p:nvPicPr>
-          <p:cNvPr id="94" name="Graphic 31">
-            <a:extLst>
-              <a:ext uri="{FF2B5EF4-FFF2-40B4-BE49-F238E27FC236}">
-                <a16:creationId xmlns:a16="http://schemas.microsoft.com/office/drawing/2014/main" id="{BFDA0D18-F21E-F04F-92ED-EB240B3EF6A4}"/>
+          <p:cNvPr id="97" name="Graphic 17">
+            <a:extLst>
+              <a:ext uri="{FF2B5EF4-FFF2-40B4-BE49-F238E27FC236}">
+                <a16:creationId xmlns:a16="http://schemas.microsoft.com/office/drawing/2014/main" id="{EC1AE1BB-1A37-6744-8B83-DABCFFE5BB19}"/>
               </a:ext>
             </a:extLst>
           </p:cNvPr>
@@ -17647,7 +17546,7 @@
           <p:nvPr/>
         </p:nvPicPr>
         <p:blipFill>
-          <a:blip r:embed="rId20">
+          <a:blip r:embed="rId21">
             <a:extLst>
               <a:ext uri="{28A0092B-C50C-407E-A947-70E740481C1C}">
                 <a14:useLocalDpi xmlns:a14="http://schemas.microsoft.com/office/drawing/2010/main" val="0"/>
@@ -17661,8 +17560,8 @@
         </p:blipFill>
         <p:spPr bwMode="auto">
           <a:xfrm>
-            <a:off x="2379218" y="4182479"/>
-            <a:ext cx="457200" cy="457200"/>
+            <a:off x="8690808" y="3435007"/>
+            <a:ext cx="594360" cy="594360"/>
           </a:xfrm>
           <a:prstGeom prst="rect">
             <a:avLst/>
@@ -17692,37 +17591,24 @@
           </a:extLst>
         </p:spPr>
       </p:pic>
-      <p:pic>
-        <p:nvPicPr>
-          <p:cNvPr id="95" name="Graphic 37">
-            <a:extLst>
-              <a:ext uri="{FF2B5EF4-FFF2-40B4-BE49-F238E27FC236}">
-                <a16:creationId xmlns:a16="http://schemas.microsoft.com/office/drawing/2014/main" id="{634F2CF6-4CAB-CB4D-BAFD-9B025CB0729C}"/>
-              </a:ext>
-            </a:extLst>
-          </p:cNvPr>
-          <p:cNvPicPr>
-            <a:picLocks noChangeAspect="1" noChangeArrowheads="1"/>
-          </p:cNvPicPr>
+      <p:sp>
+        <p:nvSpPr>
+          <p:cNvPr id="98" name="TextBox 9">
+            <a:extLst>
+              <a:ext uri="{FF2B5EF4-FFF2-40B4-BE49-F238E27FC236}">
+                <a16:creationId xmlns:a16="http://schemas.microsoft.com/office/drawing/2014/main" id="{43DC4896-6A05-934D-96FC-42ABA52D5B86}"/>
+              </a:ext>
+            </a:extLst>
+          </p:cNvPr>
+          <p:cNvSpPr txBox="1">
+            <a:spLocks noChangeArrowheads="1"/>
+          </p:cNvSpPr>
           <p:nvPr/>
-        </p:nvPicPr>
-        <p:blipFill>
-          <a:blip r:embed="rId21">
-            <a:extLst>
-              <a:ext uri="{28A0092B-C50C-407E-A947-70E740481C1C}">
-                <a14:useLocalDpi xmlns:a14="http://schemas.microsoft.com/office/drawing/2010/main" val="0"/>
-              </a:ext>
-            </a:extLst>
-          </a:blip>
-          <a:srcRect/>
-          <a:stretch>
-            <a:fillRect/>
-          </a:stretch>
-        </p:blipFill>
+        </p:nvSpPr>
         <p:spPr bwMode="auto">
           <a:xfrm>
-            <a:off x="2377466" y="3311419"/>
-            <a:ext cx="457200" cy="457200"/>
+            <a:off x="7888687" y="4021947"/>
+            <a:ext cx="2243137" cy="707886"/>
           </a:xfrm>
           <a:prstGeom prst="rect">
             <a:avLst/>
@@ -17751,13 +17637,157 @@
             </a:ext>
           </a:extLst>
         </p:spPr>
-      </p:pic>
+        <p:txBody>
+          <a:bodyPr>
+            <a:spAutoFit/>
+          </a:bodyPr>
+          <a:lstStyle>
+            <a:lvl1pPr>
+              <a:defRPr>
+                <a:solidFill>
+                  <a:schemeClr val="tx1"/>
+                </a:solidFill>
+                <a:latin typeface="Calibri" panose="020F0502020204030204" pitchFamily="34" charset="0"/>
+              </a:defRPr>
+            </a:lvl1pPr>
+            <a:lvl2pPr marL="742950" indent="-285750">
+              <a:defRPr>
+                <a:solidFill>
+                  <a:schemeClr val="tx1"/>
+                </a:solidFill>
+                <a:latin typeface="Calibri" panose="020F0502020204030204" pitchFamily="34" charset="0"/>
+              </a:defRPr>
+            </a:lvl2pPr>
+            <a:lvl3pPr marL="1143000" indent="-228600">
+              <a:defRPr>
+                <a:solidFill>
+                  <a:schemeClr val="tx1"/>
+                </a:solidFill>
+                <a:latin typeface="Calibri" panose="020F0502020204030204" pitchFamily="34" charset="0"/>
+              </a:defRPr>
+            </a:lvl3pPr>
+            <a:lvl4pPr marL="1600200" indent="-228600">
+              <a:defRPr>
+                <a:solidFill>
+                  <a:schemeClr val="tx1"/>
+                </a:solidFill>
+                <a:latin typeface="Calibri" panose="020F0502020204030204" pitchFamily="34" charset="0"/>
+              </a:defRPr>
+            </a:lvl4pPr>
+            <a:lvl5pPr marL="2057400" indent="-228600">
+              <a:defRPr>
+                <a:solidFill>
+                  <a:schemeClr val="tx1"/>
+                </a:solidFill>
+                <a:latin typeface="Calibri" panose="020F0502020204030204" pitchFamily="34" charset="0"/>
+              </a:defRPr>
+            </a:lvl5pPr>
+            <a:lvl6pPr marL="2514600" indent="-228600" eaLnBrk="0" fontAlgn="base" hangingPunct="0">
+              <a:spcBef>
+                <a:spcPct val="0"/>
+              </a:spcBef>
+              <a:spcAft>
+                <a:spcPct val="0"/>
+              </a:spcAft>
+              <a:defRPr>
+                <a:solidFill>
+                  <a:schemeClr val="tx1"/>
+                </a:solidFill>
+                <a:latin typeface="Calibri" panose="020F0502020204030204" pitchFamily="34" charset="0"/>
+              </a:defRPr>
+            </a:lvl6pPr>
+            <a:lvl7pPr marL="2971800" indent="-228600" eaLnBrk="0" fontAlgn="base" hangingPunct="0">
+              <a:spcBef>
+                <a:spcPct val="0"/>
+              </a:spcBef>
+              <a:spcAft>
+                <a:spcPct val="0"/>
+              </a:spcAft>
+              <a:defRPr>
+                <a:solidFill>
+                  <a:schemeClr val="tx1"/>
+                </a:solidFill>
+                <a:latin typeface="Calibri" panose="020F0502020204030204" pitchFamily="34" charset="0"/>
+              </a:defRPr>
+            </a:lvl7pPr>
+            <a:lvl8pPr marL="3429000" indent="-228600" eaLnBrk="0" fontAlgn="base" hangingPunct="0">
+              <a:spcBef>
+                <a:spcPct val="0"/>
+              </a:spcBef>
+              <a:spcAft>
+                <a:spcPct val="0"/>
+              </a:spcAft>
+              <a:defRPr>
+                <a:solidFill>
+                  <a:schemeClr val="tx1"/>
+                </a:solidFill>
+                <a:latin typeface="Calibri" panose="020F0502020204030204" pitchFamily="34" charset="0"/>
+              </a:defRPr>
+            </a:lvl8pPr>
+            <a:lvl9pPr marL="3886200" indent="-228600" eaLnBrk="0" fontAlgn="base" hangingPunct="0">
+              <a:spcBef>
+                <a:spcPct val="0"/>
+              </a:spcBef>
+              <a:spcAft>
+                <a:spcPct val="0"/>
+              </a:spcAft>
+              <a:defRPr>
+                <a:solidFill>
+                  <a:schemeClr val="tx1"/>
+                </a:solidFill>
+                <a:latin typeface="Calibri" panose="020F0502020204030204" pitchFamily="34" charset="0"/>
+              </a:defRPr>
+            </a:lvl9pPr>
+          </a:lstStyle>
+          <a:p>
+            <a:pPr algn="ctr" eaLnBrk="1" hangingPunct="1"/>
+            <a:r>
+              <a:rPr lang="en-US" altLang="en-US" sz="1000" dirty="0">
+                <a:latin typeface="Arial" panose="020B0604020202020204" pitchFamily="34" charset="0"/>
+                <a:ea typeface="Amazon Ember" panose="020B0603020204020204" pitchFamily="34" charset="0"/>
+                <a:cs typeface="Arial" panose="020B0604020202020204" pitchFamily="34" charset="0"/>
+              </a:rPr>
+              <a:t>Amazon EBS</a:t>
+            </a:r>
+          </a:p>
+          <a:p>
+            <a:pPr algn="ctr" eaLnBrk="1" hangingPunct="1"/>
+            <a:r>
+              <a:rPr lang="en-US" altLang="en-US" sz="1000" dirty="0">
+                <a:latin typeface="Arial" panose="020B0604020202020204" pitchFamily="34" charset="0"/>
+                <a:ea typeface="Amazon Ember" panose="020B0603020204020204" pitchFamily="34" charset="0"/>
+                <a:cs typeface="Arial" panose="020B0604020202020204" pitchFamily="34" charset="0"/>
+              </a:rPr>
+              <a:t>Volumes</a:t>
+            </a:r>
+          </a:p>
+          <a:p>
+            <a:pPr algn="ctr" eaLnBrk="1" hangingPunct="1"/>
+            <a:r>
+              <a:rPr lang="en-US" altLang="en-US" sz="1000" dirty="0">
+                <a:latin typeface="Arial" panose="020B0604020202020204" pitchFamily="34" charset="0"/>
+                <a:ea typeface="Amazon Ember" panose="020B0603020204020204" pitchFamily="34" charset="0"/>
+                <a:cs typeface="Arial" panose="020B0604020202020204" pitchFamily="34" charset="0"/>
+              </a:rPr>
+              <a:t>gp2, st1, sc1</a:t>
+            </a:r>
+          </a:p>
+          <a:p>
+            <a:pPr algn="ctr" eaLnBrk="1" hangingPunct="1"/>
+            <a:endParaRPr lang="en-US" altLang="en-US" sz="1000" dirty="0">
+              <a:latin typeface="Arial" panose="020B0604020202020204" pitchFamily="34" charset="0"/>
+              <a:ea typeface="Amazon Ember" panose="020B0603020204020204" pitchFamily="34" charset="0"/>
+              <a:cs typeface="Arial" panose="020B0604020202020204" pitchFamily="34" charset="0"/>
+            </a:endParaRPr>
+          </a:p>
+        </p:txBody>
+      </p:sp>
       <p:pic>
         <p:nvPicPr>
-          <p:cNvPr id="97" name="Graphic 17">
-            <a:extLst>
-              <a:ext uri="{FF2B5EF4-FFF2-40B4-BE49-F238E27FC236}">
-                <a16:creationId xmlns:a16="http://schemas.microsoft.com/office/drawing/2014/main" id="{EC1AE1BB-1A37-6744-8B83-DABCFFE5BB19}"/>
+          <p:cNvPr id="99" name="Graphic 10">
+            <a:extLst>
+              <a:ext uri="{FF2B5EF4-FFF2-40B4-BE49-F238E27FC236}">
+                <a16:creationId xmlns:a16="http://schemas.microsoft.com/office/drawing/2014/main" id="{75214CD6-2F4C-5F44-975E-F9E1F4D1BEF9}"/>
               </a:ext>
             </a:extLst>
           </p:cNvPr>
@@ -17767,7 +17797,7 @@
           <p:nvPr/>
         </p:nvPicPr>
         <p:blipFill>
-          <a:blip r:embed="rId22">
+          <a:blip r:embed="rId17">
             <a:extLst>
               <a:ext uri="{28A0092B-C50C-407E-A947-70E740481C1C}">
                 <a14:useLocalDpi xmlns:a14="http://schemas.microsoft.com/office/drawing/2010/main" val="0"/>
@@ -17781,7 +17811,7 @@
         </p:blipFill>
         <p:spPr bwMode="auto">
           <a:xfrm>
-            <a:off x="8690808" y="4100031"/>
+            <a:off x="8604594" y="2144762"/>
             <a:ext cx="594360" cy="594360"/>
           </a:xfrm>
           <a:prstGeom prst="rect">
@@ -17814,10 +17844,10 @@
       </p:pic>
       <p:sp>
         <p:nvSpPr>
-          <p:cNvPr id="98" name="TextBox 9">
-            <a:extLst>
-              <a:ext uri="{FF2B5EF4-FFF2-40B4-BE49-F238E27FC236}">
-                <a16:creationId xmlns:a16="http://schemas.microsoft.com/office/drawing/2014/main" id="{43DC4896-6A05-934D-96FC-42ABA52D5B86}"/>
+          <p:cNvPr id="100" name="TextBox 20">
+            <a:extLst>
+              <a:ext uri="{FF2B5EF4-FFF2-40B4-BE49-F238E27FC236}">
+                <a16:creationId xmlns:a16="http://schemas.microsoft.com/office/drawing/2014/main" id="{7D75AA54-8E1E-6549-81C9-DCB0E2787BA0}"/>
               </a:ext>
             </a:extLst>
           </p:cNvPr>
@@ -17828,258 +17858,7 @@
         </p:nvSpPr>
         <p:spPr bwMode="auto">
           <a:xfrm>
-            <a:off x="7888687" y="4697362"/>
-            <a:ext cx="2243137" cy="707886"/>
-          </a:xfrm>
-          <a:prstGeom prst="rect">
-            <a:avLst/>
-          </a:prstGeom>
-          <a:noFill/>
-          <a:ln>
-            <a:noFill/>
-          </a:ln>
-          <a:extLst>
-            <a:ext uri="{909E8E84-426E-40DD-AFC4-6F175D3DCCD1}">
-              <a14:hiddenFill xmlns:a14="http://schemas.microsoft.com/office/drawing/2010/main">
-                <a:solidFill>
-                  <a:srgbClr val="FFFFFF"/>
-                </a:solidFill>
-              </a14:hiddenFill>
-            </a:ext>
-            <a:ext uri="{91240B29-F687-4F45-9708-019B960494DF}">
-              <a14:hiddenLine xmlns:a14="http://schemas.microsoft.com/office/drawing/2010/main" w="9525">
-                <a:solidFill>
-                  <a:srgbClr val="000000"/>
-                </a:solidFill>
-                <a:miter lim="800000"/>
-                <a:headEnd/>
-                <a:tailEnd/>
-              </a14:hiddenLine>
-            </a:ext>
-          </a:extLst>
-        </p:spPr>
-        <p:txBody>
-          <a:bodyPr>
-            <a:spAutoFit/>
-          </a:bodyPr>
-          <a:lstStyle>
-            <a:lvl1pPr>
-              <a:defRPr>
-                <a:solidFill>
-                  <a:schemeClr val="tx1"/>
-                </a:solidFill>
-                <a:latin typeface="Calibri" panose="020F0502020204030204" pitchFamily="34" charset="0"/>
-              </a:defRPr>
-            </a:lvl1pPr>
-            <a:lvl2pPr marL="742950" indent="-285750">
-              <a:defRPr>
-                <a:solidFill>
-                  <a:schemeClr val="tx1"/>
-                </a:solidFill>
-                <a:latin typeface="Calibri" panose="020F0502020204030204" pitchFamily="34" charset="0"/>
-              </a:defRPr>
-            </a:lvl2pPr>
-            <a:lvl3pPr marL="1143000" indent="-228600">
-              <a:defRPr>
-                <a:solidFill>
-                  <a:schemeClr val="tx1"/>
-                </a:solidFill>
-                <a:latin typeface="Calibri" panose="020F0502020204030204" pitchFamily="34" charset="0"/>
-              </a:defRPr>
-            </a:lvl3pPr>
-            <a:lvl4pPr marL="1600200" indent="-228600">
-              <a:defRPr>
-                <a:solidFill>
-                  <a:schemeClr val="tx1"/>
-                </a:solidFill>
-                <a:latin typeface="Calibri" panose="020F0502020204030204" pitchFamily="34" charset="0"/>
-              </a:defRPr>
-            </a:lvl4pPr>
-            <a:lvl5pPr marL="2057400" indent="-228600">
-              <a:defRPr>
-                <a:solidFill>
-                  <a:schemeClr val="tx1"/>
-                </a:solidFill>
-                <a:latin typeface="Calibri" panose="020F0502020204030204" pitchFamily="34" charset="0"/>
-              </a:defRPr>
-            </a:lvl5pPr>
-            <a:lvl6pPr marL="2514600" indent="-228600" eaLnBrk="0" fontAlgn="base" hangingPunct="0">
-              <a:spcBef>
-                <a:spcPct val="0"/>
-              </a:spcBef>
-              <a:spcAft>
-                <a:spcPct val="0"/>
-              </a:spcAft>
-              <a:defRPr>
-                <a:solidFill>
-                  <a:schemeClr val="tx1"/>
-                </a:solidFill>
-                <a:latin typeface="Calibri" panose="020F0502020204030204" pitchFamily="34" charset="0"/>
-              </a:defRPr>
-            </a:lvl6pPr>
-            <a:lvl7pPr marL="2971800" indent="-228600" eaLnBrk="0" fontAlgn="base" hangingPunct="0">
-              <a:spcBef>
-                <a:spcPct val="0"/>
-              </a:spcBef>
-              <a:spcAft>
-                <a:spcPct val="0"/>
-              </a:spcAft>
-              <a:defRPr>
-                <a:solidFill>
-                  <a:schemeClr val="tx1"/>
-                </a:solidFill>
-                <a:latin typeface="Calibri" panose="020F0502020204030204" pitchFamily="34" charset="0"/>
-              </a:defRPr>
-            </a:lvl7pPr>
-            <a:lvl8pPr marL="3429000" indent="-228600" eaLnBrk="0" fontAlgn="base" hangingPunct="0">
-              <a:spcBef>
-                <a:spcPct val="0"/>
-              </a:spcBef>
-              <a:spcAft>
-                <a:spcPct val="0"/>
-              </a:spcAft>
-              <a:defRPr>
-                <a:solidFill>
-                  <a:schemeClr val="tx1"/>
-                </a:solidFill>
-                <a:latin typeface="Calibri" panose="020F0502020204030204" pitchFamily="34" charset="0"/>
-              </a:defRPr>
-            </a:lvl8pPr>
-            <a:lvl9pPr marL="3886200" indent="-228600" eaLnBrk="0" fontAlgn="base" hangingPunct="0">
-              <a:spcBef>
-                <a:spcPct val="0"/>
-              </a:spcBef>
-              <a:spcAft>
-                <a:spcPct val="0"/>
-              </a:spcAft>
-              <a:defRPr>
-                <a:solidFill>
-                  <a:schemeClr val="tx1"/>
-                </a:solidFill>
-                <a:latin typeface="Calibri" panose="020F0502020204030204" pitchFamily="34" charset="0"/>
-              </a:defRPr>
-            </a:lvl9pPr>
-          </a:lstStyle>
-          <a:p>
-            <a:pPr algn="ctr" eaLnBrk="1" hangingPunct="1"/>
-            <a:r>
-              <a:rPr lang="en-US" altLang="en-US" sz="1000" dirty="0">
-                <a:latin typeface="Arial" panose="020B0604020202020204" pitchFamily="34" charset="0"/>
-                <a:ea typeface="Amazon Ember" panose="020B0603020204020204" pitchFamily="34" charset="0"/>
-                <a:cs typeface="Arial" panose="020B0604020202020204" pitchFamily="34" charset="0"/>
-              </a:rPr>
-              <a:t>Amazon EBS</a:t>
-            </a:r>
-          </a:p>
-          <a:p>
-            <a:pPr algn="ctr" eaLnBrk="1" hangingPunct="1"/>
-            <a:r>
-              <a:rPr lang="en-US" altLang="en-US" sz="1000" dirty="0">
-                <a:latin typeface="Arial" panose="020B0604020202020204" pitchFamily="34" charset="0"/>
-                <a:ea typeface="Amazon Ember" panose="020B0603020204020204" pitchFamily="34" charset="0"/>
-                <a:cs typeface="Arial" panose="020B0604020202020204" pitchFamily="34" charset="0"/>
-              </a:rPr>
-              <a:t>Volumes</a:t>
-            </a:r>
-          </a:p>
-          <a:p>
-            <a:pPr algn="ctr" eaLnBrk="1" hangingPunct="1"/>
-            <a:r>
-              <a:rPr lang="en-US" altLang="en-US" sz="1000" dirty="0">
-                <a:latin typeface="Arial" panose="020B0604020202020204" pitchFamily="34" charset="0"/>
-                <a:ea typeface="Amazon Ember" panose="020B0603020204020204" pitchFamily="34" charset="0"/>
-                <a:cs typeface="Arial" panose="020B0604020202020204" pitchFamily="34" charset="0"/>
-              </a:rPr>
-              <a:t>gp2, st1, sc1</a:t>
-            </a:r>
-          </a:p>
-          <a:p>
-            <a:pPr algn="ctr" eaLnBrk="1" hangingPunct="1"/>
-            <a:endParaRPr lang="en-US" altLang="en-US" sz="1000" dirty="0">
-              <a:latin typeface="Arial" panose="020B0604020202020204" pitchFamily="34" charset="0"/>
-              <a:ea typeface="Amazon Ember" panose="020B0603020204020204" pitchFamily="34" charset="0"/>
-              <a:cs typeface="Arial" panose="020B0604020202020204" pitchFamily="34" charset="0"/>
-            </a:endParaRPr>
-          </a:p>
-        </p:txBody>
-      </p:sp>
-      <p:pic>
-        <p:nvPicPr>
-          <p:cNvPr id="99" name="Graphic 10">
-            <a:extLst>
-              <a:ext uri="{FF2B5EF4-FFF2-40B4-BE49-F238E27FC236}">
-                <a16:creationId xmlns:a16="http://schemas.microsoft.com/office/drawing/2014/main" id="{75214CD6-2F4C-5F44-975E-F9E1F4D1BEF9}"/>
-              </a:ext>
-            </a:extLst>
-          </p:cNvPr>
-          <p:cNvPicPr>
-            <a:picLocks noChangeAspect="1" noChangeArrowheads="1"/>
-          </p:cNvPicPr>
-          <p:nvPr/>
-        </p:nvPicPr>
-        <p:blipFill>
-          <a:blip r:embed="rId17">
-            <a:extLst>
-              <a:ext uri="{28A0092B-C50C-407E-A947-70E740481C1C}">
-                <a14:useLocalDpi xmlns:a14="http://schemas.microsoft.com/office/drawing/2010/main" val="0"/>
-              </a:ext>
-            </a:extLst>
-          </a:blip>
-          <a:srcRect/>
-          <a:stretch>
-            <a:fillRect/>
-          </a:stretch>
-        </p:blipFill>
-        <p:spPr bwMode="auto">
-          <a:xfrm>
-            <a:off x="8604594" y="2560402"/>
-            <a:ext cx="594360" cy="594360"/>
-          </a:xfrm>
-          <a:prstGeom prst="rect">
-            <a:avLst/>
-          </a:prstGeom>
-          <a:noFill/>
-          <a:ln>
-            <a:noFill/>
-          </a:ln>
-          <a:extLst>
-            <a:ext uri="{909E8E84-426E-40DD-AFC4-6F175D3DCCD1}">
-              <a14:hiddenFill xmlns:a14="http://schemas.microsoft.com/office/drawing/2010/main">
-                <a:solidFill>
-                  <a:srgbClr val="FFFFFF"/>
-                </a:solidFill>
-              </a14:hiddenFill>
-            </a:ext>
-            <a:ext uri="{91240B29-F687-4F45-9708-019B960494DF}">
-              <a14:hiddenLine xmlns:a14="http://schemas.microsoft.com/office/drawing/2010/main" w="9525">
-                <a:solidFill>
-                  <a:srgbClr val="000000"/>
-                </a:solidFill>
-                <a:miter lim="800000"/>
-                <a:headEnd/>
-                <a:tailEnd/>
-              </a14:hiddenLine>
-            </a:ext>
-          </a:extLst>
-        </p:spPr>
-      </p:pic>
-      <p:sp>
-        <p:nvSpPr>
-          <p:cNvPr id="100" name="TextBox 20">
-            <a:extLst>
-              <a:ext uri="{FF2B5EF4-FFF2-40B4-BE49-F238E27FC236}">
-                <a16:creationId xmlns:a16="http://schemas.microsoft.com/office/drawing/2014/main" id="{7D75AA54-8E1E-6549-81C9-DCB0E2787BA0}"/>
-              </a:ext>
-            </a:extLst>
-          </p:cNvPr>
-          <p:cNvSpPr txBox="1">
-            <a:spLocks noChangeArrowheads="1"/>
-          </p:cNvSpPr>
-          <p:nvPr/>
-        </p:nvSpPr>
-        <p:spPr bwMode="auto">
-          <a:xfrm>
-            <a:off x="7776648" y="3164485"/>
+            <a:off x="7776648" y="2738454"/>
             <a:ext cx="2292350" cy="553998"/>
           </a:xfrm>
           <a:prstGeom prst="rect">
@@ -18270,7 +18049,7 @@
         </p:nvSpPr>
         <p:spPr bwMode="auto">
           <a:xfrm>
-            <a:off x="5631302" y="3273691"/>
+            <a:off x="5631302" y="2754141"/>
             <a:ext cx="1115904" cy="553998"/>
           </a:xfrm>
           <a:prstGeom prst="rect">
@@ -18429,7 +18208,7 @@
         </p:nvCxnSpPr>
         <p:spPr bwMode="auto">
           <a:xfrm>
-            <a:off x="7595517" y="3775548"/>
+            <a:off x="7595517" y="3255998"/>
             <a:ext cx="1371600" cy="0"/>
           </a:xfrm>
           <a:prstGeom prst="straightConnector1">
@@ -18474,7 +18253,7 @@
         </p:nvCxnSpPr>
         <p:spPr bwMode="auto">
           <a:xfrm flipV="1">
-            <a:off x="7595517" y="3775548"/>
+            <a:off x="7595517" y="3255998"/>
             <a:ext cx="0" cy="112703"/>
           </a:xfrm>
           <a:prstGeom prst="straightConnector1">
@@ -18519,7 +18298,7 @@
         </p:nvCxnSpPr>
         <p:spPr bwMode="auto">
           <a:xfrm flipV="1">
-            <a:off x="8967117" y="3775548"/>
+            <a:off x="8967117" y="3255998"/>
             <a:ext cx="0" cy="112703"/>
           </a:xfrm>
           <a:prstGeom prst="straightConnector1">
@@ -18564,9 +18343,9 @@
           <p:nvPr/>
         </p:nvCxnSpPr>
         <p:spPr bwMode="auto">
-          <a:xfrm flipV="1">
-            <a:off x="7601534" y="701604"/>
-            <a:ext cx="314386" cy="4455"/>
+          <a:xfrm>
+            <a:off x="7622032" y="450867"/>
+            <a:ext cx="287538" cy="1353"/>
           </a:xfrm>
           <a:prstGeom prst="straightConnector1">
             <a:avLst/>
@@ -18610,9 +18389,9 @@
           <p:nvPr/>
         </p:nvCxnSpPr>
         <p:spPr bwMode="auto">
-          <a:xfrm flipH="1" flipV="1">
-            <a:off x="7601534" y="706059"/>
-            <a:ext cx="26848" cy="1857432"/>
+          <a:xfrm flipV="1">
+            <a:off x="7628382" y="450867"/>
+            <a:ext cx="0" cy="1696984"/>
           </a:xfrm>
           <a:prstGeom prst="straightConnector1">
             <a:avLst/>
@@ -18655,54 +18434,9 @@
           <p:nvPr/>
         </p:nvCxnSpPr>
         <p:spPr bwMode="auto">
-          <a:xfrm flipV="1">
-            <a:off x="8858125" y="702856"/>
-            <a:ext cx="314386" cy="4455"/>
-          </a:xfrm>
-          <a:prstGeom prst="straightConnector1">
-            <a:avLst/>
-          </a:prstGeom>
-          <a:ln w="12700">
-            <a:solidFill>
-              <a:srgbClr val="545B64"/>
-            </a:solidFill>
-            <a:headEnd type="none" w="med" len="sm"/>
-            <a:tailEnd type="none" w="med" len="sm"/>
-          </a:ln>
-        </p:spPr>
-        <p:style>
-          <a:lnRef idx="1">
-            <a:schemeClr val="accent1"/>
-          </a:lnRef>
-          <a:fillRef idx="0">
-            <a:schemeClr val="accent1"/>
-          </a:fillRef>
-          <a:effectRef idx="0">
-            <a:schemeClr val="accent1"/>
-          </a:effectRef>
-          <a:fontRef idx="minor">
-            <a:schemeClr val="tx1"/>
-          </a:fontRef>
-        </p:style>
-      </p:cxnSp>
-      <p:cxnSp>
-        <p:nvCxnSpPr>
-          <p:cNvPr id="109" name="Straight Arrow Connector 108">
-            <a:extLst>
-              <a:ext uri="{FF2B5EF4-FFF2-40B4-BE49-F238E27FC236}">
-                <a16:creationId xmlns:a16="http://schemas.microsoft.com/office/drawing/2014/main" id="{8ECD5480-5D9B-B64F-87A9-E7C18B01D518}"/>
-              </a:ext>
-            </a:extLst>
-          </p:cNvPr>
-          <p:cNvCxnSpPr>
-            <a:cxnSpLocks/>
-          </p:cNvCxnSpPr>
-          <p:nvPr/>
-        </p:nvCxnSpPr>
-        <p:spPr bwMode="auto">
-          <a:xfrm flipH="1" flipV="1">
-            <a:off x="8858125" y="707311"/>
-            <a:ext cx="26848" cy="1857432"/>
+          <a:xfrm>
+            <a:off x="8898630" y="453472"/>
+            <a:ext cx="273881" cy="1"/>
           </a:xfrm>
           <a:prstGeom prst="straightConnector1">
             <a:avLst/>
@@ -18747,101 +18481,9 @@
           <p:nvPr/>
         </p:nvCxnSpPr>
         <p:spPr bwMode="auto">
-          <a:xfrm flipV="1">
-            <a:off x="7937888" y="4397211"/>
-            <a:ext cx="752920" cy="7707"/>
-          </a:xfrm>
-          <a:prstGeom prst="straightConnector1">
-            <a:avLst/>
-          </a:prstGeom>
-          <a:ln w="12700">
-            <a:solidFill>
-              <a:srgbClr val="545B64"/>
-            </a:solidFill>
-            <a:headEnd type="none" w="med" len="sm"/>
-            <a:tailEnd type="none" w="med" len="sm"/>
-          </a:ln>
-        </p:spPr>
-        <p:style>
-          <a:lnRef idx="1">
-            <a:schemeClr val="accent1"/>
-          </a:lnRef>
-          <a:fillRef idx="0">
-            <a:schemeClr val="accent1"/>
-          </a:fillRef>
-          <a:effectRef idx="0">
-            <a:schemeClr val="accent1"/>
-          </a:effectRef>
-          <a:fontRef idx="minor">
-            <a:schemeClr val="tx1"/>
-          </a:fontRef>
-        </p:style>
-      </p:cxnSp>
-      <p:cxnSp>
-        <p:nvCxnSpPr>
-          <p:cNvPr id="116" name="Straight Arrow Connector 115">
-            <a:extLst>
-              <a:ext uri="{FF2B5EF4-FFF2-40B4-BE49-F238E27FC236}">
-                <a16:creationId xmlns:a16="http://schemas.microsoft.com/office/drawing/2014/main" id="{2B269E94-FEB4-B641-B21B-109D0ECC4A2D}"/>
-              </a:ext>
-            </a:extLst>
-          </p:cNvPr>
-          <p:cNvCxnSpPr>
-            <a:cxnSpLocks/>
-            <a:stCxn id="94" idx="3"/>
-            <a:endCxn id="67" idx="1"/>
-          </p:cNvCxnSpPr>
-          <p:nvPr/>
-        </p:nvCxnSpPr>
-        <p:spPr bwMode="auto">
-          <a:xfrm>
-            <a:off x="2836418" y="4411079"/>
-            <a:ext cx="1685690" cy="1064"/>
-          </a:xfrm>
-          <a:prstGeom prst="straightConnector1">
-            <a:avLst/>
-          </a:prstGeom>
-          <a:ln w="12700">
-            <a:solidFill>
-              <a:srgbClr val="545B64"/>
-            </a:solidFill>
-            <a:headEnd type="none" w="med" len="sm"/>
-            <a:tailEnd type="none" w="med" len="sm"/>
-          </a:ln>
-        </p:spPr>
-        <p:style>
-          <a:lnRef idx="1">
-            <a:schemeClr val="accent1"/>
-          </a:lnRef>
-          <a:fillRef idx="0">
-            <a:schemeClr val="accent1"/>
-          </a:fillRef>
-          <a:effectRef idx="0">
-            <a:schemeClr val="accent1"/>
-          </a:effectRef>
-          <a:fontRef idx="minor">
-            <a:schemeClr val="tx1"/>
-          </a:fontRef>
-        </p:style>
-      </p:cxnSp>
-      <p:cxnSp>
-        <p:nvCxnSpPr>
-          <p:cNvPr id="117" name="Straight Arrow Connector 116">
-            <a:extLst>
-              <a:ext uri="{FF2B5EF4-FFF2-40B4-BE49-F238E27FC236}">
-                <a16:creationId xmlns:a16="http://schemas.microsoft.com/office/drawing/2014/main" id="{605F544E-8B7D-A54A-A0E5-4F635879E8E4}"/>
-              </a:ext>
-            </a:extLst>
-          </p:cNvPr>
-          <p:cNvCxnSpPr>
-            <a:cxnSpLocks/>
-          </p:cNvCxnSpPr>
-          <p:nvPr/>
-        </p:nvCxnSpPr>
-        <p:spPr bwMode="auto">
-          <a:xfrm>
-            <a:off x="4006850" y="3546948"/>
-            <a:ext cx="1412015" cy="0"/>
+          <a:xfrm>
+            <a:off x="7937888" y="3729503"/>
+            <a:ext cx="752920" cy="2684"/>
           </a:xfrm>
           <a:prstGeom prst="straightConnector1">
             <a:avLst/>
@@ -18880,59 +18522,15 @@
           </p:cNvPr>
           <p:cNvCxnSpPr>
             <a:cxnSpLocks/>
+            <a:stCxn id="75" idx="3"/>
             <a:endCxn id="42" idx="1"/>
           </p:cNvCxnSpPr>
           <p:nvPr/>
         </p:nvCxnSpPr>
         <p:spPr bwMode="auto">
           <a:xfrm>
-            <a:off x="5418865" y="4397211"/>
-            <a:ext cx="1924663" cy="7707"/>
-          </a:xfrm>
-          <a:prstGeom prst="straightConnector1">
-            <a:avLst/>
-          </a:prstGeom>
-          <a:ln w="12700">
-            <a:solidFill>
-              <a:srgbClr val="545B64"/>
-            </a:solidFill>
-            <a:headEnd type="none" w="med" len="sm"/>
-            <a:tailEnd type="none" w="med" len="sm"/>
-          </a:ln>
-        </p:spPr>
-        <p:style>
-          <a:lnRef idx="1">
-            <a:schemeClr val="accent1"/>
-          </a:lnRef>
-          <a:fillRef idx="0">
-            <a:schemeClr val="accent1"/>
-          </a:fillRef>
-          <a:effectRef idx="0">
-            <a:schemeClr val="accent1"/>
-          </a:effectRef>
-          <a:fontRef idx="minor">
-            <a:schemeClr val="tx1"/>
-          </a:fontRef>
-        </p:style>
-      </p:cxnSp>
-      <p:cxnSp>
-        <p:nvCxnSpPr>
-          <p:cNvPr id="119" name="Straight Arrow Connector 118">
-            <a:extLst>
-              <a:ext uri="{FF2B5EF4-FFF2-40B4-BE49-F238E27FC236}">
-                <a16:creationId xmlns:a16="http://schemas.microsoft.com/office/drawing/2014/main" id="{F45B05A8-006A-C74C-898E-47434EA3C111}"/>
-              </a:ext>
-            </a:extLst>
-          </p:cNvPr>
-          <p:cNvCxnSpPr>
-            <a:cxnSpLocks/>
-          </p:cNvCxnSpPr>
-          <p:nvPr/>
-        </p:nvCxnSpPr>
-        <p:spPr bwMode="auto">
-          <a:xfrm>
-            <a:off x="5418865" y="3551733"/>
-            <a:ext cx="0" cy="843758"/>
+            <a:off x="3996497" y="3728266"/>
+            <a:ext cx="3347031" cy="1237"/>
           </a:xfrm>
           <a:prstGeom prst="straightConnector1">
             <a:avLst/>
@@ -18976,7 +18574,7 @@
         </p:nvCxnSpPr>
         <p:spPr bwMode="auto">
           <a:xfrm>
-            <a:off x="6224363" y="4537163"/>
+            <a:off x="6224363" y="3861748"/>
             <a:ext cx="1108710" cy="0"/>
           </a:xfrm>
           <a:prstGeom prst="straightConnector1">
@@ -19021,7 +18619,7 @@
         </p:nvCxnSpPr>
         <p:spPr bwMode="auto">
           <a:xfrm flipV="1">
-            <a:off x="6223447" y="4542011"/>
+            <a:off x="6223447" y="3866596"/>
             <a:ext cx="0" cy="112703"/>
           </a:xfrm>
           <a:prstGeom prst="straightConnector1">
@@ -19062,13 +18660,14 @@
           <p:cNvCxnSpPr>
             <a:cxnSpLocks/>
             <a:stCxn id="95" idx="3"/>
+            <a:endCxn id="75" idx="1"/>
           </p:cNvCxnSpPr>
           <p:nvPr/>
         </p:nvCxnSpPr>
         <p:spPr bwMode="auto">
           <a:xfrm>
-            <a:off x="2834666" y="3540019"/>
-            <a:ext cx="714984" cy="6929"/>
+            <a:off x="2834666" y="3727054"/>
+            <a:ext cx="704631" cy="1212"/>
           </a:xfrm>
           <a:prstGeom prst="straightConnector1">
             <a:avLst/>
@@ -19096,26 +18695,1598 @@
           </a:fontRef>
         </p:style>
       </p:cxnSp>
+      <p:sp>
+        <p:nvSpPr>
+          <p:cNvPr id="124" name="TextBox 123">
+            <a:extLst>
+              <a:ext uri="{FF2B5EF4-FFF2-40B4-BE49-F238E27FC236}">
+                <a16:creationId xmlns:a16="http://schemas.microsoft.com/office/drawing/2014/main" id="{4A9E0648-F1A3-5D4E-BD75-44452334C8E4}"/>
+              </a:ext>
+            </a:extLst>
+          </p:cNvPr>
+          <p:cNvSpPr txBox="1"/>
+          <p:nvPr/>
+        </p:nvSpPr>
+        <p:spPr>
+          <a:xfrm>
+            <a:off x="5670985" y="3510038"/>
+            <a:ext cx="1829912" cy="246221"/>
+          </a:xfrm>
+          <a:prstGeom prst="rect">
+            <a:avLst/>
+          </a:prstGeom>
+          <a:noFill/>
+        </p:spPr>
+        <p:txBody>
+          <a:bodyPr wrap="square" rtlCol="0" anchor="t">
+            <a:spAutoFit/>
+          </a:bodyPr>
+          <a:lstStyle/>
+          <a:p>
+            <a:pPr algn="ctr"/>
+            <a:r>
+              <a:rPr lang="en-US" sz="1000" i="1" dirty="0" err="1">
+                <a:latin typeface="Arial" panose="020B0604020202020204" pitchFamily="34" charset="0"/>
+                <a:cs typeface="Arial" panose="020B0604020202020204" pitchFamily="34" charset="0"/>
+              </a:rPr>
+              <a:t>Qumulo</a:t>
+            </a:r>
+            <a:r>
+              <a:rPr lang="en-US" sz="1000" i="1" dirty="0">
+                <a:latin typeface="Arial" panose="020B0604020202020204" pitchFamily="34" charset="0"/>
+                <a:cs typeface="Arial" panose="020B0604020202020204" pitchFamily="34" charset="0"/>
+              </a:rPr>
+              <a:t> Management</a:t>
+            </a:r>
+          </a:p>
+        </p:txBody>
+      </p:sp>
+      <p:pic>
+        <p:nvPicPr>
+          <p:cNvPr id="69" name="Graphic 108">
+            <a:extLst>
+              <a:ext uri="{FF2B5EF4-FFF2-40B4-BE49-F238E27FC236}">
+                <a16:creationId xmlns:a16="http://schemas.microsoft.com/office/drawing/2014/main" id="{4BF4CAF5-3CDA-DF41-B927-A6FAFA35A347}"/>
+              </a:ext>
+            </a:extLst>
+          </p:cNvPr>
+          <p:cNvPicPr>
+            <a:picLocks noChangeAspect="1" noChangeArrowheads="1"/>
+          </p:cNvPicPr>
+          <p:nvPr/>
+        </p:nvPicPr>
+        <p:blipFill>
+          <a:blip r:embed="rId22">
+            <a:extLst>
+              <a:ext uri="{96DAC541-7B7A-43D3-8B79-37D633B846F1}">
+                <asvg:svgBlip xmlns:asvg="http://schemas.microsoft.com/office/drawing/2016/SVG/main" r:embed="rId23"/>
+              </a:ext>
+            </a:extLst>
+          </a:blip>
+          <a:srcRect/>
+          <a:stretch/>
+        </p:blipFill>
+        <p:spPr bwMode="auto">
+          <a:xfrm>
+            <a:off x="5973313" y="3948827"/>
+            <a:ext cx="457200" cy="457200"/>
+          </a:xfrm>
+          <a:prstGeom prst="rect">
+            <a:avLst/>
+          </a:prstGeom>
+          <a:noFill/>
+          <a:ln>
+            <a:noFill/>
+          </a:ln>
+          <a:extLst>
+            <a:ext uri="{909E8E84-426E-40DD-AFC4-6F175D3DCCD1}">
+              <a14:hiddenFill xmlns:a14="http://schemas.microsoft.com/office/drawing/2010/main">
+                <a:solidFill>
+                  <a:srgbClr val="FFFFFF"/>
+                </a:solidFill>
+              </a14:hiddenFill>
+            </a:ext>
+            <a:ext uri="{91240B29-F687-4F45-9708-019B960494DF}">
+              <a14:hiddenLine xmlns:a14="http://schemas.microsoft.com/office/drawing/2010/main" w="9525">
+                <a:solidFill>
+                  <a:srgbClr val="000000"/>
+                </a:solidFill>
+                <a:miter lim="800000"/>
+                <a:headEnd/>
+                <a:tailEnd/>
+              </a14:hiddenLine>
+            </a:ext>
+          </a:extLst>
+        </p:spPr>
+      </p:pic>
+      <p:pic>
+        <p:nvPicPr>
+          <p:cNvPr id="70" name="Graphic 15">
+            <a:extLst>
+              <a:ext uri="{FF2B5EF4-FFF2-40B4-BE49-F238E27FC236}">
+                <a16:creationId xmlns:a16="http://schemas.microsoft.com/office/drawing/2014/main" id="{DCBF1440-0336-A642-B2FA-274B29062FFC}"/>
+              </a:ext>
+            </a:extLst>
+          </p:cNvPr>
+          <p:cNvPicPr>
+            <a:picLocks noChangeAspect="1" noChangeArrowheads="1"/>
+          </p:cNvPicPr>
+          <p:nvPr/>
+        </p:nvPicPr>
+        <p:blipFill>
+          <a:blip r:embed="rId24">
+            <a:extLst>
+              <a:ext uri="{28A0092B-C50C-407E-A947-70E740481C1C}">
+                <a14:useLocalDpi xmlns:a14="http://schemas.microsoft.com/office/drawing/2010/main" val="0"/>
+              </a:ext>
+            </a:extLst>
+          </a:blip>
+          <a:srcRect/>
+          <a:stretch>
+            <a:fillRect/>
+          </a:stretch>
+        </p:blipFill>
+        <p:spPr bwMode="auto">
+          <a:xfrm>
+            <a:off x="5813405" y="159495"/>
+            <a:ext cx="591033" cy="591033"/>
+          </a:xfrm>
+          <a:prstGeom prst="rect">
+            <a:avLst/>
+          </a:prstGeom>
+          <a:noFill/>
+          <a:ln>
+            <a:noFill/>
+          </a:ln>
+          <a:extLst>
+            <a:ext uri="{909E8E84-426E-40DD-AFC4-6F175D3DCCD1}">
+              <a14:hiddenFill xmlns:a14="http://schemas.microsoft.com/office/drawing/2010/main">
+                <a:solidFill>
+                  <a:srgbClr val="FFFFFF"/>
+                </a:solidFill>
+              </a14:hiddenFill>
+            </a:ext>
+            <a:ext uri="{91240B29-F687-4F45-9708-019B960494DF}">
+              <a14:hiddenLine xmlns:a14="http://schemas.microsoft.com/office/drawing/2010/main" w="9525">
+                <a:solidFill>
+                  <a:srgbClr val="000000"/>
+                </a:solidFill>
+                <a:miter lim="800000"/>
+                <a:headEnd/>
+                <a:tailEnd/>
+              </a14:hiddenLine>
+            </a:ext>
+          </a:extLst>
+        </p:spPr>
+      </p:pic>
+      <p:sp>
+        <p:nvSpPr>
+          <p:cNvPr id="71" name="TextBox 11">
+            <a:extLst>
+              <a:ext uri="{FF2B5EF4-FFF2-40B4-BE49-F238E27FC236}">
+                <a16:creationId xmlns:a16="http://schemas.microsoft.com/office/drawing/2014/main" id="{961E1DE9-E2D2-6844-8BEE-C33EBA7F183F}"/>
+              </a:ext>
+            </a:extLst>
+          </p:cNvPr>
+          <p:cNvSpPr txBox="1">
+            <a:spLocks noChangeArrowheads="1"/>
+          </p:cNvSpPr>
+          <p:nvPr/>
+        </p:nvSpPr>
+        <p:spPr bwMode="auto">
+          <a:xfrm>
+            <a:off x="5232704" y="740694"/>
+            <a:ext cx="1778027" cy="400110"/>
+          </a:xfrm>
+          <a:prstGeom prst="rect">
+            <a:avLst/>
+          </a:prstGeom>
+          <a:noFill/>
+          <a:ln>
+            <a:noFill/>
+          </a:ln>
+          <a:extLst>
+            <a:ext uri="{909E8E84-426E-40DD-AFC4-6F175D3DCCD1}">
+              <a14:hiddenFill xmlns:a14="http://schemas.microsoft.com/office/drawing/2010/main">
+                <a:solidFill>
+                  <a:srgbClr val="FFFFFF"/>
+                </a:solidFill>
+              </a14:hiddenFill>
+            </a:ext>
+            <a:ext uri="{91240B29-F687-4F45-9708-019B960494DF}">
+              <a14:hiddenLine xmlns:a14="http://schemas.microsoft.com/office/drawing/2010/main" w="9525">
+                <a:solidFill>
+                  <a:srgbClr val="000000"/>
+                </a:solidFill>
+                <a:miter lim="800000"/>
+                <a:headEnd/>
+                <a:tailEnd/>
+              </a14:hiddenLine>
+            </a:ext>
+          </a:extLst>
+        </p:spPr>
+        <p:txBody>
+          <a:bodyPr wrap="square">
+            <a:spAutoFit/>
+          </a:bodyPr>
+          <a:lstStyle>
+            <a:lvl1pPr>
+              <a:defRPr>
+                <a:solidFill>
+                  <a:schemeClr val="tx1"/>
+                </a:solidFill>
+                <a:latin typeface="Calibri" panose="020F0502020204030204" pitchFamily="34" charset="0"/>
+              </a:defRPr>
+            </a:lvl1pPr>
+            <a:lvl2pPr marL="742950" indent="-285750">
+              <a:defRPr>
+                <a:solidFill>
+                  <a:schemeClr val="tx1"/>
+                </a:solidFill>
+                <a:latin typeface="Calibri" panose="020F0502020204030204" pitchFamily="34" charset="0"/>
+              </a:defRPr>
+            </a:lvl2pPr>
+            <a:lvl3pPr marL="1143000" indent="-228600">
+              <a:defRPr>
+                <a:solidFill>
+                  <a:schemeClr val="tx1"/>
+                </a:solidFill>
+                <a:latin typeface="Calibri" panose="020F0502020204030204" pitchFamily="34" charset="0"/>
+              </a:defRPr>
+            </a:lvl3pPr>
+            <a:lvl4pPr marL="1600200" indent="-228600">
+              <a:defRPr>
+                <a:solidFill>
+                  <a:schemeClr val="tx1"/>
+                </a:solidFill>
+                <a:latin typeface="Calibri" panose="020F0502020204030204" pitchFamily="34" charset="0"/>
+              </a:defRPr>
+            </a:lvl4pPr>
+            <a:lvl5pPr marL="2057400" indent="-228600">
+              <a:defRPr>
+                <a:solidFill>
+                  <a:schemeClr val="tx1"/>
+                </a:solidFill>
+                <a:latin typeface="Calibri" panose="020F0502020204030204" pitchFamily="34" charset="0"/>
+              </a:defRPr>
+            </a:lvl5pPr>
+            <a:lvl6pPr marL="2514600" indent="-228600" eaLnBrk="0" fontAlgn="base" hangingPunct="0">
+              <a:spcBef>
+                <a:spcPct val="0"/>
+              </a:spcBef>
+              <a:spcAft>
+                <a:spcPct val="0"/>
+              </a:spcAft>
+              <a:defRPr>
+                <a:solidFill>
+                  <a:schemeClr val="tx1"/>
+                </a:solidFill>
+                <a:latin typeface="Calibri" panose="020F0502020204030204" pitchFamily="34" charset="0"/>
+              </a:defRPr>
+            </a:lvl6pPr>
+            <a:lvl7pPr marL="2971800" indent="-228600" eaLnBrk="0" fontAlgn="base" hangingPunct="0">
+              <a:spcBef>
+                <a:spcPct val="0"/>
+              </a:spcBef>
+              <a:spcAft>
+                <a:spcPct val="0"/>
+              </a:spcAft>
+              <a:defRPr>
+                <a:solidFill>
+                  <a:schemeClr val="tx1"/>
+                </a:solidFill>
+                <a:latin typeface="Calibri" panose="020F0502020204030204" pitchFamily="34" charset="0"/>
+              </a:defRPr>
+            </a:lvl7pPr>
+            <a:lvl8pPr marL="3429000" indent="-228600" eaLnBrk="0" fontAlgn="base" hangingPunct="0">
+              <a:spcBef>
+                <a:spcPct val="0"/>
+              </a:spcBef>
+              <a:spcAft>
+                <a:spcPct val="0"/>
+              </a:spcAft>
+              <a:defRPr>
+                <a:solidFill>
+                  <a:schemeClr val="tx1"/>
+                </a:solidFill>
+                <a:latin typeface="Calibri" panose="020F0502020204030204" pitchFamily="34" charset="0"/>
+              </a:defRPr>
+            </a:lvl8pPr>
+            <a:lvl9pPr marL="3886200" indent="-228600" eaLnBrk="0" fontAlgn="base" hangingPunct="0">
+              <a:spcBef>
+                <a:spcPct val="0"/>
+              </a:spcBef>
+              <a:spcAft>
+                <a:spcPct val="0"/>
+              </a:spcAft>
+              <a:defRPr>
+                <a:solidFill>
+                  <a:schemeClr val="tx1"/>
+                </a:solidFill>
+                <a:latin typeface="Calibri" panose="020F0502020204030204" pitchFamily="34" charset="0"/>
+              </a:defRPr>
+            </a:lvl9pPr>
+          </a:lstStyle>
+          <a:p>
+            <a:pPr algn="ctr" eaLnBrk="1" hangingPunct="1"/>
+            <a:r>
+              <a:rPr lang="en-US" altLang="en-US" sz="1000" dirty="0">
+                <a:latin typeface="Arial" panose="020B0604020202020204" pitchFamily="34" charset="0"/>
+                <a:ea typeface="Amazon Ember" panose="020B0603020204020204" pitchFamily="34" charset="0"/>
+                <a:cs typeface="Arial" panose="020B0604020202020204" pitchFamily="34" charset="0"/>
+              </a:rPr>
+              <a:t>AWS Systems </a:t>
+            </a:r>
+          </a:p>
+          <a:p>
+            <a:pPr algn="ctr" eaLnBrk="1" hangingPunct="1"/>
+            <a:r>
+              <a:rPr lang="en-US" altLang="en-US" sz="1000" dirty="0">
+                <a:latin typeface="Arial" panose="020B0604020202020204" pitchFamily="34" charset="0"/>
+                <a:ea typeface="Amazon Ember" panose="020B0603020204020204" pitchFamily="34" charset="0"/>
+                <a:cs typeface="Arial" panose="020B0604020202020204" pitchFamily="34" charset="0"/>
+              </a:rPr>
+              <a:t>Manager</a:t>
+            </a:r>
+          </a:p>
+        </p:txBody>
+      </p:sp>
+      <p:pic>
+        <p:nvPicPr>
+          <p:cNvPr id="74" name="Graphic 21">
+            <a:extLst>
+              <a:ext uri="{FF2B5EF4-FFF2-40B4-BE49-F238E27FC236}">
+                <a16:creationId xmlns:a16="http://schemas.microsoft.com/office/drawing/2014/main" id="{D1EC144A-6827-1841-9B41-65E7AD840BAC}"/>
+              </a:ext>
+            </a:extLst>
+          </p:cNvPr>
+          <p:cNvPicPr>
+            <a:picLocks noChangeAspect="1" noChangeArrowheads="1"/>
+          </p:cNvPicPr>
+          <p:nvPr/>
+        </p:nvPicPr>
+        <p:blipFill>
+          <a:blip r:embed="rId25">
+            <a:extLst>
+              <a:ext uri="{28A0092B-C50C-407E-A947-70E740481C1C}">
+                <a14:useLocalDpi xmlns:a14="http://schemas.microsoft.com/office/drawing/2010/main" val="0"/>
+              </a:ext>
+            </a:extLst>
+          </a:blip>
+          <a:srcRect/>
+          <a:stretch>
+            <a:fillRect/>
+          </a:stretch>
+        </p:blipFill>
+        <p:spPr bwMode="auto">
+          <a:xfrm>
+            <a:off x="5893742" y="2170893"/>
+            <a:ext cx="594360" cy="594360"/>
+          </a:xfrm>
+          <a:prstGeom prst="rect">
+            <a:avLst/>
+          </a:prstGeom>
+          <a:noFill/>
+          <a:ln>
+            <a:noFill/>
+          </a:ln>
+          <a:extLst>
+            <a:ext uri="{909E8E84-426E-40DD-AFC4-6F175D3DCCD1}">
+              <a14:hiddenFill xmlns:a14="http://schemas.microsoft.com/office/drawing/2010/main">
+                <a:solidFill>
+                  <a:srgbClr val="FFFFFF"/>
+                </a:solidFill>
+              </a14:hiddenFill>
+            </a:ext>
+            <a:ext uri="{91240B29-F687-4F45-9708-019B960494DF}">
+              <a14:hiddenLine xmlns:a14="http://schemas.microsoft.com/office/drawing/2010/main" w="9525">
+                <a:solidFill>
+                  <a:srgbClr val="000000"/>
+                </a:solidFill>
+                <a:miter lim="800000"/>
+                <a:headEnd/>
+                <a:tailEnd/>
+              </a14:hiddenLine>
+            </a:ext>
+          </a:extLst>
+        </p:spPr>
+      </p:pic>
+      <p:pic>
+        <p:nvPicPr>
+          <p:cNvPr id="75" name="Graphic 24">
+            <a:extLst>
+              <a:ext uri="{FF2B5EF4-FFF2-40B4-BE49-F238E27FC236}">
+                <a16:creationId xmlns:a16="http://schemas.microsoft.com/office/drawing/2014/main" id="{5D5161E4-FC4F-544A-B592-99AE2D2256FD}"/>
+              </a:ext>
+            </a:extLst>
+          </p:cNvPr>
+          <p:cNvPicPr>
+            <a:picLocks noChangeAspect="1" noChangeArrowheads="1"/>
+          </p:cNvPicPr>
+          <p:nvPr/>
+        </p:nvPicPr>
+        <p:blipFill>
+          <a:blip r:embed="rId26">
+            <a:extLst>
+              <a:ext uri="{28A0092B-C50C-407E-A947-70E740481C1C}">
+                <a14:useLocalDpi xmlns:a14="http://schemas.microsoft.com/office/drawing/2010/main" val="0"/>
+              </a:ext>
+            </a:extLst>
+          </a:blip>
+          <a:srcRect/>
+          <a:stretch>
+            <a:fillRect/>
+          </a:stretch>
+        </p:blipFill>
+        <p:spPr bwMode="auto">
+          <a:xfrm>
+            <a:off x="3539297" y="3499666"/>
+            <a:ext cx="457200" cy="457200"/>
+          </a:xfrm>
+          <a:prstGeom prst="rect">
+            <a:avLst/>
+          </a:prstGeom>
+          <a:noFill/>
+          <a:ln>
+            <a:noFill/>
+          </a:ln>
+          <a:extLst>
+            <a:ext uri="{909E8E84-426E-40DD-AFC4-6F175D3DCCD1}">
+              <a14:hiddenFill xmlns:a14="http://schemas.microsoft.com/office/drawing/2010/main">
+                <a:solidFill>
+                  <a:srgbClr val="FFFFFF"/>
+                </a:solidFill>
+              </a14:hiddenFill>
+            </a:ext>
+            <a:ext uri="{91240B29-F687-4F45-9708-019B960494DF}">
+              <a14:hiddenLine xmlns:a14="http://schemas.microsoft.com/office/drawing/2010/main" w="9525">
+                <a:solidFill>
+                  <a:srgbClr val="000000"/>
+                </a:solidFill>
+                <a:miter lim="800000"/>
+                <a:headEnd/>
+                <a:tailEnd/>
+              </a14:hiddenLine>
+            </a:ext>
+          </a:extLst>
+        </p:spPr>
+      </p:pic>
+      <p:sp>
+        <p:nvSpPr>
+          <p:cNvPr id="76" name="TextBox 22">
+            <a:extLst>
+              <a:ext uri="{FF2B5EF4-FFF2-40B4-BE49-F238E27FC236}">
+                <a16:creationId xmlns:a16="http://schemas.microsoft.com/office/drawing/2014/main" id="{F05CA681-D745-ED40-A2F0-F68C61F65903}"/>
+              </a:ext>
+            </a:extLst>
+          </p:cNvPr>
+          <p:cNvSpPr txBox="1">
+            <a:spLocks noChangeArrowheads="1"/>
+          </p:cNvSpPr>
+          <p:nvPr/>
+        </p:nvSpPr>
+        <p:spPr bwMode="auto">
+          <a:xfrm>
+            <a:off x="3085041" y="3903418"/>
+            <a:ext cx="1339850" cy="246221"/>
+          </a:xfrm>
+          <a:prstGeom prst="rect">
+            <a:avLst/>
+          </a:prstGeom>
+          <a:noFill/>
+          <a:ln>
+            <a:noFill/>
+          </a:ln>
+          <a:extLst>
+            <a:ext uri="{909E8E84-426E-40DD-AFC4-6F175D3DCCD1}">
+              <a14:hiddenFill xmlns:a14="http://schemas.microsoft.com/office/drawing/2010/main">
+                <a:solidFill>
+                  <a:srgbClr val="FFFFFF"/>
+                </a:solidFill>
+              </a14:hiddenFill>
+            </a:ext>
+            <a:ext uri="{91240B29-F687-4F45-9708-019B960494DF}">
+              <a14:hiddenLine xmlns:a14="http://schemas.microsoft.com/office/drawing/2010/main" w="9525">
+                <a:solidFill>
+                  <a:srgbClr val="000000"/>
+                </a:solidFill>
+                <a:miter lim="800000"/>
+                <a:headEnd/>
+                <a:tailEnd/>
+              </a14:hiddenLine>
+            </a:ext>
+          </a:extLst>
+        </p:spPr>
+        <p:style>
+          <a:lnRef idx="0">
+            <a:scrgbClr r="0" g="0" b="0"/>
+          </a:lnRef>
+          <a:fillRef idx="0">
+            <a:scrgbClr r="0" g="0" b="0"/>
+          </a:fillRef>
+          <a:effectRef idx="0">
+            <a:scrgbClr r="0" g="0" b="0"/>
+          </a:effectRef>
+          <a:fontRef idx="major"/>
+        </p:style>
+        <p:txBody>
+          <a:bodyPr wrap="square">
+            <a:spAutoFit/>
+          </a:bodyPr>
+          <a:lstStyle>
+            <a:lvl1pPr>
+              <a:defRPr>
+                <a:latin typeface="+mj-lt"/>
+                <a:ea typeface="+mj-ea"/>
+                <a:cs typeface="+mj-cs"/>
+              </a:defRPr>
+            </a:lvl1pPr>
+            <a:lvl2pPr>
+              <a:defRPr>
+                <a:latin typeface="+mj-lt"/>
+                <a:ea typeface="+mj-ea"/>
+                <a:cs typeface="+mj-cs"/>
+              </a:defRPr>
+            </a:lvl2pPr>
+            <a:lvl3pPr>
+              <a:defRPr>
+                <a:latin typeface="+mj-lt"/>
+                <a:ea typeface="+mj-ea"/>
+                <a:cs typeface="+mj-cs"/>
+              </a:defRPr>
+            </a:lvl3pPr>
+            <a:lvl4pPr>
+              <a:defRPr>
+                <a:latin typeface="+mj-lt"/>
+                <a:ea typeface="+mj-ea"/>
+                <a:cs typeface="+mj-cs"/>
+              </a:defRPr>
+            </a:lvl4pPr>
+            <a:lvl5pPr>
+              <a:defRPr>
+                <a:latin typeface="+mj-lt"/>
+                <a:ea typeface="+mj-ea"/>
+                <a:cs typeface="+mj-cs"/>
+              </a:defRPr>
+            </a:lvl5pPr>
+            <a:lvl6pPr>
+              <a:defRPr>
+                <a:latin typeface="+mj-lt"/>
+                <a:ea typeface="+mj-ea"/>
+                <a:cs typeface="+mj-cs"/>
+              </a:defRPr>
+            </a:lvl6pPr>
+            <a:lvl7pPr>
+              <a:defRPr>
+                <a:latin typeface="+mj-lt"/>
+                <a:ea typeface="+mj-ea"/>
+                <a:cs typeface="+mj-cs"/>
+              </a:defRPr>
+            </a:lvl7pPr>
+            <a:lvl8pPr>
+              <a:defRPr>
+                <a:latin typeface="+mj-lt"/>
+                <a:ea typeface="+mj-ea"/>
+                <a:cs typeface="+mj-cs"/>
+              </a:defRPr>
+            </a:lvl8pPr>
+            <a:lvl9pPr>
+              <a:defRPr>
+                <a:latin typeface="+mj-lt"/>
+                <a:ea typeface="+mj-ea"/>
+                <a:cs typeface="+mj-cs"/>
+              </a:defRPr>
+            </a:lvl9pPr>
+          </a:lstStyle>
+          <a:p>
+            <a:pPr algn="ctr" eaLnBrk="1" hangingPunct="1"/>
+            <a:r>
+              <a:rPr lang="en-US" altLang="en-US" sz="1000" dirty="0">
+                <a:latin typeface="Arial" panose="020B0604020202020204" pitchFamily="34" charset="0"/>
+                <a:ea typeface="Amazon Ember" panose="020B0603020204020204" pitchFamily="34" charset="0"/>
+                <a:cs typeface="Arial" panose="020B0604020202020204" pitchFamily="34" charset="0"/>
+              </a:rPr>
+              <a:t>Optional: NLB</a:t>
+            </a:r>
+          </a:p>
+        </p:txBody>
+      </p:sp>
+      <p:pic>
+        <p:nvPicPr>
+          <p:cNvPr id="77" name="Graphic 19">
+            <a:extLst>
+              <a:ext uri="{FF2B5EF4-FFF2-40B4-BE49-F238E27FC236}">
+                <a16:creationId xmlns:a16="http://schemas.microsoft.com/office/drawing/2014/main" id="{A9F82018-528E-5A45-AB4A-6EE4E6014E71}"/>
+              </a:ext>
+            </a:extLst>
+          </p:cNvPr>
+          <p:cNvPicPr>
+            <a:picLocks noChangeAspect="1" noChangeArrowheads="1"/>
+          </p:cNvPicPr>
+          <p:nvPr/>
+        </p:nvPicPr>
+        <p:blipFill>
+          <a:blip r:embed="rId27">
+            <a:extLst>
+              <a:ext uri="{28A0092B-C50C-407E-A947-70E740481C1C}">
+                <a14:useLocalDpi xmlns:a14="http://schemas.microsoft.com/office/drawing/2010/main" val="0"/>
+              </a:ext>
+            </a:extLst>
+          </a:blip>
+          <a:srcRect/>
+          <a:stretch>
+            <a:fillRect/>
+          </a:stretch>
+        </p:blipFill>
+        <p:spPr bwMode="auto">
+          <a:xfrm>
+            <a:off x="4975740" y="166739"/>
+            <a:ext cx="595978" cy="595978"/>
+          </a:xfrm>
+          <a:prstGeom prst="rect">
+            <a:avLst/>
+          </a:prstGeom>
+          <a:noFill/>
+          <a:ln>
+            <a:noFill/>
+          </a:ln>
+          <a:extLst>
+            <a:ext uri="{909E8E84-426E-40DD-AFC4-6F175D3DCCD1}">
+              <a14:hiddenFill xmlns:a14="http://schemas.microsoft.com/office/drawing/2010/main">
+                <a:solidFill>
+                  <a:srgbClr val="FFFFFF"/>
+                </a:solidFill>
+              </a14:hiddenFill>
+            </a:ext>
+            <a:ext uri="{91240B29-F687-4F45-9708-019B960494DF}">
+              <a14:hiddenLine xmlns:a14="http://schemas.microsoft.com/office/drawing/2010/main" w="9525">
+                <a:solidFill>
+                  <a:srgbClr val="000000"/>
+                </a:solidFill>
+                <a:miter lim="800000"/>
+                <a:headEnd/>
+                <a:tailEnd/>
+              </a14:hiddenLine>
+            </a:ext>
+          </a:extLst>
+        </p:spPr>
+      </p:pic>
+      <p:sp>
+        <p:nvSpPr>
+          <p:cNvPr id="78" name="TextBox 12">
+            <a:extLst>
+              <a:ext uri="{FF2B5EF4-FFF2-40B4-BE49-F238E27FC236}">
+                <a16:creationId xmlns:a16="http://schemas.microsoft.com/office/drawing/2014/main" id="{FA984FBF-FB60-8940-AF5F-CED24877132E}"/>
+              </a:ext>
+            </a:extLst>
+          </p:cNvPr>
+          <p:cNvSpPr txBox="1">
+            <a:spLocks noChangeArrowheads="1"/>
+          </p:cNvSpPr>
+          <p:nvPr/>
+        </p:nvSpPr>
+        <p:spPr bwMode="auto">
+          <a:xfrm>
+            <a:off x="4760741" y="765873"/>
+            <a:ext cx="1035068" cy="246221"/>
+          </a:xfrm>
+          <a:prstGeom prst="rect">
+            <a:avLst/>
+          </a:prstGeom>
+          <a:noFill/>
+          <a:ln>
+            <a:noFill/>
+          </a:ln>
+          <a:extLst>
+            <a:ext uri="{909E8E84-426E-40DD-AFC4-6F175D3DCCD1}">
+              <a14:hiddenFill xmlns:a14="http://schemas.microsoft.com/office/drawing/2010/main">
+                <a:solidFill>
+                  <a:srgbClr val="FFFFFF"/>
+                </a:solidFill>
+              </a14:hiddenFill>
+            </a:ext>
+            <a:ext uri="{91240B29-F687-4F45-9708-019B960494DF}">
+              <a14:hiddenLine xmlns:a14="http://schemas.microsoft.com/office/drawing/2010/main" w="9525">
+                <a:solidFill>
+                  <a:srgbClr val="000000"/>
+                </a:solidFill>
+                <a:miter lim="800000"/>
+                <a:headEnd/>
+                <a:tailEnd/>
+              </a14:hiddenLine>
+            </a:ext>
+          </a:extLst>
+        </p:spPr>
+        <p:txBody>
+          <a:bodyPr wrap="square">
+            <a:spAutoFit/>
+          </a:bodyPr>
+          <a:lstStyle>
+            <a:lvl1pPr>
+              <a:defRPr>
+                <a:solidFill>
+                  <a:schemeClr val="tx1"/>
+                </a:solidFill>
+                <a:latin typeface="Calibri" panose="020F0502020204030204" pitchFamily="34" charset="0"/>
+              </a:defRPr>
+            </a:lvl1pPr>
+            <a:lvl2pPr marL="742950" indent="-285750">
+              <a:defRPr>
+                <a:solidFill>
+                  <a:schemeClr val="tx1"/>
+                </a:solidFill>
+                <a:latin typeface="Calibri" panose="020F0502020204030204" pitchFamily="34" charset="0"/>
+              </a:defRPr>
+            </a:lvl2pPr>
+            <a:lvl3pPr marL="1143000" indent="-228600">
+              <a:defRPr>
+                <a:solidFill>
+                  <a:schemeClr val="tx1"/>
+                </a:solidFill>
+                <a:latin typeface="Calibri" panose="020F0502020204030204" pitchFamily="34" charset="0"/>
+              </a:defRPr>
+            </a:lvl3pPr>
+            <a:lvl4pPr marL="1600200" indent="-228600">
+              <a:defRPr>
+                <a:solidFill>
+                  <a:schemeClr val="tx1"/>
+                </a:solidFill>
+                <a:latin typeface="Calibri" panose="020F0502020204030204" pitchFamily="34" charset="0"/>
+              </a:defRPr>
+            </a:lvl4pPr>
+            <a:lvl5pPr marL="2057400" indent="-228600">
+              <a:defRPr>
+                <a:solidFill>
+                  <a:schemeClr val="tx1"/>
+                </a:solidFill>
+                <a:latin typeface="Calibri" panose="020F0502020204030204" pitchFamily="34" charset="0"/>
+              </a:defRPr>
+            </a:lvl5pPr>
+            <a:lvl6pPr marL="2514600" indent="-228600" eaLnBrk="0" fontAlgn="base" hangingPunct="0">
+              <a:spcBef>
+                <a:spcPct val="0"/>
+              </a:spcBef>
+              <a:spcAft>
+                <a:spcPct val="0"/>
+              </a:spcAft>
+              <a:defRPr>
+                <a:solidFill>
+                  <a:schemeClr val="tx1"/>
+                </a:solidFill>
+                <a:latin typeface="Calibri" panose="020F0502020204030204" pitchFamily="34" charset="0"/>
+              </a:defRPr>
+            </a:lvl6pPr>
+            <a:lvl7pPr marL="2971800" indent="-228600" eaLnBrk="0" fontAlgn="base" hangingPunct="0">
+              <a:spcBef>
+                <a:spcPct val="0"/>
+              </a:spcBef>
+              <a:spcAft>
+                <a:spcPct val="0"/>
+              </a:spcAft>
+              <a:defRPr>
+                <a:solidFill>
+                  <a:schemeClr val="tx1"/>
+                </a:solidFill>
+                <a:latin typeface="Calibri" panose="020F0502020204030204" pitchFamily="34" charset="0"/>
+              </a:defRPr>
+            </a:lvl7pPr>
+            <a:lvl8pPr marL="3429000" indent="-228600" eaLnBrk="0" fontAlgn="base" hangingPunct="0">
+              <a:spcBef>
+                <a:spcPct val="0"/>
+              </a:spcBef>
+              <a:spcAft>
+                <a:spcPct val="0"/>
+              </a:spcAft>
+              <a:defRPr>
+                <a:solidFill>
+                  <a:schemeClr val="tx1"/>
+                </a:solidFill>
+                <a:latin typeface="Calibri" panose="020F0502020204030204" pitchFamily="34" charset="0"/>
+              </a:defRPr>
+            </a:lvl8pPr>
+            <a:lvl9pPr marL="3886200" indent="-228600" eaLnBrk="0" fontAlgn="base" hangingPunct="0">
+              <a:spcBef>
+                <a:spcPct val="0"/>
+              </a:spcBef>
+              <a:spcAft>
+                <a:spcPct val="0"/>
+              </a:spcAft>
+              <a:defRPr>
+                <a:solidFill>
+                  <a:schemeClr val="tx1"/>
+                </a:solidFill>
+                <a:latin typeface="Calibri" panose="020F0502020204030204" pitchFamily="34" charset="0"/>
+              </a:defRPr>
+            </a:lvl9pPr>
+          </a:lstStyle>
+          <a:p>
+            <a:pPr algn="ctr" eaLnBrk="1" hangingPunct="1"/>
+            <a:r>
+              <a:rPr lang="en-US" altLang="en-US" sz="1000" dirty="0">
+                <a:latin typeface="Arial" panose="020B0604020202020204" pitchFamily="34" charset="0"/>
+                <a:ea typeface="Amazon Ember" panose="020B0603020204020204" pitchFamily="34" charset="0"/>
+                <a:cs typeface="Arial" panose="020B0604020202020204" pitchFamily="34" charset="0"/>
+              </a:rPr>
+              <a:t>AWS IAM</a:t>
+            </a:r>
+          </a:p>
+        </p:txBody>
+      </p:sp>
+      <p:pic>
+        <p:nvPicPr>
+          <p:cNvPr id="80" name="Graphic 17">
+            <a:extLst>
+              <a:ext uri="{FF2B5EF4-FFF2-40B4-BE49-F238E27FC236}">
+                <a16:creationId xmlns:a16="http://schemas.microsoft.com/office/drawing/2014/main" id="{C9A65B73-C953-4C43-92E0-70465C118649}"/>
+              </a:ext>
+            </a:extLst>
+          </p:cNvPr>
+          <p:cNvPicPr>
+            <a:picLocks noChangeAspect="1" noChangeArrowheads="1"/>
+          </p:cNvPicPr>
+          <p:nvPr/>
+        </p:nvPicPr>
+        <p:blipFill>
+          <a:blip r:embed="rId28">
+            <a:extLst>
+              <a:ext uri="{28A0092B-C50C-407E-A947-70E740481C1C}">
+                <a14:useLocalDpi xmlns:a14="http://schemas.microsoft.com/office/drawing/2010/main" val="0"/>
+              </a:ext>
+            </a:extLst>
+          </a:blip>
+          <a:srcRect/>
+          <a:stretch>
+            <a:fillRect/>
+          </a:stretch>
+        </p:blipFill>
+        <p:spPr bwMode="auto">
+          <a:xfrm>
+            <a:off x="4128449" y="165012"/>
+            <a:ext cx="595315" cy="595315"/>
+          </a:xfrm>
+          <a:prstGeom prst="rect">
+            <a:avLst/>
+          </a:prstGeom>
+          <a:noFill/>
+          <a:ln>
+            <a:noFill/>
+          </a:ln>
+          <a:extLst>
+            <a:ext uri="{909E8E84-426E-40DD-AFC4-6F175D3DCCD1}">
+              <a14:hiddenFill xmlns:a14="http://schemas.microsoft.com/office/drawing/2010/main">
+                <a:solidFill>
+                  <a:srgbClr val="FFFFFF"/>
+                </a:solidFill>
+              </a14:hiddenFill>
+            </a:ext>
+            <a:ext uri="{91240B29-F687-4F45-9708-019B960494DF}">
+              <a14:hiddenLine xmlns:a14="http://schemas.microsoft.com/office/drawing/2010/main" w="9525">
+                <a:solidFill>
+                  <a:srgbClr val="000000"/>
+                </a:solidFill>
+                <a:miter lim="800000"/>
+                <a:headEnd/>
+                <a:tailEnd/>
+              </a14:hiddenLine>
+            </a:ext>
+          </a:extLst>
+        </p:spPr>
+      </p:pic>
+      <p:sp>
+        <p:nvSpPr>
+          <p:cNvPr id="81" name="TextBox 11">
+            <a:extLst>
+              <a:ext uri="{FF2B5EF4-FFF2-40B4-BE49-F238E27FC236}">
+                <a16:creationId xmlns:a16="http://schemas.microsoft.com/office/drawing/2014/main" id="{BDD7DE52-905B-6D48-BDFD-4664381AD57E}"/>
+              </a:ext>
+            </a:extLst>
+          </p:cNvPr>
+          <p:cNvSpPr txBox="1">
+            <a:spLocks noChangeArrowheads="1"/>
+          </p:cNvSpPr>
+          <p:nvPr/>
+        </p:nvSpPr>
+        <p:spPr bwMode="auto">
+          <a:xfrm>
+            <a:off x="3752395" y="767210"/>
+            <a:ext cx="1339444" cy="400110"/>
+          </a:xfrm>
+          <a:prstGeom prst="rect">
+            <a:avLst/>
+          </a:prstGeom>
+          <a:noFill/>
+          <a:ln>
+            <a:noFill/>
+          </a:ln>
+          <a:extLst>
+            <a:ext uri="{909E8E84-426E-40DD-AFC4-6F175D3DCCD1}">
+              <a14:hiddenFill xmlns:a14="http://schemas.microsoft.com/office/drawing/2010/main">
+                <a:solidFill>
+                  <a:srgbClr val="FFFFFF"/>
+                </a:solidFill>
+              </a14:hiddenFill>
+            </a:ext>
+            <a:ext uri="{91240B29-F687-4F45-9708-019B960494DF}">
+              <a14:hiddenLine xmlns:a14="http://schemas.microsoft.com/office/drawing/2010/main" w="9525">
+                <a:solidFill>
+                  <a:srgbClr val="000000"/>
+                </a:solidFill>
+                <a:miter lim="800000"/>
+                <a:headEnd/>
+                <a:tailEnd/>
+              </a14:hiddenLine>
+            </a:ext>
+          </a:extLst>
+        </p:spPr>
+        <p:txBody>
+          <a:bodyPr wrap="square">
+            <a:spAutoFit/>
+          </a:bodyPr>
+          <a:lstStyle>
+            <a:lvl1pPr>
+              <a:defRPr>
+                <a:solidFill>
+                  <a:schemeClr val="tx1"/>
+                </a:solidFill>
+                <a:latin typeface="Calibri" panose="020F0502020204030204" pitchFamily="34" charset="0"/>
+              </a:defRPr>
+            </a:lvl1pPr>
+            <a:lvl2pPr marL="742950" indent="-285750">
+              <a:defRPr>
+                <a:solidFill>
+                  <a:schemeClr val="tx1"/>
+                </a:solidFill>
+                <a:latin typeface="Calibri" panose="020F0502020204030204" pitchFamily="34" charset="0"/>
+              </a:defRPr>
+            </a:lvl2pPr>
+            <a:lvl3pPr marL="1143000" indent="-228600">
+              <a:defRPr>
+                <a:solidFill>
+                  <a:schemeClr val="tx1"/>
+                </a:solidFill>
+                <a:latin typeface="Calibri" panose="020F0502020204030204" pitchFamily="34" charset="0"/>
+              </a:defRPr>
+            </a:lvl3pPr>
+            <a:lvl4pPr marL="1600200" indent="-228600">
+              <a:defRPr>
+                <a:solidFill>
+                  <a:schemeClr val="tx1"/>
+                </a:solidFill>
+                <a:latin typeface="Calibri" panose="020F0502020204030204" pitchFamily="34" charset="0"/>
+              </a:defRPr>
+            </a:lvl4pPr>
+            <a:lvl5pPr marL="2057400" indent="-228600">
+              <a:defRPr>
+                <a:solidFill>
+                  <a:schemeClr val="tx1"/>
+                </a:solidFill>
+                <a:latin typeface="Calibri" panose="020F0502020204030204" pitchFamily="34" charset="0"/>
+              </a:defRPr>
+            </a:lvl5pPr>
+            <a:lvl6pPr marL="2514600" indent="-228600" eaLnBrk="0" fontAlgn="base" hangingPunct="0">
+              <a:spcBef>
+                <a:spcPct val="0"/>
+              </a:spcBef>
+              <a:spcAft>
+                <a:spcPct val="0"/>
+              </a:spcAft>
+              <a:defRPr>
+                <a:solidFill>
+                  <a:schemeClr val="tx1"/>
+                </a:solidFill>
+                <a:latin typeface="Calibri" panose="020F0502020204030204" pitchFamily="34" charset="0"/>
+              </a:defRPr>
+            </a:lvl6pPr>
+            <a:lvl7pPr marL="2971800" indent="-228600" eaLnBrk="0" fontAlgn="base" hangingPunct="0">
+              <a:spcBef>
+                <a:spcPct val="0"/>
+              </a:spcBef>
+              <a:spcAft>
+                <a:spcPct val="0"/>
+              </a:spcAft>
+              <a:defRPr>
+                <a:solidFill>
+                  <a:schemeClr val="tx1"/>
+                </a:solidFill>
+                <a:latin typeface="Calibri" panose="020F0502020204030204" pitchFamily="34" charset="0"/>
+              </a:defRPr>
+            </a:lvl7pPr>
+            <a:lvl8pPr marL="3429000" indent="-228600" eaLnBrk="0" fontAlgn="base" hangingPunct="0">
+              <a:spcBef>
+                <a:spcPct val="0"/>
+              </a:spcBef>
+              <a:spcAft>
+                <a:spcPct val="0"/>
+              </a:spcAft>
+              <a:defRPr>
+                <a:solidFill>
+                  <a:schemeClr val="tx1"/>
+                </a:solidFill>
+                <a:latin typeface="Calibri" panose="020F0502020204030204" pitchFamily="34" charset="0"/>
+              </a:defRPr>
+            </a:lvl8pPr>
+            <a:lvl9pPr marL="3886200" indent="-228600" eaLnBrk="0" fontAlgn="base" hangingPunct="0">
+              <a:spcBef>
+                <a:spcPct val="0"/>
+              </a:spcBef>
+              <a:spcAft>
+                <a:spcPct val="0"/>
+              </a:spcAft>
+              <a:defRPr>
+                <a:solidFill>
+                  <a:schemeClr val="tx1"/>
+                </a:solidFill>
+                <a:latin typeface="Calibri" panose="020F0502020204030204" pitchFamily="34" charset="0"/>
+              </a:defRPr>
+            </a:lvl9pPr>
+          </a:lstStyle>
+          <a:p>
+            <a:pPr algn="ctr" eaLnBrk="1" hangingPunct="1"/>
+            <a:r>
+              <a:rPr lang="en-US" altLang="en-US" sz="1000" dirty="0">
+                <a:latin typeface="Arial" panose="020B0604020202020204" pitchFamily="34" charset="0"/>
+                <a:ea typeface="Amazon Ember" panose="020B0603020204020204" pitchFamily="34" charset="0"/>
+                <a:cs typeface="Arial" panose="020B0604020202020204" pitchFamily="34" charset="0"/>
+              </a:rPr>
+              <a:t>AWS Secrets</a:t>
+            </a:r>
+          </a:p>
+          <a:p>
+            <a:pPr algn="ctr" eaLnBrk="1" hangingPunct="1"/>
+            <a:r>
+              <a:rPr lang="en-US" altLang="en-US" sz="1000" dirty="0">
+                <a:latin typeface="Arial" panose="020B0604020202020204" pitchFamily="34" charset="0"/>
+                <a:ea typeface="Amazon Ember" panose="020B0603020204020204" pitchFamily="34" charset="0"/>
+                <a:cs typeface="Arial" panose="020B0604020202020204" pitchFamily="34" charset="0"/>
+              </a:rPr>
+              <a:t> Manager</a:t>
+            </a:r>
+          </a:p>
+        </p:txBody>
+      </p:sp>
+      <p:pic>
+        <p:nvPicPr>
+          <p:cNvPr id="82" name="Graphic 7">
+            <a:extLst>
+              <a:ext uri="{FF2B5EF4-FFF2-40B4-BE49-F238E27FC236}">
+                <a16:creationId xmlns:a16="http://schemas.microsoft.com/office/drawing/2014/main" id="{D8A4905B-A884-4F4C-A120-6DBB6A20202F}"/>
+              </a:ext>
+            </a:extLst>
+          </p:cNvPr>
+          <p:cNvPicPr>
+            <a:picLocks noChangeAspect="1" noChangeArrowheads="1"/>
+          </p:cNvPicPr>
+          <p:nvPr/>
+        </p:nvPicPr>
+        <p:blipFill>
+          <a:blip r:embed="rId29">
+            <a:extLst>
+              <a:ext uri="{28A0092B-C50C-407E-A947-70E740481C1C}">
+                <a14:useLocalDpi xmlns:a14="http://schemas.microsoft.com/office/drawing/2010/main" val="0"/>
+              </a:ext>
+            </a:extLst>
+          </a:blip>
+          <a:srcRect/>
+          <a:stretch>
+            <a:fillRect/>
+          </a:stretch>
+        </p:blipFill>
+        <p:spPr bwMode="auto">
+          <a:xfrm>
+            <a:off x="3303351" y="172605"/>
+            <a:ext cx="579144" cy="579144"/>
+          </a:xfrm>
+          <a:prstGeom prst="rect">
+            <a:avLst/>
+          </a:prstGeom>
+          <a:noFill/>
+          <a:ln>
+            <a:noFill/>
+          </a:ln>
+          <a:extLst>
+            <a:ext uri="{909E8E84-426E-40DD-AFC4-6F175D3DCCD1}">
+              <a14:hiddenFill xmlns:a14="http://schemas.microsoft.com/office/drawing/2010/main">
+                <a:solidFill>
+                  <a:srgbClr val="FFFFFF"/>
+                </a:solidFill>
+              </a14:hiddenFill>
+            </a:ext>
+            <a:ext uri="{91240B29-F687-4F45-9708-019B960494DF}">
+              <a14:hiddenLine xmlns:a14="http://schemas.microsoft.com/office/drawing/2010/main" w="9525">
+                <a:solidFill>
+                  <a:srgbClr val="000000"/>
+                </a:solidFill>
+                <a:miter lim="800000"/>
+                <a:headEnd/>
+                <a:tailEnd/>
+              </a14:hiddenLine>
+            </a:ext>
+          </a:extLst>
+        </p:spPr>
+      </p:pic>
+      <p:sp>
+        <p:nvSpPr>
+          <p:cNvPr id="83" name="TextBox 9">
+            <a:extLst>
+              <a:ext uri="{FF2B5EF4-FFF2-40B4-BE49-F238E27FC236}">
+                <a16:creationId xmlns:a16="http://schemas.microsoft.com/office/drawing/2014/main" id="{BB423690-BD4E-2E43-8E66-0120662E336A}"/>
+              </a:ext>
+            </a:extLst>
+          </p:cNvPr>
+          <p:cNvSpPr txBox="1">
+            <a:spLocks noChangeArrowheads="1"/>
+          </p:cNvSpPr>
+          <p:nvPr/>
+        </p:nvSpPr>
+        <p:spPr bwMode="auto">
+          <a:xfrm>
+            <a:off x="3047198" y="761486"/>
+            <a:ext cx="1102903" cy="246221"/>
+          </a:xfrm>
+          <a:prstGeom prst="rect">
+            <a:avLst/>
+          </a:prstGeom>
+          <a:noFill/>
+          <a:ln>
+            <a:noFill/>
+          </a:ln>
+          <a:extLst>
+            <a:ext uri="{909E8E84-426E-40DD-AFC4-6F175D3DCCD1}">
+              <a14:hiddenFill xmlns:a14="http://schemas.microsoft.com/office/drawing/2010/main">
+                <a:solidFill>
+                  <a:srgbClr val="FFFFFF"/>
+                </a:solidFill>
+              </a14:hiddenFill>
+            </a:ext>
+            <a:ext uri="{91240B29-F687-4F45-9708-019B960494DF}">
+              <a14:hiddenLine xmlns:a14="http://schemas.microsoft.com/office/drawing/2010/main" w="9525">
+                <a:solidFill>
+                  <a:srgbClr val="000000"/>
+                </a:solidFill>
+                <a:miter lim="800000"/>
+                <a:headEnd/>
+                <a:tailEnd/>
+              </a14:hiddenLine>
+            </a:ext>
+          </a:extLst>
+        </p:spPr>
+        <p:txBody>
+          <a:bodyPr wrap="square">
+            <a:spAutoFit/>
+          </a:bodyPr>
+          <a:lstStyle>
+            <a:lvl1pPr>
+              <a:defRPr>
+                <a:solidFill>
+                  <a:schemeClr val="tx1"/>
+                </a:solidFill>
+                <a:latin typeface="Calibri" panose="020F0502020204030204" pitchFamily="34" charset="0"/>
+              </a:defRPr>
+            </a:lvl1pPr>
+            <a:lvl2pPr marL="742950" indent="-285750">
+              <a:defRPr>
+                <a:solidFill>
+                  <a:schemeClr val="tx1"/>
+                </a:solidFill>
+                <a:latin typeface="Calibri" panose="020F0502020204030204" pitchFamily="34" charset="0"/>
+              </a:defRPr>
+            </a:lvl2pPr>
+            <a:lvl3pPr marL="1143000" indent="-228600">
+              <a:defRPr>
+                <a:solidFill>
+                  <a:schemeClr val="tx1"/>
+                </a:solidFill>
+                <a:latin typeface="Calibri" panose="020F0502020204030204" pitchFamily="34" charset="0"/>
+              </a:defRPr>
+            </a:lvl3pPr>
+            <a:lvl4pPr marL="1600200" indent="-228600">
+              <a:defRPr>
+                <a:solidFill>
+                  <a:schemeClr val="tx1"/>
+                </a:solidFill>
+                <a:latin typeface="Calibri" panose="020F0502020204030204" pitchFamily="34" charset="0"/>
+              </a:defRPr>
+            </a:lvl4pPr>
+            <a:lvl5pPr marL="2057400" indent="-228600">
+              <a:defRPr>
+                <a:solidFill>
+                  <a:schemeClr val="tx1"/>
+                </a:solidFill>
+                <a:latin typeface="Calibri" panose="020F0502020204030204" pitchFamily="34" charset="0"/>
+              </a:defRPr>
+            </a:lvl5pPr>
+            <a:lvl6pPr marL="2514600" indent="-228600" eaLnBrk="0" fontAlgn="base" hangingPunct="0">
+              <a:spcBef>
+                <a:spcPct val="0"/>
+              </a:spcBef>
+              <a:spcAft>
+                <a:spcPct val="0"/>
+              </a:spcAft>
+              <a:defRPr>
+                <a:solidFill>
+                  <a:schemeClr val="tx1"/>
+                </a:solidFill>
+                <a:latin typeface="Calibri" panose="020F0502020204030204" pitchFamily="34" charset="0"/>
+              </a:defRPr>
+            </a:lvl6pPr>
+            <a:lvl7pPr marL="2971800" indent="-228600" eaLnBrk="0" fontAlgn="base" hangingPunct="0">
+              <a:spcBef>
+                <a:spcPct val="0"/>
+              </a:spcBef>
+              <a:spcAft>
+                <a:spcPct val="0"/>
+              </a:spcAft>
+              <a:defRPr>
+                <a:solidFill>
+                  <a:schemeClr val="tx1"/>
+                </a:solidFill>
+                <a:latin typeface="Calibri" panose="020F0502020204030204" pitchFamily="34" charset="0"/>
+              </a:defRPr>
+            </a:lvl7pPr>
+            <a:lvl8pPr marL="3429000" indent="-228600" eaLnBrk="0" fontAlgn="base" hangingPunct="0">
+              <a:spcBef>
+                <a:spcPct val="0"/>
+              </a:spcBef>
+              <a:spcAft>
+                <a:spcPct val="0"/>
+              </a:spcAft>
+              <a:defRPr>
+                <a:solidFill>
+                  <a:schemeClr val="tx1"/>
+                </a:solidFill>
+                <a:latin typeface="Calibri" panose="020F0502020204030204" pitchFamily="34" charset="0"/>
+              </a:defRPr>
+            </a:lvl8pPr>
+            <a:lvl9pPr marL="3886200" indent="-228600" eaLnBrk="0" fontAlgn="base" hangingPunct="0">
+              <a:spcBef>
+                <a:spcPct val="0"/>
+              </a:spcBef>
+              <a:spcAft>
+                <a:spcPct val="0"/>
+              </a:spcAft>
+              <a:defRPr>
+                <a:solidFill>
+                  <a:schemeClr val="tx1"/>
+                </a:solidFill>
+                <a:latin typeface="Calibri" panose="020F0502020204030204" pitchFamily="34" charset="0"/>
+              </a:defRPr>
+            </a:lvl9pPr>
+          </a:lstStyle>
+          <a:p>
+            <a:pPr algn="ctr" eaLnBrk="1" hangingPunct="1"/>
+            <a:r>
+              <a:rPr lang="en-US" altLang="en-US" sz="1000" dirty="0">
+                <a:latin typeface="Arial" panose="020B0604020202020204" pitchFamily="34" charset="0"/>
+                <a:ea typeface="Amazon Ember" panose="020B0603020204020204" pitchFamily="34" charset="0"/>
+                <a:cs typeface="Arial" panose="020B0604020202020204" pitchFamily="34" charset="0"/>
+              </a:rPr>
+              <a:t>AWS KMS</a:t>
+            </a:r>
+          </a:p>
+        </p:txBody>
+      </p:sp>
+      <p:sp>
+        <p:nvSpPr>
+          <p:cNvPr id="68" name="Rectangle 67">
+            <a:extLst>
+              <a:ext uri="{FF2B5EF4-FFF2-40B4-BE49-F238E27FC236}">
+                <a16:creationId xmlns:a16="http://schemas.microsoft.com/office/drawing/2014/main" id="{A8543216-F4B1-DE4A-A8D7-F761EAFB9267}"/>
+              </a:ext>
+            </a:extLst>
+          </p:cNvPr>
+          <p:cNvSpPr/>
+          <p:nvPr/>
+        </p:nvSpPr>
+        <p:spPr>
+          <a:xfrm>
+            <a:off x="2375802" y="4934801"/>
+            <a:ext cx="7381262" cy="899574"/>
+          </a:xfrm>
+          <a:prstGeom prst="rect">
+            <a:avLst/>
+          </a:prstGeom>
+          <a:noFill/>
+          <a:ln w="12700">
+            <a:solidFill>
+              <a:srgbClr val="007DBC"/>
+            </a:solidFill>
+            <a:prstDash val="dash"/>
+          </a:ln>
+        </p:spPr>
+        <p:style>
+          <a:lnRef idx="2">
+            <a:schemeClr val="accent1">
+              <a:shade val="50000"/>
+            </a:schemeClr>
+          </a:lnRef>
+          <a:fillRef idx="1">
+            <a:schemeClr val="accent1"/>
+          </a:fillRef>
+          <a:effectRef idx="0">
+            <a:schemeClr val="accent1"/>
+          </a:effectRef>
+          <a:fontRef idx="minor">
+            <a:schemeClr val="lt1"/>
+          </a:fontRef>
+        </p:style>
+        <p:txBody>
+          <a:bodyPr rot="0" spcFirstLastPara="0" vertOverflow="overflow" horzOverflow="overflow" vert="horz" wrap="square" lIns="91440" tIns="91440" rIns="91440" bIns="45720" numCol="1" spcCol="0" rtlCol="0" fromWordArt="0" anchor="t" anchorCtr="0" forceAA="0" compatLnSpc="1">
+            <a:prstTxWarp prst="textNoShape">
+              <a:avLst/>
+            </a:prstTxWarp>
+            <a:noAutofit/>
+          </a:bodyPr>
+          <a:lstStyle/>
+          <a:p>
+            <a:pPr algn="ctr"/>
+            <a:r>
+              <a:rPr lang="en-US" sz="1200" dirty="0">
+                <a:solidFill>
+                  <a:srgbClr val="007DBC"/>
+                </a:solidFill>
+                <a:latin typeface="Arial" panose="020B0604020202020204" pitchFamily="34" charset="0"/>
+                <a:cs typeface="Arial" panose="020B0604020202020204" pitchFamily="34" charset="0"/>
+              </a:rPr>
+              <a:t>Availability Zone 2 - DR</a:t>
+            </a:r>
+          </a:p>
+        </p:txBody>
+      </p:sp>
+      <p:sp>
+        <p:nvSpPr>
+          <p:cNvPr id="84" name="Rectangle 83">
+            <a:extLst>
+              <a:ext uri="{FF2B5EF4-FFF2-40B4-BE49-F238E27FC236}">
+                <a16:creationId xmlns:a16="http://schemas.microsoft.com/office/drawing/2014/main" id="{23DC943C-AC94-8441-B000-C8517D677BC8}"/>
+              </a:ext>
+            </a:extLst>
+          </p:cNvPr>
+          <p:cNvSpPr/>
+          <p:nvPr/>
+        </p:nvSpPr>
+        <p:spPr>
+          <a:xfrm>
+            <a:off x="2563909" y="5208278"/>
+            <a:ext cx="2255362" cy="544818"/>
+          </a:xfrm>
+          <a:prstGeom prst="rect">
+            <a:avLst/>
+          </a:prstGeom>
+          <a:solidFill>
+            <a:srgbClr val="1D8900">
+              <a:alpha val="9804"/>
+            </a:srgbClr>
+          </a:solidFill>
+          <a:ln w="12700">
+            <a:noFill/>
+            <a:prstDash val="solid"/>
+          </a:ln>
+        </p:spPr>
+        <p:style>
+          <a:lnRef idx="2">
+            <a:schemeClr val="accent1">
+              <a:shade val="50000"/>
+            </a:schemeClr>
+          </a:lnRef>
+          <a:fillRef idx="1">
+            <a:schemeClr val="accent1"/>
+          </a:fillRef>
+          <a:effectRef idx="0">
+            <a:schemeClr val="accent1"/>
+          </a:effectRef>
+          <a:fontRef idx="minor">
+            <a:schemeClr val="lt1"/>
+          </a:fontRef>
+        </p:style>
+        <p:txBody>
+          <a:bodyPr rot="0" spcFirstLastPara="0" vertOverflow="overflow" horzOverflow="overflow" vert="horz" wrap="square" lIns="338328" tIns="45720" rIns="91440" bIns="45720" numCol="1" spcCol="0" rtlCol="0" fromWordArt="0" anchor="t" anchorCtr="0" forceAA="0" compatLnSpc="1">
+            <a:prstTxWarp prst="textNoShape">
+              <a:avLst/>
+            </a:prstTxWarp>
+            <a:noAutofit/>
+          </a:bodyPr>
+          <a:lstStyle/>
+          <a:p>
+            <a:pPr algn="l"/>
+            <a:r>
+              <a:rPr lang="en-US" sz="1200" dirty="0">
+                <a:solidFill>
+                  <a:srgbClr val="1E8900"/>
+                </a:solidFill>
+                <a:latin typeface="Arial" panose="020B0604020202020204" pitchFamily="34" charset="0"/>
+                <a:cs typeface="Arial" panose="020B0604020202020204" pitchFamily="34" charset="0"/>
+              </a:rPr>
+              <a:t>Public subnet </a:t>
+            </a:r>
+          </a:p>
+          <a:p>
+            <a:pPr algn="l"/>
+            <a:r>
+              <a:rPr lang="en-US" sz="1200" dirty="0">
+                <a:solidFill>
+                  <a:srgbClr val="1E8900"/>
+                </a:solidFill>
+                <a:latin typeface="Arial" panose="020B0604020202020204" pitchFamily="34" charset="0"/>
+                <a:cs typeface="Arial" panose="020B0604020202020204" pitchFamily="34" charset="0"/>
+              </a:rPr>
+              <a:t>10.0.16.0/20</a:t>
+            </a:r>
+          </a:p>
+        </p:txBody>
+      </p:sp>
+      <p:pic>
+        <p:nvPicPr>
+          <p:cNvPr id="86" name="Graphic 85">
+            <a:extLst>
+              <a:ext uri="{FF2B5EF4-FFF2-40B4-BE49-F238E27FC236}">
+                <a16:creationId xmlns:a16="http://schemas.microsoft.com/office/drawing/2014/main" id="{A6CB0A17-28F3-A344-A08C-99579C79A766}"/>
+              </a:ext>
+            </a:extLst>
+          </p:cNvPr>
+          <p:cNvPicPr>
+            <a:picLocks noChangeAspect="1"/>
+          </p:cNvPicPr>
+          <p:nvPr/>
+        </p:nvPicPr>
+        <p:blipFill>
+          <a:blip r:embed="rId7">
+            <a:extLst>
+              <a:ext uri="{96DAC541-7B7A-43D3-8B79-37D633B846F1}">
+                <asvg:svgBlip xmlns:asvg="http://schemas.microsoft.com/office/drawing/2016/SVG/main" r:embed="rId8"/>
+              </a:ext>
+            </a:extLst>
+          </a:blip>
+          <a:stretch>
+            <a:fillRect/>
+          </a:stretch>
+        </p:blipFill>
+        <p:spPr>
+          <a:xfrm>
+            <a:off x="2574992" y="5210005"/>
+            <a:ext cx="274320" cy="274320"/>
+          </a:xfrm>
+          <a:prstGeom prst="rect">
+            <a:avLst/>
+          </a:prstGeom>
+        </p:spPr>
+      </p:pic>
+      <p:sp>
+        <p:nvSpPr>
+          <p:cNvPr id="87" name="Rectangle 86">
+            <a:extLst>
+              <a:ext uri="{FF2B5EF4-FFF2-40B4-BE49-F238E27FC236}">
+                <a16:creationId xmlns:a16="http://schemas.microsoft.com/office/drawing/2014/main" id="{156CB059-5383-7F41-A028-7D8F5E1C029F}"/>
+              </a:ext>
+            </a:extLst>
+          </p:cNvPr>
+          <p:cNvSpPr/>
+          <p:nvPr/>
+        </p:nvSpPr>
+        <p:spPr>
+          <a:xfrm>
+            <a:off x="4984143" y="5208277"/>
+            <a:ext cx="4573382" cy="550095"/>
+          </a:xfrm>
+          <a:prstGeom prst="rect">
+            <a:avLst/>
+          </a:prstGeom>
+          <a:solidFill>
+            <a:srgbClr val="007CBC">
+              <a:alpha val="9804"/>
+            </a:srgbClr>
+          </a:solidFill>
+          <a:ln w="12700">
+            <a:noFill/>
+            <a:prstDash val="solid"/>
+          </a:ln>
+        </p:spPr>
+        <p:style>
+          <a:lnRef idx="2">
+            <a:schemeClr val="accent1">
+              <a:shade val="50000"/>
+            </a:schemeClr>
+          </a:lnRef>
+          <a:fillRef idx="1">
+            <a:schemeClr val="accent1"/>
+          </a:fillRef>
+          <a:effectRef idx="0">
+            <a:schemeClr val="accent1"/>
+          </a:effectRef>
+          <a:fontRef idx="minor">
+            <a:schemeClr val="lt1"/>
+          </a:fontRef>
+        </p:style>
+        <p:txBody>
+          <a:bodyPr rot="0" spcFirstLastPara="0" vertOverflow="overflow" horzOverflow="overflow" vert="horz" wrap="square" lIns="338328" tIns="45720" rIns="91440" bIns="45720" numCol="1" spcCol="0" rtlCol="0" fromWordArt="0" anchor="t" anchorCtr="0" forceAA="0" compatLnSpc="1">
+            <a:prstTxWarp prst="textNoShape">
+              <a:avLst/>
+            </a:prstTxWarp>
+            <a:noAutofit/>
+          </a:bodyPr>
+          <a:lstStyle/>
+          <a:p>
+            <a:pPr algn="l"/>
+            <a:r>
+              <a:rPr lang="en-US" sz="1200" dirty="0">
+                <a:solidFill>
+                  <a:srgbClr val="007DBC"/>
+                </a:solidFill>
+                <a:latin typeface="Arial" panose="020B0604020202020204" pitchFamily="34" charset="0"/>
+                <a:cs typeface="Arial" panose="020B0604020202020204" pitchFamily="34" charset="0"/>
+              </a:rPr>
+              <a:t>Private subnet</a:t>
+            </a:r>
+          </a:p>
+          <a:p>
+            <a:pPr algn="l"/>
+            <a:r>
+              <a:rPr lang="en-US" sz="1200" dirty="0">
+                <a:solidFill>
+                  <a:srgbClr val="007DBC"/>
+                </a:solidFill>
+                <a:latin typeface="Arial" panose="020B0604020202020204" pitchFamily="34" charset="0"/>
+                <a:cs typeface="Arial" panose="020B0604020202020204" pitchFamily="34" charset="0"/>
+              </a:rPr>
+              <a:t>10.0.144.0/20</a:t>
+            </a:r>
+          </a:p>
+        </p:txBody>
+      </p:sp>
+      <p:pic>
+        <p:nvPicPr>
+          <p:cNvPr id="90" name="Graphic 89">
+            <a:extLst>
+              <a:ext uri="{FF2B5EF4-FFF2-40B4-BE49-F238E27FC236}">
+                <a16:creationId xmlns:a16="http://schemas.microsoft.com/office/drawing/2014/main" id="{1B93F908-DB92-204D-95AB-64CBD1432689}"/>
+              </a:ext>
+            </a:extLst>
+          </p:cNvPr>
+          <p:cNvPicPr>
+            <a:picLocks noChangeAspect="1"/>
+          </p:cNvPicPr>
+          <p:nvPr/>
+        </p:nvPicPr>
+        <p:blipFill>
+          <a:blip r:embed="rId9">
+            <a:extLst>
+              <a:ext uri="{96DAC541-7B7A-43D3-8B79-37D633B846F1}">
+                <asvg:svgBlip xmlns:asvg="http://schemas.microsoft.com/office/drawing/2016/SVG/main" r:embed="rId10"/>
+              </a:ext>
+            </a:extLst>
+          </a:blip>
+          <a:stretch>
+            <a:fillRect/>
+          </a:stretch>
+        </p:blipFill>
+        <p:spPr>
+          <a:xfrm>
+            <a:off x="4995779" y="5203835"/>
+            <a:ext cx="274320" cy="274320"/>
+          </a:xfrm>
+          <a:prstGeom prst="rect">
+            <a:avLst/>
+          </a:prstGeom>
+        </p:spPr>
+      </p:pic>
       <p:cxnSp>
         <p:nvCxnSpPr>
-          <p:cNvPr id="123" name="Straight Arrow Connector 122">
-            <a:extLst>
-              <a:ext uri="{FF2B5EF4-FFF2-40B4-BE49-F238E27FC236}">
-                <a16:creationId xmlns:a16="http://schemas.microsoft.com/office/drawing/2014/main" id="{85968E5C-53C3-D447-9C39-8C8FFF4ABEF0}"/>
+          <p:cNvPr id="91" name="Straight Arrow Connector 90">
+            <a:extLst>
+              <a:ext uri="{FF2B5EF4-FFF2-40B4-BE49-F238E27FC236}">
+                <a16:creationId xmlns:a16="http://schemas.microsoft.com/office/drawing/2014/main" id="{B2C25A49-0C41-5040-85F8-7DB2AB8114D7}"/>
               </a:ext>
             </a:extLst>
           </p:cNvPr>
           <p:cNvCxnSpPr>
             <a:cxnSpLocks/>
-            <a:stCxn id="95" idx="2"/>
-            <a:endCxn id="94" idx="0"/>
+            <a:stCxn id="99" idx="0"/>
           </p:cNvCxnSpPr>
           <p:nvPr/>
         </p:nvCxnSpPr>
         <p:spPr bwMode="auto">
-          <a:xfrm>
-            <a:off x="2606066" y="3768619"/>
-            <a:ext cx="1752" cy="413860"/>
+          <a:xfrm flipV="1">
+            <a:off x="8901774" y="450867"/>
+            <a:ext cx="0" cy="1693895"/>
           </a:xfrm>
           <a:prstGeom prst="straightConnector1">
             <a:avLst/>
@@ -19143,1276 +20314,6 @@
           </a:fontRef>
         </p:style>
       </p:cxnSp>
-      <p:sp>
-        <p:nvSpPr>
-          <p:cNvPr id="124" name="TextBox 123">
-            <a:extLst>
-              <a:ext uri="{FF2B5EF4-FFF2-40B4-BE49-F238E27FC236}">
-                <a16:creationId xmlns:a16="http://schemas.microsoft.com/office/drawing/2014/main" id="{4A9E0648-F1A3-5D4E-BD75-44452334C8E4}"/>
-              </a:ext>
-            </a:extLst>
-          </p:cNvPr>
-          <p:cNvSpPr txBox="1"/>
-          <p:nvPr/>
-        </p:nvSpPr>
-        <p:spPr>
-          <a:xfrm>
-            <a:off x="5670985" y="4185453"/>
-            <a:ext cx="1829912" cy="246221"/>
-          </a:xfrm>
-          <a:prstGeom prst="rect">
-            <a:avLst/>
-          </a:prstGeom>
-          <a:noFill/>
-        </p:spPr>
-        <p:txBody>
-          <a:bodyPr wrap="square" rtlCol="0" anchor="t">
-            <a:spAutoFit/>
-          </a:bodyPr>
-          <a:lstStyle/>
-          <a:p>
-            <a:pPr algn="ctr"/>
-            <a:r>
-              <a:rPr lang="en-US" sz="1000" i="1" dirty="0" err="1">
-                <a:latin typeface="Arial" panose="020B0604020202020204" pitchFamily="34" charset="0"/>
-                <a:cs typeface="Arial" panose="020B0604020202020204" pitchFamily="34" charset="0"/>
-              </a:rPr>
-              <a:t>Qumulo</a:t>
-            </a:r>
-            <a:r>
-              <a:rPr lang="en-US" sz="1000" i="1" dirty="0">
-                <a:latin typeface="Arial" panose="020B0604020202020204" pitchFamily="34" charset="0"/>
-                <a:cs typeface="Arial" panose="020B0604020202020204" pitchFamily="34" charset="0"/>
-              </a:rPr>
-              <a:t> Management</a:t>
-            </a:r>
-          </a:p>
-        </p:txBody>
-      </p:sp>
-      <p:pic>
-        <p:nvPicPr>
-          <p:cNvPr id="69" name="Graphic 108">
-            <a:extLst>
-              <a:ext uri="{FF2B5EF4-FFF2-40B4-BE49-F238E27FC236}">
-                <a16:creationId xmlns:a16="http://schemas.microsoft.com/office/drawing/2014/main" id="{4BF4CAF5-3CDA-DF41-B927-A6FAFA35A347}"/>
-              </a:ext>
-            </a:extLst>
-          </p:cNvPr>
-          <p:cNvPicPr>
-            <a:picLocks noChangeAspect="1" noChangeArrowheads="1"/>
-          </p:cNvPicPr>
-          <p:nvPr/>
-        </p:nvPicPr>
-        <p:blipFill>
-          <a:blip r:embed="rId23">
-            <a:extLst>
-              <a:ext uri="{96DAC541-7B7A-43D3-8B79-37D633B846F1}">
-                <asvg:svgBlip xmlns:asvg="http://schemas.microsoft.com/office/drawing/2016/SVG/main" r:embed="rId24"/>
-              </a:ext>
-            </a:extLst>
-          </a:blip>
-          <a:srcRect/>
-          <a:stretch/>
-        </p:blipFill>
-        <p:spPr bwMode="auto">
-          <a:xfrm>
-            <a:off x="5973313" y="4624242"/>
-            <a:ext cx="457200" cy="457200"/>
-          </a:xfrm>
-          <a:prstGeom prst="rect">
-            <a:avLst/>
-          </a:prstGeom>
-          <a:noFill/>
-          <a:ln>
-            <a:noFill/>
-          </a:ln>
-          <a:extLst>
-            <a:ext uri="{909E8E84-426E-40DD-AFC4-6F175D3DCCD1}">
-              <a14:hiddenFill xmlns:a14="http://schemas.microsoft.com/office/drawing/2010/main">
-                <a:solidFill>
-                  <a:srgbClr val="FFFFFF"/>
-                </a:solidFill>
-              </a14:hiddenFill>
-            </a:ext>
-            <a:ext uri="{91240B29-F687-4F45-9708-019B960494DF}">
-              <a14:hiddenLine xmlns:a14="http://schemas.microsoft.com/office/drawing/2010/main" w="9525">
-                <a:solidFill>
-                  <a:srgbClr val="000000"/>
-                </a:solidFill>
-                <a:miter lim="800000"/>
-                <a:headEnd/>
-                <a:tailEnd/>
-              </a14:hiddenLine>
-            </a:ext>
-          </a:extLst>
-        </p:spPr>
-      </p:pic>
-      <p:pic>
-        <p:nvPicPr>
-          <p:cNvPr id="70" name="Graphic 15">
-            <a:extLst>
-              <a:ext uri="{FF2B5EF4-FFF2-40B4-BE49-F238E27FC236}">
-                <a16:creationId xmlns:a16="http://schemas.microsoft.com/office/drawing/2014/main" id="{DCBF1440-0336-A642-B2FA-274B29062FFC}"/>
-              </a:ext>
-            </a:extLst>
-          </p:cNvPr>
-          <p:cNvPicPr>
-            <a:picLocks noChangeAspect="1" noChangeArrowheads="1"/>
-          </p:cNvPicPr>
-          <p:nvPr/>
-        </p:nvPicPr>
-        <p:blipFill>
-          <a:blip r:embed="rId25">
-            <a:extLst>
-              <a:ext uri="{28A0092B-C50C-407E-A947-70E740481C1C}">
-                <a14:useLocalDpi xmlns:a14="http://schemas.microsoft.com/office/drawing/2010/main" val="0"/>
-              </a:ext>
-            </a:extLst>
-          </a:blip>
-          <a:srcRect/>
-          <a:stretch>
-            <a:fillRect/>
-          </a:stretch>
-        </p:blipFill>
-        <p:spPr bwMode="auto">
-          <a:xfrm>
-            <a:off x="5813405" y="408879"/>
-            <a:ext cx="591033" cy="591033"/>
-          </a:xfrm>
-          <a:prstGeom prst="rect">
-            <a:avLst/>
-          </a:prstGeom>
-          <a:noFill/>
-          <a:ln>
-            <a:noFill/>
-          </a:ln>
-          <a:extLst>
-            <a:ext uri="{909E8E84-426E-40DD-AFC4-6F175D3DCCD1}">
-              <a14:hiddenFill xmlns:a14="http://schemas.microsoft.com/office/drawing/2010/main">
-                <a:solidFill>
-                  <a:srgbClr val="FFFFFF"/>
-                </a:solidFill>
-              </a14:hiddenFill>
-            </a:ext>
-            <a:ext uri="{91240B29-F687-4F45-9708-019B960494DF}">
-              <a14:hiddenLine xmlns:a14="http://schemas.microsoft.com/office/drawing/2010/main" w="9525">
-                <a:solidFill>
-                  <a:srgbClr val="000000"/>
-                </a:solidFill>
-                <a:miter lim="800000"/>
-                <a:headEnd/>
-                <a:tailEnd/>
-              </a14:hiddenLine>
-            </a:ext>
-          </a:extLst>
-        </p:spPr>
-      </p:pic>
-      <p:sp>
-        <p:nvSpPr>
-          <p:cNvPr id="71" name="TextBox 11">
-            <a:extLst>
-              <a:ext uri="{FF2B5EF4-FFF2-40B4-BE49-F238E27FC236}">
-                <a16:creationId xmlns:a16="http://schemas.microsoft.com/office/drawing/2014/main" id="{961E1DE9-E2D2-6844-8BEE-C33EBA7F183F}"/>
-              </a:ext>
-            </a:extLst>
-          </p:cNvPr>
-          <p:cNvSpPr txBox="1">
-            <a:spLocks noChangeArrowheads="1"/>
-          </p:cNvSpPr>
-          <p:nvPr/>
-        </p:nvSpPr>
-        <p:spPr bwMode="auto">
-          <a:xfrm>
-            <a:off x="5232704" y="990078"/>
-            <a:ext cx="1778027" cy="400110"/>
-          </a:xfrm>
-          <a:prstGeom prst="rect">
-            <a:avLst/>
-          </a:prstGeom>
-          <a:noFill/>
-          <a:ln>
-            <a:noFill/>
-          </a:ln>
-          <a:extLst>
-            <a:ext uri="{909E8E84-426E-40DD-AFC4-6F175D3DCCD1}">
-              <a14:hiddenFill xmlns:a14="http://schemas.microsoft.com/office/drawing/2010/main">
-                <a:solidFill>
-                  <a:srgbClr val="FFFFFF"/>
-                </a:solidFill>
-              </a14:hiddenFill>
-            </a:ext>
-            <a:ext uri="{91240B29-F687-4F45-9708-019B960494DF}">
-              <a14:hiddenLine xmlns:a14="http://schemas.microsoft.com/office/drawing/2010/main" w="9525">
-                <a:solidFill>
-                  <a:srgbClr val="000000"/>
-                </a:solidFill>
-                <a:miter lim="800000"/>
-                <a:headEnd/>
-                <a:tailEnd/>
-              </a14:hiddenLine>
-            </a:ext>
-          </a:extLst>
-        </p:spPr>
-        <p:txBody>
-          <a:bodyPr wrap="square">
-            <a:spAutoFit/>
-          </a:bodyPr>
-          <a:lstStyle>
-            <a:lvl1pPr>
-              <a:defRPr>
-                <a:solidFill>
-                  <a:schemeClr val="tx1"/>
-                </a:solidFill>
-                <a:latin typeface="Calibri" panose="020F0502020204030204" pitchFamily="34" charset="0"/>
-              </a:defRPr>
-            </a:lvl1pPr>
-            <a:lvl2pPr marL="742950" indent="-285750">
-              <a:defRPr>
-                <a:solidFill>
-                  <a:schemeClr val="tx1"/>
-                </a:solidFill>
-                <a:latin typeface="Calibri" panose="020F0502020204030204" pitchFamily="34" charset="0"/>
-              </a:defRPr>
-            </a:lvl2pPr>
-            <a:lvl3pPr marL="1143000" indent="-228600">
-              <a:defRPr>
-                <a:solidFill>
-                  <a:schemeClr val="tx1"/>
-                </a:solidFill>
-                <a:latin typeface="Calibri" panose="020F0502020204030204" pitchFamily="34" charset="0"/>
-              </a:defRPr>
-            </a:lvl3pPr>
-            <a:lvl4pPr marL="1600200" indent="-228600">
-              <a:defRPr>
-                <a:solidFill>
-                  <a:schemeClr val="tx1"/>
-                </a:solidFill>
-                <a:latin typeface="Calibri" panose="020F0502020204030204" pitchFamily="34" charset="0"/>
-              </a:defRPr>
-            </a:lvl4pPr>
-            <a:lvl5pPr marL="2057400" indent="-228600">
-              <a:defRPr>
-                <a:solidFill>
-                  <a:schemeClr val="tx1"/>
-                </a:solidFill>
-                <a:latin typeface="Calibri" panose="020F0502020204030204" pitchFamily="34" charset="0"/>
-              </a:defRPr>
-            </a:lvl5pPr>
-            <a:lvl6pPr marL="2514600" indent="-228600" eaLnBrk="0" fontAlgn="base" hangingPunct="0">
-              <a:spcBef>
-                <a:spcPct val="0"/>
-              </a:spcBef>
-              <a:spcAft>
-                <a:spcPct val="0"/>
-              </a:spcAft>
-              <a:defRPr>
-                <a:solidFill>
-                  <a:schemeClr val="tx1"/>
-                </a:solidFill>
-                <a:latin typeface="Calibri" panose="020F0502020204030204" pitchFamily="34" charset="0"/>
-              </a:defRPr>
-            </a:lvl6pPr>
-            <a:lvl7pPr marL="2971800" indent="-228600" eaLnBrk="0" fontAlgn="base" hangingPunct="0">
-              <a:spcBef>
-                <a:spcPct val="0"/>
-              </a:spcBef>
-              <a:spcAft>
-                <a:spcPct val="0"/>
-              </a:spcAft>
-              <a:defRPr>
-                <a:solidFill>
-                  <a:schemeClr val="tx1"/>
-                </a:solidFill>
-                <a:latin typeface="Calibri" panose="020F0502020204030204" pitchFamily="34" charset="0"/>
-              </a:defRPr>
-            </a:lvl7pPr>
-            <a:lvl8pPr marL="3429000" indent="-228600" eaLnBrk="0" fontAlgn="base" hangingPunct="0">
-              <a:spcBef>
-                <a:spcPct val="0"/>
-              </a:spcBef>
-              <a:spcAft>
-                <a:spcPct val="0"/>
-              </a:spcAft>
-              <a:defRPr>
-                <a:solidFill>
-                  <a:schemeClr val="tx1"/>
-                </a:solidFill>
-                <a:latin typeface="Calibri" panose="020F0502020204030204" pitchFamily="34" charset="0"/>
-              </a:defRPr>
-            </a:lvl8pPr>
-            <a:lvl9pPr marL="3886200" indent="-228600" eaLnBrk="0" fontAlgn="base" hangingPunct="0">
-              <a:spcBef>
-                <a:spcPct val="0"/>
-              </a:spcBef>
-              <a:spcAft>
-                <a:spcPct val="0"/>
-              </a:spcAft>
-              <a:defRPr>
-                <a:solidFill>
-                  <a:schemeClr val="tx1"/>
-                </a:solidFill>
-                <a:latin typeface="Calibri" panose="020F0502020204030204" pitchFamily="34" charset="0"/>
-              </a:defRPr>
-            </a:lvl9pPr>
-          </a:lstStyle>
-          <a:p>
-            <a:pPr algn="ctr" eaLnBrk="1" hangingPunct="1"/>
-            <a:r>
-              <a:rPr lang="en-US" altLang="en-US" sz="1000" dirty="0">
-                <a:latin typeface="Arial" panose="020B0604020202020204" pitchFamily="34" charset="0"/>
-                <a:ea typeface="Amazon Ember" panose="020B0603020204020204" pitchFamily="34" charset="0"/>
-                <a:cs typeface="Arial" panose="020B0604020202020204" pitchFamily="34" charset="0"/>
-              </a:rPr>
-              <a:t>AWS Systems </a:t>
-            </a:r>
-          </a:p>
-          <a:p>
-            <a:pPr algn="ctr" eaLnBrk="1" hangingPunct="1"/>
-            <a:r>
-              <a:rPr lang="en-US" altLang="en-US" sz="1000" dirty="0">
-                <a:latin typeface="Arial" panose="020B0604020202020204" pitchFamily="34" charset="0"/>
-                <a:ea typeface="Amazon Ember" panose="020B0603020204020204" pitchFamily="34" charset="0"/>
-                <a:cs typeface="Arial" panose="020B0604020202020204" pitchFamily="34" charset="0"/>
-              </a:rPr>
-              <a:t>Manager</a:t>
-            </a:r>
-          </a:p>
-        </p:txBody>
-      </p:sp>
-      <p:pic>
-        <p:nvPicPr>
-          <p:cNvPr id="74" name="Graphic 21">
-            <a:extLst>
-              <a:ext uri="{FF2B5EF4-FFF2-40B4-BE49-F238E27FC236}">
-                <a16:creationId xmlns:a16="http://schemas.microsoft.com/office/drawing/2014/main" id="{D1EC144A-6827-1841-9B41-65E7AD840BAC}"/>
-              </a:ext>
-            </a:extLst>
-          </p:cNvPr>
-          <p:cNvPicPr>
-            <a:picLocks noChangeAspect="1" noChangeArrowheads="1"/>
-          </p:cNvPicPr>
-          <p:nvPr/>
-        </p:nvPicPr>
-        <p:blipFill>
-          <a:blip r:embed="rId26">
-            <a:extLst>
-              <a:ext uri="{28A0092B-C50C-407E-A947-70E740481C1C}">
-                <a14:useLocalDpi xmlns:a14="http://schemas.microsoft.com/office/drawing/2010/main" val="0"/>
-              </a:ext>
-            </a:extLst>
-          </a:blip>
-          <a:srcRect/>
-          <a:stretch>
-            <a:fillRect/>
-          </a:stretch>
-        </p:blipFill>
-        <p:spPr bwMode="auto">
-          <a:xfrm>
-            <a:off x="5892254" y="2669819"/>
-            <a:ext cx="594360" cy="594360"/>
-          </a:xfrm>
-          <a:prstGeom prst="rect">
-            <a:avLst/>
-          </a:prstGeom>
-          <a:noFill/>
-          <a:ln>
-            <a:noFill/>
-          </a:ln>
-          <a:extLst>
-            <a:ext uri="{909E8E84-426E-40DD-AFC4-6F175D3DCCD1}">
-              <a14:hiddenFill xmlns:a14="http://schemas.microsoft.com/office/drawing/2010/main">
-                <a:solidFill>
-                  <a:srgbClr val="FFFFFF"/>
-                </a:solidFill>
-              </a14:hiddenFill>
-            </a:ext>
-            <a:ext uri="{91240B29-F687-4F45-9708-019B960494DF}">
-              <a14:hiddenLine xmlns:a14="http://schemas.microsoft.com/office/drawing/2010/main" w="9525">
-                <a:solidFill>
-                  <a:srgbClr val="000000"/>
-                </a:solidFill>
-                <a:miter lim="800000"/>
-                <a:headEnd/>
-                <a:tailEnd/>
-              </a14:hiddenLine>
-            </a:ext>
-          </a:extLst>
-        </p:spPr>
-      </p:pic>
-      <p:pic>
-        <p:nvPicPr>
-          <p:cNvPr id="75" name="Graphic 24">
-            <a:extLst>
-              <a:ext uri="{FF2B5EF4-FFF2-40B4-BE49-F238E27FC236}">
-                <a16:creationId xmlns:a16="http://schemas.microsoft.com/office/drawing/2014/main" id="{5D5161E4-FC4F-544A-B592-99AE2D2256FD}"/>
-              </a:ext>
-            </a:extLst>
-          </p:cNvPr>
-          <p:cNvPicPr>
-            <a:picLocks noChangeAspect="1" noChangeArrowheads="1"/>
-          </p:cNvPicPr>
-          <p:nvPr/>
-        </p:nvPicPr>
-        <p:blipFill>
-          <a:blip r:embed="rId27">
-            <a:extLst>
-              <a:ext uri="{28A0092B-C50C-407E-A947-70E740481C1C}">
-                <a14:useLocalDpi xmlns:a14="http://schemas.microsoft.com/office/drawing/2010/main" val="0"/>
-              </a:ext>
-            </a:extLst>
-          </a:blip>
-          <a:srcRect/>
-          <a:stretch>
-            <a:fillRect/>
-          </a:stretch>
-        </p:blipFill>
-        <p:spPr bwMode="auto">
-          <a:xfrm>
-            <a:off x="3539297" y="3333413"/>
-            <a:ext cx="457200" cy="457200"/>
-          </a:xfrm>
-          <a:prstGeom prst="rect">
-            <a:avLst/>
-          </a:prstGeom>
-          <a:noFill/>
-          <a:ln>
-            <a:noFill/>
-          </a:ln>
-          <a:extLst>
-            <a:ext uri="{909E8E84-426E-40DD-AFC4-6F175D3DCCD1}">
-              <a14:hiddenFill xmlns:a14="http://schemas.microsoft.com/office/drawing/2010/main">
-                <a:solidFill>
-                  <a:srgbClr val="FFFFFF"/>
-                </a:solidFill>
-              </a14:hiddenFill>
-            </a:ext>
-            <a:ext uri="{91240B29-F687-4F45-9708-019B960494DF}">
-              <a14:hiddenLine xmlns:a14="http://schemas.microsoft.com/office/drawing/2010/main" w="9525">
-                <a:solidFill>
-                  <a:srgbClr val="000000"/>
-                </a:solidFill>
-                <a:miter lim="800000"/>
-                <a:headEnd/>
-                <a:tailEnd/>
-              </a14:hiddenLine>
-            </a:ext>
-          </a:extLst>
-        </p:spPr>
-      </p:pic>
-      <p:sp>
-        <p:nvSpPr>
-          <p:cNvPr id="76" name="TextBox 22">
-            <a:extLst>
-              <a:ext uri="{FF2B5EF4-FFF2-40B4-BE49-F238E27FC236}">
-                <a16:creationId xmlns:a16="http://schemas.microsoft.com/office/drawing/2014/main" id="{F05CA681-D745-ED40-A2F0-F68C61F65903}"/>
-              </a:ext>
-            </a:extLst>
-          </p:cNvPr>
-          <p:cNvSpPr txBox="1">
-            <a:spLocks noChangeArrowheads="1"/>
-          </p:cNvSpPr>
-          <p:nvPr/>
-        </p:nvSpPr>
-        <p:spPr bwMode="auto">
-          <a:xfrm>
-            <a:off x="3085041" y="3737165"/>
-            <a:ext cx="1339850" cy="246221"/>
-          </a:xfrm>
-          <a:prstGeom prst="rect">
-            <a:avLst/>
-          </a:prstGeom>
-          <a:noFill/>
-          <a:ln>
-            <a:noFill/>
-          </a:ln>
-          <a:extLst>
-            <a:ext uri="{909E8E84-426E-40DD-AFC4-6F175D3DCCD1}">
-              <a14:hiddenFill xmlns:a14="http://schemas.microsoft.com/office/drawing/2010/main">
-                <a:solidFill>
-                  <a:srgbClr val="FFFFFF"/>
-                </a:solidFill>
-              </a14:hiddenFill>
-            </a:ext>
-            <a:ext uri="{91240B29-F687-4F45-9708-019B960494DF}">
-              <a14:hiddenLine xmlns:a14="http://schemas.microsoft.com/office/drawing/2010/main" w="9525">
-                <a:solidFill>
-                  <a:srgbClr val="000000"/>
-                </a:solidFill>
-                <a:miter lim="800000"/>
-                <a:headEnd/>
-                <a:tailEnd/>
-              </a14:hiddenLine>
-            </a:ext>
-          </a:extLst>
-        </p:spPr>
-        <p:style>
-          <a:lnRef idx="0">
-            <a:scrgbClr r="0" g="0" b="0"/>
-          </a:lnRef>
-          <a:fillRef idx="0">
-            <a:scrgbClr r="0" g="0" b="0"/>
-          </a:fillRef>
-          <a:effectRef idx="0">
-            <a:scrgbClr r="0" g="0" b="0"/>
-          </a:effectRef>
-          <a:fontRef idx="major"/>
-        </p:style>
-        <p:txBody>
-          <a:bodyPr wrap="square">
-            <a:spAutoFit/>
-          </a:bodyPr>
-          <a:lstStyle>
-            <a:lvl1pPr>
-              <a:defRPr>
-                <a:latin typeface="+mj-lt"/>
-                <a:ea typeface="+mj-ea"/>
-                <a:cs typeface="+mj-cs"/>
-              </a:defRPr>
-            </a:lvl1pPr>
-            <a:lvl2pPr>
-              <a:defRPr>
-                <a:latin typeface="+mj-lt"/>
-                <a:ea typeface="+mj-ea"/>
-                <a:cs typeface="+mj-cs"/>
-              </a:defRPr>
-            </a:lvl2pPr>
-            <a:lvl3pPr>
-              <a:defRPr>
-                <a:latin typeface="+mj-lt"/>
-                <a:ea typeface="+mj-ea"/>
-                <a:cs typeface="+mj-cs"/>
-              </a:defRPr>
-            </a:lvl3pPr>
-            <a:lvl4pPr>
-              <a:defRPr>
-                <a:latin typeface="+mj-lt"/>
-                <a:ea typeface="+mj-ea"/>
-                <a:cs typeface="+mj-cs"/>
-              </a:defRPr>
-            </a:lvl4pPr>
-            <a:lvl5pPr>
-              <a:defRPr>
-                <a:latin typeface="+mj-lt"/>
-                <a:ea typeface="+mj-ea"/>
-                <a:cs typeface="+mj-cs"/>
-              </a:defRPr>
-            </a:lvl5pPr>
-            <a:lvl6pPr>
-              <a:defRPr>
-                <a:latin typeface="+mj-lt"/>
-                <a:ea typeface="+mj-ea"/>
-                <a:cs typeface="+mj-cs"/>
-              </a:defRPr>
-            </a:lvl6pPr>
-            <a:lvl7pPr>
-              <a:defRPr>
-                <a:latin typeface="+mj-lt"/>
-                <a:ea typeface="+mj-ea"/>
-                <a:cs typeface="+mj-cs"/>
-              </a:defRPr>
-            </a:lvl7pPr>
-            <a:lvl8pPr>
-              <a:defRPr>
-                <a:latin typeface="+mj-lt"/>
-                <a:ea typeface="+mj-ea"/>
-                <a:cs typeface="+mj-cs"/>
-              </a:defRPr>
-            </a:lvl8pPr>
-            <a:lvl9pPr>
-              <a:defRPr>
-                <a:latin typeface="+mj-lt"/>
-                <a:ea typeface="+mj-ea"/>
-                <a:cs typeface="+mj-cs"/>
-              </a:defRPr>
-            </a:lvl9pPr>
-          </a:lstStyle>
-          <a:p>
-            <a:pPr algn="ctr" eaLnBrk="1" hangingPunct="1"/>
-            <a:r>
-              <a:rPr lang="en-US" altLang="en-US" sz="1000" dirty="0">
-                <a:latin typeface="Arial" panose="020B0604020202020204" pitchFamily="34" charset="0"/>
-                <a:ea typeface="Amazon Ember" panose="020B0603020204020204" pitchFamily="34" charset="0"/>
-                <a:cs typeface="Arial" panose="020B0604020202020204" pitchFamily="34" charset="0"/>
-              </a:rPr>
-              <a:t>Optional: NLB</a:t>
-            </a:r>
-          </a:p>
-        </p:txBody>
-      </p:sp>
-      <p:pic>
-        <p:nvPicPr>
-          <p:cNvPr id="77" name="Graphic 19">
-            <a:extLst>
-              <a:ext uri="{FF2B5EF4-FFF2-40B4-BE49-F238E27FC236}">
-                <a16:creationId xmlns:a16="http://schemas.microsoft.com/office/drawing/2014/main" id="{A9F82018-528E-5A45-AB4A-6EE4E6014E71}"/>
-              </a:ext>
-            </a:extLst>
-          </p:cNvPr>
-          <p:cNvPicPr>
-            <a:picLocks noChangeAspect="1" noChangeArrowheads="1"/>
-          </p:cNvPicPr>
-          <p:nvPr/>
-        </p:nvPicPr>
-        <p:blipFill>
-          <a:blip r:embed="rId28">
-            <a:extLst>
-              <a:ext uri="{28A0092B-C50C-407E-A947-70E740481C1C}">
-                <a14:useLocalDpi xmlns:a14="http://schemas.microsoft.com/office/drawing/2010/main" val="0"/>
-              </a:ext>
-            </a:extLst>
-          </a:blip>
-          <a:srcRect/>
-          <a:stretch>
-            <a:fillRect/>
-          </a:stretch>
-        </p:blipFill>
-        <p:spPr bwMode="auto">
-          <a:xfrm>
-            <a:off x="4975740" y="416123"/>
-            <a:ext cx="595978" cy="595978"/>
-          </a:xfrm>
-          <a:prstGeom prst="rect">
-            <a:avLst/>
-          </a:prstGeom>
-          <a:noFill/>
-          <a:ln>
-            <a:noFill/>
-          </a:ln>
-          <a:extLst>
-            <a:ext uri="{909E8E84-426E-40DD-AFC4-6F175D3DCCD1}">
-              <a14:hiddenFill xmlns:a14="http://schemas.microsoft.com/office/drawing/2010/main">
-                <a:solidFill>
-                  <a:srgbClr val="FFFFFF"/>
-                </a:solidFill>
-              </a14:hiddenFill>
-            </a:ext>
-            <a:ext uri="{91240B29-F687-4F45-9708-019B960494DF}">
-              <a14:hiddenLine xmlns:a14="http://schemas.microsoft.com/office/drawing/2010/main" w="9525">
-                <a:solidFill>
-                  <a:srgbClr val="000000"/>
-                </a:solidFill>
-                <a:miter lim="800000"/>
-                <a:headEnd/>
-                <a:tailEnd/>
-              </a14:hiddenLine>
-            </a:ext>
-          </a:extLst>
-        </p:spPr>
-      </p:pic>
-      <p:sp>
-        <p:nvSpPr>
-          <p:cNvPr id="78" name="TextBox 12">
-            <a:extLst>
-              <a:ext uri="{FF2B5EF4-FFF2-40B4-BE49-F238E27FC236}">
-                <a16:creationId xmlns:a16="http://schemas.microsoft.com/office/drawing/2014/main" id="{FA984FBF-FB60-8940-AF5F-CED24877132E}"/>
-              </a:ext>
-            </a:extLst>
-          </p:cNvPr>
-          <p:cNvSpPr txBox="1">
-            <a:spLocks noChangeArrowheads="1"/>
-          </p:cNvSpPr>
-          <p:nvPr/>
-        </p:nvSpPr>
-        <p:spPr bwMode="auto">
-          <a:xfrm>
-            <a:off x="4760741" y="1015257"/>
-            <a:ext cx="1035068" cy="246221"/>
-          </a:xfrm>
-          <a:prstGeom prst="rect">
-            <a:avLst/>
-          </a:prstGeom>
-          <a:noFill/>
-          <a:ln>
-            <a:noFill/>
-          </a:ln>
-          <a:extLst>
-            <a:ext uri="{909E8E84-426E-40DD-AFC4-6F175D3DCCD1}">
-              <a14:hiddenFill xmlns:a14="http://schemas.microsoft.com/office/drawing/2010/main">
-                <a:solidFill>
-                  <a:srgbClr val="FFFFFF"/>
-                </a:solidFill>
-              </a14:hiddenFill>
-            </a:ext>
-            <a:ext uri="{91240B29-F687-4F45-9708-019B960494DF}">
-              <a14:hiddenLine xmlns:a14="http://schemas.microsoft.com/office/drawing/2010/main" w="9525">
-                <a:solidFill>
-                  <a:srgbClr val="000000"/>
-                </a:solidFill>
-                <a:miter lim="800000"/>
-                <a:headEnd/>
-                <a:tailEnd/>
-              </a14:hiddenLine>
-            </a:ext>
-          </a:extLst>
-        </p:spPr>
-        <p:txBody>
-          <a:bodyPr wrap="square">
-            <a:spAutoFit/>
-          </a:bodyPr>
-          <a:lstStyle>
-            <a:lvl1pPr>
-              <a:defRPr>
-                <a:solidFill>
-                  <a:schemeClr val="tx1"/>
-                </a:solidFill>
-                <a:latin typeface="Calibri" panose="020F0502020204030204" pitchFamily="34" charset="0"/>
-              </a:defRPr>
-            </a:lvl1pPr>
-            <a:lvl2pPr marL="742950" indent="-285750">
-              <a:defRPr>
-                <a:solidFill>
-                  <a:schemeClr val="tx1"/>
-                </a:solidFill>
-                <a:latin typeface="Calibri" panose="020F0502020204030204" pitchFamily="34" charset="0"/>
-              </a:defRPr>
-            </a:lvl2pPr>
-            <a:lvl3pPr marL="1143000" indent="-228600">
-              <a:defRPr>
-                <a:solidFill>
-                  <a:schemeClr val="tx1"/>
-                </a:solidFill>
-                <a:latin typeface="Calibri" panose="020F0502020204030204" pitchFamily="34" charset="0"/>
-              </a:defRPr>
-            </a:lvl3pPr>
-            <a:lvl4pPr marL="1600200" indent="-228600">
-              <a:defRPr>
-                <a:solidFill>
-                  <a:schemeClr val="tx1"/>
-                </a:solidFill>
-                <a:latin typeface="Calibri" panose="020F0502020204030204" pitchFamily="34" charset="0"/>
-              </a:defRPr>
-            </a:lvl4pPr>
-            <a:lvl5pPr marL="2057400" indent="-228600">
-              <a:defRPr>
-                <a:solidFill>
-                  <a:schemeClr val="tx1"/>
-                </a:solidFill>
-                <a:latin typeface="Calibri" panose="020F0502020204030204" pitchFamily="34" charset="0"/>
-              </a:defRPr>
-            </a:lvl5pPr>
-            <a:lvl6pPr marL="2514600" indent="-228600" eaLnBrk="0" fontAlgn="base" hangingPunct="0">
-              <a:spcBef>
-                <a:spcPct val="0"/>
-              </a:spcBef>
-              <a:spcAft>
-                <a:spcPct val="0"/>
-              </a:spcAft>
-              <a:defRPr>
-                <a:solidFill>
-                  <a:schemeClr val="tx1"/>
-                </a:solidFill>
-                <a:latin typeface="Calibri" panose="020F0502020204030204" pitchFamily="34" charset="0"/>
-              </a:defRPr>
-            </a:lvl6pPr>
-            <a:lvl7pPr marL="2971800" indent="-228600" eaLnBrk="0" fontAlgn="base" hangingPunct="0">
-              <a:spcBef>
-                <a:spcPct val="0"/>
-              </a:spcBef>
-              <a:spcAft>
-                <a:spcPct val="0"/>
-              </a:spcAft>
-              <a:defRPr>
-                <a:solidFill>
-                  <a:schemeClr val="tx1"/>
-                </a:solidFill>
-                <a:latin typeface="Calibri" panose="020F0502020204030204" pitchFamily="34" charset="0"/>
-              </a:defRPr>
-            </a:lvl7pPr>
-            <a:lvl8pPr marL="3429000" indent="-228600" eaLnBrk="0" fontAlgn="base" hangingPunct="0">
-              <a:spcBef>
-                <a:spcPct val="0"/>
-              </a:spcBef>
-              <a:spcAft>
-                <a:spcPct val="0"/>
-              </a:spcAft>
-              <a:defRPr>
-                <a:solidFill>
-                  <a:schemeClr val="tx1"/>
-                </a:solidFill>
-                <a:latin typeface="Calibri" panose="020F0502020204030204" pitchFamily="34" charset="0"/>
-              </a:defRPr>
-            </a:lvl8pPr>
-            <a:lvl9pPr marL="3886200" indent="-228600" eaLnBrk="0" fontAlgn="base" hangingPunct="0">
-              <a:spcBef>
-                <a:spcPct val="0"/>
-              </a:spcBef>
-              <a:spcAft>
-                <a:spcPct val="0"/>
-              </a:spcAft>
-              <a:defRPr>
-                <a:solidFill>
-                  <a:schemeClr val="tx1"/>
-                </a:solidFill>
-                <a:latin typeface="Calibri" panose="020F0502020204030204" pitchFamily="34" charset="0"/>
-              </a:defRPr>
-            </a:lvl9pPr>
-          </a:lstStyle>
-          <a:p>
-            <a:pPr algn="ctr" eaLnBrk="1" hangingPunct="1"/>
-            <a:r>
-              <a:rPr lang="en-US" altLang="en-US" sz="1000" dirty="0">
-                <a:latin typeface="Arial" panose="020B0604020202020204" pitchFamily="34" charset="0"/>
-                <a:ea typeface="Amazon Ember" panose="020B0603020204020204" pitchFamily="34" charset="0"/>
-                <a:cs typeface="Arial" panose="020B0604020202020204" pitchFamily="34" charset="0"/>
-              </a:rPr>
-              <a:t>AWS IAM</a:t>
-            </a:r>
-          </a:p>
-        </p:txBody>
-      </p:sp>
-      <p:pic>
-        <p:nvPicPr>
-          <p:cNvPr id="80" name="Graphic 17">
-            <a:extLst>
-              <a:ext uri="{FF2B5EF4-FFF2-40B4-BE49-F238E27FC236}">
-                <a16:creationId xmlns:a16="http://schemas.microsoft.com/office/drawing/2014/main" id="{C9A65B73-C953-4C43-92E0-70465C118649}"/>
-              </a:ext>
-            </a:extLst>
-          </p:cNvPr>
-          <p:cNvPicPr>
-            <a:picLocks noChangeAspect="1" noChangeArrowheads="1"/>
-          </p:cNvPicPr>
-          <p:nvPr/>
-        </p:nvPicPr>
-        <p:blipFill>
-          <a:blip r:embed="rId29">
-            <a:extLst>
-              <a:ext uri="{28A0092B-C50C-407E-A947-70E740481C1C}">
-                <a14:useLocalDpi xmlns:a14="http://schemas.microsoft.com/office/drawing/2010/main" val="0"/>
-              </a:ext>
-            </a:extLst>
-          </a:blip>
-          <a:srcRect/>
-          <a:stretch>
-            <a:fillRect/>
-          </a:stretch>
-        </p:blipFill>
-        <p:spPr bwMode="auto">
-          <a:xfrm>
-            <a:off x="4128449" y="414396"/>
-            <a:ext cx="595315" cy="595315"/>
-          </a:xfrm>
-          <a:prstGeom prst="rect">
-            <a:avLst/>
-          </a:prstGeom>
-          <a:noFill/>
-          <a:ln>
-            <a:noFill/>
-          </a:ln>
-          <a:extLst>
-            <a:ext uri="{909E8E84-426E-40DD-AFC4-6F175D3DCCD1}">
-              <a14:hiddenFill xmlns:a14="http://schemas.microsoft.com/office/drawing/2010/main">
-                <a:solidFill>
-                  <a:srgbClr val="FFFFFF"/>
-                </a:solidFill>
-              </a14:hiddenFill>
-            </a:ext>
-            <a:ext uri="{91240B29-F687-4F45-9708-019B960494DF}">
-              <a14:hiddenLine xmlns:a14="http://schemas.microsoft.com/office/drawing/2010/main" w="9525">
-                <a:solidFill>
-                  <a:srgbClr val="000000"/>
-                </a:solidFill>
-                <a:miter lim="800000"/>
-                <a:headEnd/>
-                <a:tailEnd/>
-              </a14:hiddenLine>
-            </a:ext>
-          </a:extLst>
-        </p:spPr>
-      </p:pic>
-      <p:sp>
-        <p:nvSpPr>
-          <p:cNvPr id="81" name="TextBox 11">
-            <a:extLst>
-              <a:ext uri="{FF2B5EF4-FFF2-40B4-BE49-F238E27FC236}">
-                <a16:creationId xmlns:a16="http://schemas.microsoft.com/office/drawing/2014/main" id="{BDD7DE52-905B-6D48-BDFD-4664381AD57E}"/>
-              </a:ext>
-            </a:extLst>
-          </p:cNvPr>
-          <p:cNvSpPr txBox="1">
-            <a:spLocks noChangeArrowheads="1"/>
-          </p:cNvSpPr>
-          <p:nvPr/>
-        </p:nvSpPr>
-        <p:spPr bwMode="auto">
-          <a:xfrm>
-            <a:off x="3752395" y="1016594"/>
-            <a:ext cx="1339444" cy="400110"/>
-          </a:xfrm>
-          <a:prstGeom prst="rect">
-            <a:avLst/>
-          </a:prstGeom>
-          <a:noFill/>
-          <a:ln>
-            <a:noFill/>
-          </a:ln>
-          <a:extLst>
-            <a:ext uri="{909E8E84-426E-40DD-AFC4-6F175D3DCCD1}">
-              <a14:hiddenFill xmlns:a14="http://schemas.microsoft.com/office/drawing/2010/main">
-                <a:solidFill>
-                  <a:srgbClr val="FFFFFF"/>
-                </a:solidFill>
-              </a14:hiddenFill>
-            </a:ext>
-            <a:ext uri="{91240B29-F687-4F45-9708-019B960494DF}">
-              <a14:hiddenLine xmlns:a14="http://schemas.microsoft.com/office/drawing/2010/main" w="9525">
-                <a:solidFill>
-                  <a:srgbClr val="000000"/>
-                </a:solidFill>
-                <a:miter lim="800000"/>
-                <a:headEnd/>
-                <a:tailEnd/>
-              </a14:hiddenLine>
-            </a:ext>
-          </a:extLst>
-        </p:spPr>
-        <p:txBody>
-          <a:bodyPr wrap="square">
-            <a:spAutoFit/>
-          </a:bodyPr>
-          <a:lstStyle>
-            <a:lvl1pPr>
-              <a:defRPr>
-                <a:solidFill>
-                  <a:schemeClr val="tx1"/>
-                </a:solidFill>
-                <a:latin typeface="Calibri" panose="020F0502020204030204" pitchFamily="34" charset="0"/>
-              </a:defRPr>
-            </a:lvl1pPr>
-            <a:lvl2pPr marL="742950" indent="-285750">
-              <a:defRPr>
-                <a:solidFill>
-                  <a:schemeClr val="tx1"/>
-                </a:solidFill>
-                <a:latin typeface="Calibri" panose="020F0502020204030204" pitchFamily="34" charset="0"/>
-              </a:defRPr>
-            </a:lvl2pPr>
-            <a:lvl3pPr marL="1143000" indent="-228600">
-              <a:defRPr>
-                <a:solidFill>
-                  <a:schemeClr val="tx1"/>
-                </a:solidFill>
-                <a:latin typeface="Calibri" panose="020F0502020204030204" pitchFamily="34" charset="0"/>
-              </a:defRPr>
-            </a:lvl3pPr>
-            <a:lvl4pPr marL="1600200" indent="-228600">
-              <a:defRPr>
-                <a:solidFill>
-                  <a:schemeClr val="tx1"/>
-                </a:solidFill>
-                <a:latin typeface="Calibri" panose="020F0502020204030204" pitchFamily="34" charset="0"/>
-              </a:defRPr>
-            </a:lvl4pPr>
-            <a:lvl5pPr marL="2057400" indent="-228600">
-              <a:defRPr>
-                <a:solidFill>
-                  <a:schemeClr val="tx1"/>
-                </a:solidFill>
-                <a:latin typeface="Calibri" panose="020F0502020204030204" pitchFamily="34" charset="0"/>
-              </a:defRPr>
-            </a:lvl5pPr>
-            <a:lvl6pPr marL="2514600" indent="-228600" eaLnBrk="0" fontAlgn="base" hangingPunct="0">
-              <a:spcBef>
-                <a:spcPct val="0"/>
-              </a:spcBef>
-              <a:spcAft>
-                <a:spcPct val="0"/>
-              </a:spcAft>
-              <a:defRPr>
-                <a:solidFill>
-                  <a:schemeClr val="tx1"/>
-                </a:solidFill>
-                <a:latin typeface="Calibri" panose="020F0502020204030204" pitchFamily="34" charset="0"/>
-              </a:defRPr>
-            </a:lvl6pPr>
-            <a:lvl7pPr marL="2971800" indent="-228600" eaLnBrk="0" fontAlgn="base" hangingPunct="0">
-              <a:spcBef>
-                <a:spcPct val="0"/>
-              </a:spcBef>
-              <a:spcAft>
-                <a:spcPct val="0"/>
-              </a:spcAft>
-              <a:defRPr>
-                <a:solidFill>
-                  <a:schemeClr val="tx1"/>
-                </a:solidFill>
-                <a:latin typeface="Calibri" panose="020F0502020204030204" pitchFamily="34" charset="0"/>
-              </a:defRPr>
-            </a:lvl7pPr>
-            <a:lvl8pPr marL="3429000" indent="-228600" eaLnBrk="0" fontAlgn="base" hangingPunct="0">
-              <a:spcBef>
-                <a:spcPct val="0"/>
-              </a:spcBef>
-              <a:spcAft>
-                <a:spcPct val="0"/>
-              </a:spcAft>
-              <a:defRPr>
-                <a:solidFill>
-                  <a:schemeClr val="tx1"/>
-                </a:solidFill>
-                <a:latin typeface="Calibri" panose="020F0502020204030204" pitchFamily="34" charset="0"/>
-              </a:defRPr>
-            </a:lvl8pPr>
-            <a:lvl9pPr marL="3886200" indent="-228600" eaLnBrk="0" fontAlgn="base" hangingPunct="0">
-              <a:spcBef>
-                <a:spcPct val="0"/>
-              </a:spcBef>
-              <a:spcAft>
-                <a:spcPct val="0"/>
-              </a:spcAft>
-              <a:defRPr>
-                <a:solidFill>
-                  <a:schemeClr val="tx1"/>
-                </a:solidFill>
-                <a:latin typeface="Calibri" panose="020F0502020204030204" pitchFamily="34" charset="0"/>
-              </a:defRPr>
-            </a:lvl9pPr>
-          </a:lstStyle>
-          <a:p>
-            <a:pPr algn="ctr" eaLnBrk="1" hangingPunct="1"/>
-            <a:r>
-              <a:rPr lang="en-US" altLang="en-US" sz="1000" dirty="0">
-                <a:latin typeface="Arial" panose="020B0604020202020204" pitchFamily="34" charset="0"/>
-                <a:ea typeface="Amazon Ember" panose="020B0603020204020204" pitchFamily="34" charset="0"/>
-                <a:cs typeface="Arial" panose="020B0604020202020204" pitchFamily="34" charset="0"/>
-              </a:rPr>
-              <a:t>AWS Secrets</a:t>
-            </a:r>
-          </a:p>
-          <a:p>
-            <a:pPr algn="ctr" eaLnBrk="1" hangingPunct="1"/>
-            <a:r>
-              <a:rPr lang="en-US" altLang="en-US" sz="1000" dirty="0">
-                <a:latin typeface="Arial" panose="020B0604020202020204" pitchFamily="34" charset="0"/>
-                <a:ea typeface="Amazon Ember" panose="020B0603020204020204" pitchFamily="34" charset="0"/>
-                <a:cs typeface="Arial" panose="020B0604020202020204" pitchFamily="34" charset="0"/>
-              </a:rPr>
-              <a:t> Manager</a:t>
-            </a:r>
-          </a:p>
-        </p:txBody>
-      </p:sp>
-      <p:pic>
-        <p:nvPicPr>
-          <p:cNvPr id="82" name="Graphic 7">
-            <a:extLst>
-              <a:ext uri="{FF2B5EF4-FFF2-40B4-BE49-F238E27FC236}">
-                <a16:creationId xmlns:a16="http://schemas.microsoft.com/office/drawing/2014/main" id="{D8A4905B-A884-4F4C-A120-6DBB6A20202F}"/>
-              </a:ext>
-            </a:extLst>
-          </p:cNvPr>
-          <p:cNvPicPr>
-            <a:picLocks noChangeAspect="1" noChangeArrowheads="1"/>
-          </p:cNvPicPr>
-          <p:nvPr/>
-        </p:nvPicPr>
-        <p:blipFill>
-          <a:blip r:embed="rId30">
-            <a:extLst>
-              <a:ext uri="{28A0092B-C50C-407E-A947-70E740481C1C}">
-                <a14:useLocalDpi xmlns:a14="http://schemas.microsoft.com/office/drawing/2010/main" val="0"/>
-              </a:ext>
-            </a:extLst>
-          </a:blip>
-          <a:srcRect/>
-          <a:stretch>
-            <a:fillRect/>
-          </a:stretch>
-        </p:blipFill>
-        <p:spPr bwMode="auto">
-          <a:xfrm>
-            <a:off x="3303351" y="421989"/>
-            <a:ext cx="579144" cy="579144"/>
-          </a:xfrm>
-          <a:prstGeom prst="rect">
-            <a:avLst/>
-          </a:prstGeom>
-          <a:noFill/>
-          <a:ln>
-            <a:noFill/>
-          </a:ln>
-          <a:extLst>
-            <a:ext uri="{909E8E84-426E-40DD-AFC4-6F175D3DCCD1}">
-              <a14:hiddenFill xmlns:a14="http://schemas.microsoft.com/office/drawing/2010/main">
-                <a:solidFill>
-                  <a:srgbClr val="FFFFFF"/>
-                </a:solidFill>
-              </a14:hiddenFill>
-            </a:ext>
-            <a:ext uri="{91240B29-F687-4F45-9708-019B960494DF}">
-              <a14:hiddenLine xmlns:a14="http://schemas.microsoft.com/office/drawing/2010/main" w="9525">
-                <a:solidFill>
-                  <a:srgbClr val="000000"/>
-                </a:solidFill>
-                <a:miter lim="800000"/>
-                <a:headEnd/>
-                <a:tailEnd/>
-              </a14:hiddenLine>
-            </a:ext>
-          </a:extLst>
-        </p:spPr>
-      </p:pic>
-      <p:sp>
-        <p:nvSpPr>
-          <p:cNvPr id="83" name="TextBox 9">
-            <a:extLst>
-              <a:ext uri="{FF2B5EF4-FFF2-40B4-BE49-F238E27FC236}">
-                <a16:creationId xmlns:a16="http://schemas.microsoft.com/office/drawing/2014/main" id="{BB423690-BD4E-2E43-8E66-0120662E336A}"/>
-              </a:ext>
-            </a:extLst>
-          </p:cNvPr>
-          <p:cNvSpPr txBox="1">
-            <a:spLocks noChangeArrowheads="1"/>
-          </p:cNvSpPr>
-          <p:nvPr/>
-        </p:nvSpPr>
-        <p:spPr bwMode="auto">
-          <a:xfrm>
-            <a:off x="3047198" y="1010870"/>
-            <a:ext cx="1102903" cy="246221"/>
-          </a:xfrm>
-          <a:prstGeom prst="rect">
-            <a:avLst/>
-          </a:prstGeom>
-          <a:noFill/>
-          <a:ln>
-            <a:noFill/>
-          </a:ln>
-          <a:extLst>
-            <a:ext uri="{909E8E84-426E-40DD-AFC4-6F175D3DCCD1}">
-              <a14:hiddenFill xmlns:a14="http://schemas.microsoft.com/office/drawing/2010/main">
-                <a:solidFill>
-                  <a:srgbClr val="FFFFFF"/>
-                </a:solidFill>
-              </a14:hiddenFill>
-            </a:ext>
-            <a:ext uri="{91240B29-F687-4F45-9708-019B960494DF}">
-              <a14:hiddenLine xmlns:a14="http://schemas.microsoft.com/office/drawing/2010/main" w="9525">
-                <a:solidFill>
-                  <a:srgbClr val="000000"/>
-                </a:solidFill>
-                <a:miter lim="800000"/>
-                <a:headEnd/>
-                <a:tailEnd/>
-              </a14:hiddenLine>
-            </a:ext>
-          </a:extLst>
-        </p:spPr>
-        <p:txBody>
-          <a:bodyPr wrap="square">
-            <a:spAutoFit/>
-          </a:bodyPr>
-          <a:lstStyle>
-            <a:lvl1pPr>
-              <a:defRPr>
-                <a:solidFill>
-                  <a:schemeClr val="tx1"/>
-                </a:solidFill>
-                <a:latin typeface="Calibri" panose="020F0502020204030204" pitchFamily="34" charset="0"/>
-              </a:defRPr>
-            </a:lvl1pPr>
-            <a:lvl2pPr marL="742950" indent="-285750">
-              <a:defRPr>
-                <a:solidFill>
-                  <a:schemeClr val="tx1"/>
-                </a:solidFill>
-                <a:latin typeface="Calibri" panose="020F0502020204030204" pitchFamily="34" charset="0"/>
-              </a:defRPr>
-            </a:lvl2pPr>
-            <a:lvl3pPr marL="1143000" indent="-228600">
-              <a:defRPr>
-                <a:solidFill>
-                  <a:schemeClr val="tx1"/>
-                </a:solidFill>
-                <a:latin typeface="Calibri" panose="020F0502020204030204" pitchFamily="34" charset="0"/>
-              </a:defRPr>
-            </a:lvl3pPr>
-            <a:lvl4pPr marL="1600200" indent="-228600">
-              <a:defRPr>
-                <a:solidFill>
-                  <a:schemeClr val="tx1"/>
-                </a:solidFill>
-                <a:latin typeface="Calibri" panose="020F0502020204030204" pitchFamily="34" charset="0"/>
-              </a:defRPr>
-            </a:lvl4pPr>
-            <a:lvl5pPr marL="2057400" indent="-228600">
-              <a:defRPr>
-                <a:solidFill>
-                  <a:schemeClr val="tx1"/>
-                </a:solidFill>
-                <a:latin typeface="Calibri" panose="020F0502020204030204" pitchFamily="34" charset="0"/>
-              </a:defRPr>
-            </a:lvl5pPr>
-            <a:lvl6pPr marL="2514600" indent="-228600" eaLnBrk="0" fontAlgn="base" hangingPunct="0">
-              <a:spcBef>
-                <a:spcPct val="0"/>
-              </a:spcBef>
-              <a:spcAft>
-                <a:spcPct val="0"/>
-              </a:spcAft>
-              <a:defRPr>
-                <a:solidFill>
-                  <a:schemeClr val="tx1"/>
-                </a:solidFill>
-                <a:latin typeface="Calibri" panose="020F0502020204030204" pitchFamily="34" charset="0"/>
-              </a:defRPr>
-            </a:lvl6pPr>
-            <a:lvl7pPr marL="2971800" indent="-228600" eaLnBrk="0" fontAlgn="base" hangingPunct="0">
-              <a:spcBef>
-                <a:spcPct val="0"/>
-              </a:spcBef>
-              <a:spcAft>
-                <a:spcPct val="0"/>
-              </a:spcAft>
-              <a:defRPr>
-                <a:solidFill>
-                  <a:schemeClr val="tx1"/>
-                </a:solidFill>
-                <a:latin typeface="Calibri" panose="020F0502020204030204" pitchFamily="34" charset="0"/>
-              </a:defRPr>
-            </a:lvl7pPr>
-            <a:lvl8pPr marL="3429000" indent="-228600" eaLnBrk="0" fontAlgn="base" hangingPunct="0">
-              <a:spcBef>
-                <a:spcPct val="0"/>
-              </a:spcBef>
-              <a:spcAft>
-                <a:spcPct val="0"/>
-              </a:spcAft>
-              <a:defRPr>
-                <a:solidFill>
-                  <a:schemeClr val="tx1"/>
-                </a:solidFill>
-                <a:latin typeface="Calibri" panose="020F0502020204030204" pitchFamily="34" charset="0"/>
-              </a:defRPr>
-            </a:lvl8pPr>
-            <a:lvl9pPr marL="3886200" indent="-228600" eaLnBrk="0" fontAlgn="base" hangingPunct="0">
-              <a:spcBef>
-                <a:spcPct val="0"/>
-              </a:spcBef>
-              <a:spcAft>
-                <a:spcPct val="0"/>
-              </a:spcAft>
-              <a:defRPr>
-                <a:solidFill>
-                  <a:schemeClr val="tx1"/>
-                </a:solidFill>
-                <a:latin typeface="Calibri" panose="020F0502020204030204" pitchFamily="34" charset="0"/>
-              </a:defRPr>
-            </a:lvl9pPr>
-          </a:lstStyle>
-          <a:p>
-            <a:pPr algn="ctr" eaLnBrk="1" hangingPunct="1"/>
-            <a:r>
-              <a:rPr lang="en-US" altLang="en-US" sz="1000" dirty="0">
-                <a:latin typeface="Arial" panose="020B0604020202020204" pitchFamily="34" charset="0"/>
-                <a:ea typeface="Amazon Ember" panose="020B0603020204020204" pitchFamily="34" charset="0"/>
-                <a:cs typeface="Arial" panose="020B0604020202020204" pitchFamily="34" charset="0"/>
-              </a:rPr>
-              <a:t>AWS KMS</a:t>
-            </a:r>
-          </a:p>
-        </p:txBody>
-      </p:sp>
     </p:spTree>
     <p:extLst>
       <p:ext uri="{BB962C8B-B14F-4D97-AF65-F5344CB8AC3E}">

</xml_diff>

<commit_message>
Doc edits per working session with Dave, etc.
</commit_message>
<xml_diff>
--- a/docs/images/architecture_diagram.pptx
+++ b/docs/images/architecture_diagram.pptx
@@ -331,7 +331,7 @@
               <a:pPr>
                 <a:defRPr/>
               </a:pPr>
-              <a:t>11/29/2021</a:t>
+              <a:t>12/1/2021</a:t>
             </a:fld>
             <a:endParaRPr lang="en-US" dirty="0"/>
           </a:p>
@@ -17631,21 +17631,6 @@
                 <a:ea typeface="Amazon Ember" panose="020B0603020204020204" pitchFamily="34" charset="0"/>
                 <a:cs typeface="Arial" panose="020B0604020202020204" pitchFamily="34" charset="0"/>
               </a:rPr>
-              <a:t>(Optional) </a:t>
-            </a:r>
-            <a:br>
-              <a:rPr lang="en-US" altLang="en-US" sz="1200" dirty="0">
-                <a:latin typeface="Arial" panose="020B0604020202020204" pitchFamily="34" charset="0"/>
-                <a:ea typeface="Amazon Ember" panose="020B0603020204020204" pitchFamily="34" charset="0"/>
-                <a:cs typeface="Arial" panose="020B0604020202020204" pitchFamily="34" charset="0"/>
-              </a:rPr>
-            </a:br>
-            <a:r>
-              <a:rPr lang="en-US" altLang="en-US" sz="1200" dirty="0">
-                <a:latin typeface="Arial" panose="020B0604020202020204" pitchFamily="34" charset="0"/>
-                <a:ea typeface="Amazon Ember" panose="020B0603020204020204" pitchFamily="34" charset="0"/>
-                <a:cs typeface="Arial" panose="020B0604020202020204" pitchFamily="34" charset="0"/>
-              </a:rPr>
               <a:t>Route R53</a:t>
             </a:r>
             <a:br>
@@ -17662,6 +17647,21 @@
                 <a:cs typeface="Arial" panose="020B0604020202020204" pitchFamily="34" charset="0"/>
               </a:rPr>
               <a:t>hosted zone</a:t>
+            </a:r>
+            <a:br>
+              <a:rPr lang="en-US" altLang="en-US" sz="1200" dirty="0">
+                <a:latin typeface="Arial" panose="020B0604020202020204" pitchFamily="34" charset="0"/>
+                <a:ea typeface="Amazon Ember" panose="020B0603020204020204" pitchFamily="34" charset="0"/>
+                <a:cs typeface="Arial" panose="020B0604020202020204" pitchFamily="34" charset="0"/>
+              </a:rPr>
+            </a:br>
+            <a:r>
+              <a:rPr lang="en-US" altLang="en-US" sz="1200" dirty="0">
+                <a:latin typeface="Arial" panose="020B0604020202020204" pitchFamily="34" charset="0"/>
+                <a:ea typeface="Amazon Ember" panose="020B0603020204020204" pitchFamily="34" charset="0"/>
+                <a:cs typeface="Arial" panose="020B0604020202020204" pitchFamily="34" charset="0"/>
+              </a:rPr>
+              <a:t>(optional)</a:t>
             </a:r>
           </a:p>
         </p:txBody>

</xml_diff>

<commit_message>
Fixed typo in architecture diagram
</commit_message>
<xml_diff>
--- a/docs/images/architecture_diagram.pptx
+++ b/docs/images/architecture_diagram.pptx
@@ -331,7 +331,7 @@
               <a:pPr>
                 <a:defRPr/>
               </a:pPr>
-              <a:t>12/1/2021</a:t>
+              <a:t>12/3/2021</a:t>
             </a:fld>
             <a:endParaRPr lang="en-US" dirty="0"/>
           </a:p>
@@ -17631,7 +17631,7 @@
                 <a:ea typeface="Amazon Ember" panose="020B0603020204020204" pitchFamily="34" charset="0"/>
                 <a:cs typeface="Arial" panose="020B0604020202020204" pitchFamily="34" charset="0"/>
               </a:rPr>
-              <a:t>Route R53</a:t>
+              <a:t>Route 53</a:t>
             </a:r>
             <a:br>
               <a:rPr lang="en-US" altLang="en-US" sz="1200" dirty="0">

</xml_diff>